<commit_message>
Major fixes to algorithms.js and sapientBind JSON object.
</commit_message>
<xml_diff>
--- a/3 Entwicklungsphase/weekly_meeting_14.pptx
+++ b/3 Entwicklungsphase/weekly_meeting_14.pptx
@@ -11,12 +11,13 @@
     <p:sldId id="273" r:id="rId5"/>
     <p:sldId id="272" r:id="rId6"/>
     <p:sldId id="280" r:id="rId7"/>
-    <p:sldId id="281" r:id="rId8"/>
-    <p:sldId id="278" r:id="rId9"/>
-    <p:sldId id="279" r:id="rId10"/>
-    <p:sldId id="277" r:id="rId11"/>
-    <p:sldId id="282" r:id="rId12"/>
-    <p:sldId id="276" r:id="rId13"/>
+    <p:sldId id="283" r:id="rId8"/>
+    <p:sldId id="281" r:id="rId9"/>
+    <p:sldId id="278" r:id="rId10"/>
+    <p:sldId id="279" r:id="rId11"/>
+    <p:sldId id="277" r:id="rId12"/>
+    <p:sldId id="282" r:id="rId13"/>
+    <p:sldId id="276" r:id="rId14"/>
   </p:sldIdLst>
   <p:sldSz cx="12192000" cy="6858000"/>
   <p:notesSz cx="6858000" cy="9144000"/>
@@ -337,7 +338,7 @@
               <a:rPr lang="en-US" smtClean="0">
                 <a:uFillTx/>
               </a:rPr>
-              <a:t>‹#›</a:t>
+              <a:t>‹Nr.›</a:t>
             </a:fld>
             <a:endParaRPr lang="en-US">
               <a:uFillTx/>
@@ -522,7 +523,7 @@
               <a:rPr lang="en-US" smtClean="0">
                 <a:uFillTx/>
               </a:rPr>
-              <a:t>‹#›</a:t>
+              <a:t>‹Nr.›</a:t>
             </a:fld>
             <a:endParaRPr lang="en-US">
               <a:uFillTx/>
@@ -717,7 +718,7 @@
               <a:rPr lang="en-US" smtClean="0">
                 <a:uFillTx/>
               </a:rPr>
-              <a:t>‹#›</a:t>
+              <a:t>‹Nr.›</a:t>
             </a:fld>
             <a:endParaRPr lang="en-US">
               <a:uFillTx/>
@@ -902,7 +903,7 @@
               <a:rPr lang="en-US" smtClean="0">
                 <a:uFillTx/>
               </a:rPr>
-              <a:t>‹#›</a:t>
+              <a:t>‹Nr.›</a:t>
             </a:fld>
             <a:endParaRPr lang="en-US">
               <a:uFillTx/>
@@ -1167,7 +1168,7 @@
               <a:rPr lang="en-US" smtClean="0">
                 <a:uFillTx/>
               </a:rPr>
-              <a:t>‹#›</a:t>
+              <a:t>‹Nr.›</a:t>
             </a:fld>
             <a:endParaRPr lang="en-US">
               <a:uFillTx/>
@@ -1423,7 +1424,7 @@
               <a:rPr lang="en-US" smtClean="0">
                 <a:uFillTx/>
               </a:rPr>
-              <a:t>‹#›</a:t>
+              <a:t>‹Nr.›</a:t>
             </a:fld>
             <a:endParaRPr lang="en-US">
               <a:uFillTx/>
@@ -1854,7 +1855,7 @@
               <a:rPr lang="en-US" smtClean="0">
                 <a:uFillTx/>
               </a:rPr>
-              <a:t>‹#›</a:t>
+              <a:t>‹Nr.›</a:t>
             </a:fld>
             <a:endParaRPr lang="en-US">
               <a:uFillTx/>
@@ -1978,7 +1979,7 @@
               <a:rPr lang="en-US" smtClean="0">
                 <a:uFillTx/>
               </a:rPr>
-              <a:t>‹#›</a:t>
+              <a:t>‹Nr.›</a:t>
             </a:fld>
             <a:endParaRPr lang="en-US">
               <a:uFillTx/>
@@ -2078,7 +2079,7 @@
               <a:rPr lang="en-US" smtClean="0">
                 <a:uFillTx/>
               </a:rPr>
-              <a:t>‹#›</a:t>
+              <a:t>‹Nr.›</a:t>
             </a:fld>
             <a:endParaRPr lang="en-US">
               <a:uFillTx/>
@@ -2410,7 +2411,7 @@
               <a:rPr lang="en-US" smtClean="0">
                 <a:uFillTx/>
               </a:rPr>
-              <a:t>‹#›</a:t>
+              <a:t>‹Nr.›</a:t>
             </a:fld>
             <a:endParaRPr lang="en-US">
               <a:uFillTx/>
@@ -2711,7 +2712,7 @@
               <a:rPr lang="en-US" smtClean="0">
                 <a:uFillTx/>
               </a:rPr>
-              <a:t>‹#›</a:t>
+              <a:t>‹Nr.›</a:t>
             </a:fld>
             <a:endParaRPr lang="en-US">
               <a:uFillTx/>
@@ -2978,7 +2979,7 @@
               <a:rPr lang="en-US" smtClean="0">
                 <a:uFillTx/>
               </a:rPr>
-              <a:t>‹#›</a:t>
+              <a:t>‹Nr.›</a:t>
             </a:fld>
             <a:endParaRPr lang="en-US">
               <a:uFillTx/>
@@ -3540,18 +3541,17 @@
                 <a:solidFill>
                   <a:srgbClr val="339966"/>
                 </a:solidFill>
-                <a:uFillTx/>
-              </a:rPr>
-              <a:t>Next Sprint – </a:t>
-            </a:r>
-            <a:r>
-              <a:rPr lang="en-US" sz="3200" b="1" dirty="0" err="1">
+              </a:rPr>
+              <a:t>Issues and Challenges</a:t>
+            </a:r>
+            <a:r>
+              <a:rPr lang="en-US" sz="3200" b="1" dirty="0">
                 <a:solidFill>
                   <a:srgbClr val="339966"/>
                 </a:solidFill>
                 <a:uFillTx/>
               </a:rPr>
-              <a:t>ToDos</a:t>
+              <a:t/>
             </a:r>
             <a:br>
               <a:rPr lang="en-US" sz="3200" b="1" dirty="0">
@@ -3640,20 +3640,607 @@
             </a:pPr>
             <a:r>
               <a:rPr lang="en-GB" sz="2000" dirty="0" err="1"/>
-              <a:t>Schreiben</a:t>
+              <a:t>Stillstand</a:t>
             </a:r>
             <a:r>
               <a:rPr lang="en-GB" sz="2000" dirty="0"/>
-              <a:t>! (und </a:t>
+              <a:t> </a:t>
             </a:r>
             <a:r>
               <a:rPr lang="en-GB" sz="2000" dirty="0" err="1"/>
-              <a:t>Lernen</a:t>
+              <a:t>beim</a:t>
             </a:r>
             <a:r>
               <a:rPr lang="en-GB" sz="2000" dirty="0"/>
+              <a:t> </a:t>
+            </a:r>
+            <a:r>
+              <a:rPr lang="en-GB" sz="2000" dirty="0" err="1"/>
+              <a:t>vertexPlacement</a:t>
+            </a:r>
+            <a:r>
+              <a:rPr lang="en-GB" sz="2000" dirty="0"/>
+              <a:t> </a:t>
+            </a:r>
+            <a:r>
+              <a:rPr lang="en-GB" sz="2000" dirty="0" err="1"/>
+              <a:t>Algorithmus</a:t>
+            </a:r>
+            <a:endParaRPr lang="en-GB" sz="2000" dirty="0"/>
+          </a:p>
+          <a:p>
+            <a:pPr lvl="1" algn="just">
+              <a:buClr>
+                <a:srgbClr val="FFC000"/>
+              </a:buClr>
+              <a:buFont typeface="Wingdings" panose="05000000000000000000" pitchFamily="2" charset="2"/>
+              <a:buChar char="§"/>
+            </a:pPr>
+            <a:r>
+              <a:rPr lang="en-GB" sz="1600" dirty="0" err="1">
+                <a:uFillTx/>
+              </a:rPr>
+              <a:t>Alles</a:t>
+            </a:r>
+            <a:r>
+              <a:rPr lang="en-GB" sz="1600" dirty="0">
+                <a:uFillTx/>
+              </a:rPr>
+              <a:t> </a:t>
+            </a:r>
+            <a:r>
+              <a:rPr lang="en-GB" sz="1600" dirty="0" err="1">
+                <a:uFillTx/>
+              </a:rPr>
+              <a:t>wofür</a:t>
+            </a:r>
+            <a:r>
+              <a:rPr lang="en-GB" sz="1600" dirty="0">
+                <a:uFillTx/>
+              </a:rPr>
+              <a:t> </a:t>
+            </a:r>
+            <a:r>
+              <a:rPr lang="en-GB" sz="1600" dirty="0" err="1">
+                <a:uFillTx/>
+              </a:rPr>
+              <a:t>es</a:t>
+            </a:r>
+            <a:r>
+              <a:rPr lang="en-GB" sz="1600" dirty="0">
+                <a:uFillTx/>
+              </a:rPr>
+              <a:t> </a:t>
+            </a:r>
+            <a:r>
+              <a:rPr lang="en-GB" sz="1600" dirty="0" err="1">
+                <a:uFillTx/>
+              </a:rPr>
+              <a:t>eine</a:t>
+            </a:r>
+            <a:r>
+              <a:rPr lang="en-GB" sz="1600" dirty="0">
+                <a:uFillTx/>
+              </a:rPr>
+              <a:t> </a:t>
+            </a:r>
+            <a:r>
+              <a:rPr lang="en-GB" sz="1600" dirty="0" err="1">
+                <a:uFillTx/>
+              </a:rPr>
+              <a:t>bestimmte</a:t>
+            </a:r>
+            <a:r>
+              <a:rPr lang="en-GB" sz="1600" dirty="0">
+                <a:uFillTx/>
+              </a:rPr>
+              <a:t> </a:t>
+            </a:r>
+            <a:r>
+              <a:rPr lang="en-GB" sz="1600" dirty="0" err="1">
+                <a:uFillTx/>
+              </a:rPr>
+              <a:t>Logik</a:t>
+            </a:r>
+            <a:r>
+              <a:rPr lang="en-GB" sz="1600" dirty="0">
+                <a:uFillTx/>
+              </a:rPr>
+              <a:t> </a:t>
+            </a:r>
+            <a:r>
+              <a:rPr lang="en-GB" sz="1600" dirty="0" err="1">
+                <a:uFillTx/>
+              </a:rPr>
+              <a:t>dahinter</a:t>
+            </a:r>
+            <a:r>
+              <a:rPr lang="en-GB" sz="1600" dirty="0">
+                <a:uFillTx/>
+              </a:rPr>
+              <a:t> </a:t>
+            </a:r>
+            <a:r>
+              <a:rPr lang="en-GB" sz="1600" dirty="0" err="1">
+                <a:uFillTx/>
+              </a:rPr>
+              <a:t>gibt</a:t>
+            </a:r>
+            <a:r>
+              <a:rPr lang="en-GB" sz="1600" dirty="0">
+                <a:uFillTx/>
+              </a:rPr>
+              <a:t>, </a:t>
+            </a:r>
+            <a:r>
+              <a:rPr lang="en-GB" sz="1600" dirty="0" err="1">
+                <a:uFillTx/>
+              </a:rPr>
+              <a:t>wird</a:t>
+            </a:r>
+            <a:r>
+              <a:rPr lang="en-GB" sz="1600" dirty="0">
+                <a:uFillTx/>
+              </a:rPr>
+              <a:t> </a:t>
+            </a:r>
+            <a:r>
+              <a:rPr lang="en-GB" sz="1600" dirty="0" err="1">
+                <a:uFillTx/>
+              </a:rPr>
+              <a:t>schon</a:t>
+            </a:r>
+            <a:r>
+              <a:rPr lang="en-GB" sz="1600" dirty="0">
+                <a:uFillTx/>
+              </a:rPr>
+              <a:t> </a:t>
+            </a:r>
+            <a:r>
+              <a:rPr lang="en-GB" sz="1600" dirty="0" err="1">
+                <a:uFillTx/>
+              </a:rPr>
+              <a:t>entsprechend</a:t>
+            </a:r>
+            <a:r>
+              <a:rPr lang="en-GB" sz="1600" dirty="0">
+                <a:uFillTx/>
+              </a:rPr>
+              <a:t> </a:t>
+            </a:r>
+            <a:r>
+              <a:rPr lang="en-GB" sz="1600" dirty="0" err="1">
+                <a:uFillTx/>
+              </a:rPr>
+              <a:t>dieser</a:t>
+            </a:r>
+            <a:r>
+              <a:rPr lang="en-GB" sz="1600" dirty="0">
+                <a:uFillTx/>
+              </a:rPr>
+              <a:t> </a:t>
+            </a:r>
+            <a:r>
+              <a:rPr lang="en-GB" sz="1600" dirty="0" err="1">
+                <a:uFillTx/>
+              </a:rPr>
+              <a:t>Logik</a:t>
+            </a:r>
+            <a:r>
+              <a:rPr lang="en-GB" sz="1600" dirty="0">
+                <a:uFillTx/>
+              </a:rPr>
+              <a:t> </a:t>
+            </a:r>
+            <a:r>
+              <a:rPr lang="en-GB" sz="1600" dirty="0" err="1">
+                <a:uFillTx/>
+              </a:rPr>
+              <a:t>platziert</a:t>
+            </a:r>
+            <a:r>
+              <a:rPr lang="en-GB" sz="1600" dirty="0">
+                <a:uFillTx/>
+              </a:rPr>
+              <a:t>.</a:t>
+            </a:r>
+          </a:p>
+          <a:p>
+            <a:pPr lvl="1" algn="just">
+              <a:buClr>
+                <a:srgbClr val="FFC000"/>
+              </a:buClr>
+              <a:buFont typeface="Wingdings" panose="05000000000000000000" pitchFamily="2" charset="2"/>
+              <a:buChar char="§"/>
+            </a:pPr>
+            <a:r>
+              <a:rPr lang="en-GB" sz="1600" dirty="0" err="1"/>
+              <a:t>Nich</a:t>
+            </a:r>
+            <a:r>
+              <a:rPr lang="en-GB" sz="1600" dirty="0"/>
+              <a:t> </a:t>
+            </a:r>
+            <a:r>
+              <a:rPr lang="en-GB" sz="1600" dirty="0" err="1"/>
+              <a:t>viel</a:t>
+            </a:r>
+            <a:r>
+              <a:rPr lang="en-GB" sz="1600" dirty="0"/>
+              <a:t> </a:t>
+            </a:r>
+            <a:r>
+              <a:rPr lang="en-GB" sz="1600" dirty="0" err="1"/>
+              <a:t>mehr</a:t>
+            </a:r>
+            <a:r>
+              <a:rPr lang="en-GB" sz="1600" dirty="0"/>
+              <a:t> </a:t>
+            </a:r>
+            <a:r>
+              <a:rPr lang="en-GB" sz="1600" dirty="0" err="1"/>
+              <a:t>Logik</a:t>
+            </a:r>
+            <a:r>
+              <a:rPr lang="en-GB" sz="1600" dirty="0"/>
+              <a:t> um das </a:t>
+            </a:r>
+            <a:r>
+              <a:rPr lang="en-GB" sz="1600" dirty="0" err="1"/>
+              <a:t>Platzierungsalgorithmus</a:t>
+            </a:r>
+            <a:r>
+              <a:rPr lang="en-GB" sz="1600" dirty="0"/>
+              <a:t> in </a:t>
+            </a:r>
+            <a:r>
+              <a:rPr lang="en-GB" sz="1600" dirty="0" err="1"/>
+              <a:t>wenig</a:t>
+            </a:r>
+            <a:r>
+              <a:rPr lang="en-GB" sz="1600" dirty="0"/>
+              <a:t> </a:t>
+            </a:r>
+            <a:r>
+              <a:rPr lang="en-GB" sz="1600" dirty="0" err="1"/>
+              <a:t>Zeit</a:t>
+            </a:r>
+            <a:r>
+              <a:rPr lang="en-GB" sz="1600" dirty="0"/>
+              <a:t> </a:t>
+            </a:r>
+            <a:r>
+              <a:rPr lang="en-GB" sz="1600" dirty="0" err="1"/>
+              <a:t>noch</a:t>
+            </a:r>
+            <a:r>
+              <a:rPr lang="en-GB" sz="1600" dirty="0"/>
+              <a:t> </a:t>
+            </a:r>
+            <a:r>
+              <a:rPr lang="en-GB" sz="1600" dirty="0" err="1"/>
+              <a:t>zu</a:t>
+            </a:r>
+            <a:r>
+              <a:rPr lang="en-GB" sz="1600" dirty="0"/>
+              <a:t> </a:t>
+            </a:r>
+            <a:r>
+              <a:rPr lang="en-GB" sz="1600" dirty="0" err="1"/>
+              <a:t>verbessern</a:t>
+            </a:r>
+            <a:r>
+              <a:rPr lang="en-GB" sz="1600" dirty="0"/>
+              <a:t>.</a:t>
+            </a:r>
+          </a:p>
+          <a:p>
+            <a:pPr lvl="1" algn="just">
+              <a:buClr>
+                <a:srgbClr val="FFC000"/>
+              </a:buClr>
+              <a:buFont typeface="Wingdings" panose="05000000000000000000" pitchFamily="2" charset="2"/>
+              <a:buChar char="§"/>
+            </a:pPr>
+            <a:r>
+              <a:rPr lang="en-GB" sz="1600" u="sng" dirty="0" err="1"/>
+              <a:t>Vorteile</a:t>
+            </a:r>
+            <a:r>
+              <a:rPr lang="en-GB" sz="1600" dirty="0"/>
+              <a:t>:</a:t>
+            </a:r>
+          </a:p>
+          <a:p>
+            <a:pPr lvl="2" algn="just">
+              <a:buClr>
+                <a:srgbClr val="FFC000"/>
+              </a:buClr>
+              <a:buFont typeface="Wingdings" panose="05000000000000000000" pitchFamily="2" charset="2"/>
+              <a:buChar char="§"/>
+            </a:pPr>
+            <a:r>
+              <a:rPr lang="en-GB" sz="1600" dirty="0" err="1"/>
+              <a:t>Konzentration</a:t>
+            </a:r>
+            <a:r>
+              <a:rPr lang="en-GB" sz="1600" dirty="0"/>
+              <a:t> auf Data-bindings (</a:t>
+            </a:r>
+            <a:r>
+              <a:rPr lang="en-GB" sz="1600" dirty="0" err="1"/>
+              <a:t>dynamisierung</a:t>
+            </a:r>
+            <a:r>
+              <a:rPr lang="en-GB" sz="1600" dirty="0"/>
               <a:t>)</a:t>
             </a:r>
+          </a:p>
+          <a:p>
+            <a:pPr lvl="2" algn="just">
+              <a:buClr>
+                <a:srgbClr val="FFC000"/>
+              </a:buClr>
+              <a:buFont typeface="Wingdings" panose="05000000000000000000" pitchFamily="2" charset="2"/>
+              <a:buChar char="§"/>
+            </a:pPr>
+            <a:r>
+              <a:rPr lang="en-GB" sz="1600" dirty="0" err="1"/>
+              <a:t>Verteci</a:t>
+            </a:r>
+            <a:r>
+              <a:rPr lang="en-GB" sz="1600" dirty="0"/>
+              <a:t> </a:t>
+            </a:r>
+            <a:r>
+              <a:rPr lang="en-GB" sz="1600" dirty="0" err="1"/>
+              <a:t>schon</a:t>
+            </a:r>
+            <a:r>
+              <a:rPr lang="en-GB" sz="1600" dirty="0"/>
+              <a:t> </a:t>
+            </a:r>
+            <a:r>
+              <a:rPr lang="en-GB" sz="1600" dirty="0" err="1"/>
+              <a:t>ziemlich</a:t>
+            </a:r>
+            <a:r>
+              <a:rPr lang="en-GB" sz="1600" dirty="0"/>
+              <a:t> gut </a:t>
+            </a:r>
+            <a:r>
+              <a:rPr lang="en-GB" sz="1600" dirty="0" err="1"/>
+              <a:t>platziert</a:t>
+            </a:r>
+            <a:r>
+              <a:rPr lang="en-GB" sz="1600" dirty="0"/>
+              <a:t> und edges </a:t>
+            </a:r>
+            <a:r>
+              <a:rPr lang="en-GB" sz="1600" dirty="0" err="1"/>
+              <a:t>vereinfacht</a:t>
+            </a:r>
+            <a:endParaRPr lang="en-GB" sz="1600" dirty="0"/>
+          </a:p>
+          <a:p>
+            <a:pPr lvl="2" algn="just">
+              <a:buClr>
+                <a:srgbClr val="FFC000"/>
+              </a:buClr>
+              <a:buFont typeface="Wingdings" panose="05000000000000000000" pitchFamily="2" charset="2"/>
+              <a:buChar char="§"/>
+            </a:pPr>
+            <a:r>
+              <a:rPr lang="en-GB" sz="1600" dirty="0" err="1"/>
+              <a:t>Verbesserungsmöglichkeiten</a:t>
+            </a:r>
+            <a:r>
+              <a:rPr lang="en-GB" sz="1600" dirty="0"/>
+              <a:t> </a:t>
+            </a:r>
+            <a:r>
+              <a:rPr lang="en-GB" sz="1600" dirty="0" err="1"/>
+              <a:t>direkt</a:t>
+            </a:r>
+            <a:r>
+              <a:rPr lang="en-GB" sz="1600" dirty="0"/>
+              <a:t> </a:t>
+            </a:r>
+            <a:r>
+              <a:rPr lang="en-GB" sz="1600" dirty="0" err="1"/>
+              <a:t>im</a:t>
+            </a:r>
+            <a:r>
+              <a:rPr lang="en-GB" sz="1600" dirty="0"/>
+              <a:t> draw.io (</a:t>
+            </a:r>
+            <a:r>
+              <a:rPr lang="en-GB" sz="1600" dirty="0" err="1"/>
+              <a:t>Drag&amp;Drop</a:t>
+            </a:r>
+            <a:r>
+              <a:rPr lang="en-GB" sz="1600" dirty="0"/>
+              <a:t>)</a:t>
+            </a:r>
+          </a:p>
+          <a:p>
+            <a:pPr lvl="1" algn="just">
+              <a:buClr>
+                <a:srgbClr val="FFC000"/>
+              </a:buClr>
+              <a:buFont typeface="Wingdings" panose="05000000000000000000" pitchFamily="2" charset="2"/>
+              <a:buChar char="§"/>
+            </a:pPr>
+            <a:r>
+              <a:rPr lang="en-GB" sz="1600" u="sng" dirty="0" err="1">
+                <a:uFillTx/>
+              </a:rPr>
+              <a:t>Nachteile</a:t>
+            </a:r>
+            <a:r>
+              <a:rPr lang="en-GB" sz="1600" dirty="0">
+                <a:uFillTx/>
+              </a:rPr>
+              <a:t>: </a:t>
+            </a:r>
+          </a:p>
+          <a:p>
+            <a:pPr lvl="2" algn="just">
+              <a:buClr>
+                <a:srgbClr val="FFC000"/>
+              </a:buClr>
+              <a:buFont typeface="Wingdings" panose="05000000000000000000" pitchFamily="2" charset="2"/>
+              <a:buChar char="§"/>
+            </a:pPr>
+            <a:r>
+              <a:rPr lang="en-GB" sz="1600" dirty="0" err="1"/>
+              <a:t>Platzierung</a:t>
+            </a:r>
+            <a:r>
+              <a:rPr lang="en-GB" sz="1600" dirty="0"/>
+              <a:t> </a:t>
+            </a:r>
+            <a:r>
+              <a:rPr lang="en-GB" sz="1600" dirty="0" err="1"/>
+              <a:t>ist</a:t>
+            </a:r>
+            <a:r>
+              <a:rPr lang="en-GB" sz="1600" dirty="0"/>
+              <a:t> das </a:t>
+            </a:r>
+            <a:r>
+              <a:rPr lang="en-GB" sz="1600" dirty="0" err="1"/>
+              <a:t>Endergebniss</a:t>
+            </a:r>
+            <a:r>
+              <a:rPr lang="en-GB" sz="1600" dirty="0"/>
+              <a:t> und </a:t>
+            </a:r>
+            <a:r>
+              <a:rPr lang="en-GB" sz="1600" dirty="0" err="1"/>
+              <a:t>alles</a:t>
+            </a:r>
+            <a:r>
+              <a:rPr lang="en-GB" sz="1600" dirty="0"/>
+              <a:t> was man am Ende </a:t>
+            </a:r>
+            <a:r>
+              <a:rPr lang="en-GB" sz="1600" dirty="0" err="1"/>
+              <a:t>sieht</a:t>
+            </a:r>
+            <a:endParaRPr lang="en-GB" sz="1600" dirty="0"/>
+          </a:p>
+          <a:p>
+            <a:pPr lvl="2" algn="just">
+              <a:buClr>
+                <a:srgbClr val="FFC000"/>
+              </a:buClr>
+              <a:buFont typeface="Wingdings" panose="05000000000000000000" pitchFamily="2" charset="2"/>
+              <a:buChar char="§"/>
+            </a:pPr>
+            <a:r>
+              <a:rPr lang="en-GB" sz="1600" dirty="0"/>
+              <a:t>Arbeit und </a:t>
+            </a:r>
+            <a:r>
+              <a:rPr lang="en-GB" sz="1600" dirty="0" err="1"/>
+              <a:t>Aufwand</a:t>
+            </a:r>
+            <a:r>
+              <a:rPr lang="en-GB" sz="1600" dirty="0"/>
+              <a:t> die </a:t>
+            </a:r>
+            <a:r>
+              <a:rPr lang="en-GB" sz="1600" dirty="0" err="1"/>
+              <a:t>hinter</a:t>
+            </a:r>
+            <a:r>
+              <a:rPr lang="en-GB" sz="1600" dirty="0"/>
+              <a:t> die </a:t>
+            </a:r>
+            <a:r>
+              <a:rPr lang="en-GB" sz="1600" dirty="0" err="1"/>
+              <a:t>Visualisierung</a:t>
+            </a:r>
+            <a:r>
+              <a:rPr lang="en-GB" sz="1600" dirty="0"/>
+              <a:t> </a:t>
+            </a:r>
+            <a:r>
+              <a:rPr lang="en-GB" sz="1600" dirty="0" err="1"/>
+              <a:t>sieht</a:t>
+            </a:r>
+            <a:r>
+              <a:rPr lang="en-GB" sz="1600" dirty="0"/>
+              <a:t> man </a:t>
+            </a:r>
+            <a:r>
+              <a:rPr lang="en-GB" sz="1600" dirty="0" err="1"/>
+              <a:t>nicht</a:t>
+            </a:r>
+            <a:endParaRPr lang="en-GB" sz="1600" dirty="0"/>
+          </a:p>
+          <a:p>
+            <a:pPr lvl="2" algn="just">
+              <a:buClr>
+                <a:srgbClr val="FFC000"/>
+              </a:buClr>
+              <a:buFont typeface="Wingdings" panose="05000000000000000000" pitchFamily="2" charset="2"/>
+              <a:buChar char="§"/>
+            </a:pPr>
+            <a:r>
+              <a:rPr lang="en-GB" sz="1600" dirty="0" err="1"/>
+              <a:t>Kann</a:t>
+            </a:r>
+            <a:r>
+              <a:rPr lang="en-GB" sz="1600" dirty="0"/>
+              <a:t> </a:t>
+            </a:r>
+            <a:r>
+              <a:rPr lang="en-GB" sz="1600" dirty="0" err="1"/>
+              <a:t>zu</a:t>
+            </a:r>
+            <a:r>
+              <a:rPr lang="en-GB" sz="1600" dirty="0"/>
+              <a:t> </a:t>
+            </a:r>
+            <a:r>
+              <a:rPr lang="en-GB" sz="1600" dirty="0" err="1"/>
+              <a:t>enttäuschende</a:t>
+            </a:r>
+            <a:r>
+              <a:rPr lang="en-GB" sz="1600" dirty="0"/>
+              <a:t> </a:t>
+            </a:r>
+            <a:r>
+              <a:rPr lang="en-GB" sz="1600" dirty="0" err="1"/>
+              <a:t>Schlussfolgerungen</a:t>
+            </a:r>
+            <a:r>
+              <a:rPr lang="en-GB" sz="1600" dirty="0"/>
+              <a:t> </a:t>
+            </a:r>
+            <a:r>
+              <a:rPr lang="en-GB" sz="1600" dirty="0" err="1"/>
+              <a:t>bezüglich</a:t>
+            </a:r>
+            <a:r>
+              <a:rPr lang="en-GB" sz="1600" dirty="0"/>
+              <a:t> des </a:t>
+            </a:r>
+            <a:r>
+              <a:rPr lang="en-GB" sz="1600" dirty="0" err="1"/>
+              <a:t>Projekts</a:t>
+            </a:r>
+            <a:r>
+              <a:rPr lang="en-GB" sz="1600" dirty="0"/>
+              <a:t> </a:t>
+            </a:r>
+            <a:r>
+              <a:rPr lang="en-GB" sz="1600" dirty="0" err="1"/>
+              <a:t>führen</a:t>
+            </a:r>
+            <a:endParaRPr lang="en-GB" sz="1600" dirty="0"/>
           </a:p>
           <a:p>
             <a:pPr algn="just">
@@ -3664,8 +4251,10 @@
               <a:buChar char="§"/>
             </a:pPr>
             <a:r>
-              <a:rPr lang="en-GB" sz="2000" dirty="0"/>
-              <a:t>Vertex placement algorithm</a:t>
+              <a:rPr lang="en-GB" sz="2000" dirty="0">
+                <a:uFillTx/>
+              </a:rPr>
+              <a:t>Animations via sapient-bind</a:t>
             </a:r>
           </a:p>
           <a:p>
@@ -3677,11 +4266,31 @@
               <a:buChar char="§"/>
             </a:pPr>
             <a:r>
+              <a:rPr lang="en-GB" sz="1600" dirty="0"/>
+              <a:t>Define sapient-bind JSON structure</a:t>
+            </a:r>
+          </a:p>
+          <a:p>
+            <a:pPr lvl="1" algn="just">
+              <a:buClr>
+                <a:srgbClr val="FFC000"/>
+              </a:buClr>
+              <a:buFont typeface="Wingdings" panose="05000000000000000000" pitchFamily="2" charset="2"/>
+              <a:buChar char="§"/>
+            </a:pPr>
+            <a:r>
               <a:rPr lang="en-GB" sz="1600" dirty="0">
                 <a:uFillTx/>
               </a:rPr>
-              <a:t>Continuous improvement</a:t>
-            </a:r>
+              <a:t>Function to create data-bindings with data fech</a:t>
+            </a:r>
+            <a:r>
+              <a:rPr lang="en-GB" sz="1600" dirty="0"/>
+              <a:t>ted from database</a:t>
+            </a:r>
+            <a:endParaRPr lang="en-GB" sz="1600" dirty="0">
+              <a:uFillTx/>
+            </a:endParaRPr>
           </a:p>
           <a:p>
             <a:pPr algn="just">
@@ -3692,10 +4301,28 @@
               <a:buChar char="§"/>
             </a:pPr>
             <a:r>
-              <a:rPr lang="en-GB" sz="2000" dirty="0">
-                <a:uFillTx/>
-              </a:rPr>
-              <a:t>Animations via sapient-bind</a:t>
+              <a:rPr lang="en-GB" sz="2000" dirty="0" err="1"/>
+              <a:t>Boardlet</a:t>
+            </a:r>
+            <a:r>
+              <a:rPr lang="en-GB" sz="2000" dirty="0"/>
+              <a:t> Design (</a:t>
+            </a:r>
+            <a:r>
+              <a:rPr lang="en-GB" sz="2000" dirty="0" err="1"/>
+              <a:t>niedrigste</a:t>
+            </a:r>
+            <a:r>
+              <a:rPr lang="en-GB" sz="2000" dirty="0"/>
+              <a:t> </a:t>
+            </a:r>
+            <a:r>
+              <a:rPr lang="en-GB" sz="2000" dirty="0" err="1"/>
+              <a:t>Priöritäat</a:t>
+            </a:r>
+            <a:r>
+              <a:rPr lang="en-GB" sz="2000" dirty="0"/>
+              <a:t>)</a:t>
             </a:r>
           </a:p>
           <a:p>
@@ -3708,7 +4335,22 @@
             </a:pPr>
             <a:r>
               <a:rPr lang="en-GB" sz="1600" dirty="0"/>
-              <a:t>Define sapient-bind JSON structure</a:t>
+              <a:t>Upload button</a:t>
+            </a:r>
+          </a:p>
+          <a:p>
+            <a:pPr lvl="2" algn="just">
+              <a:buClr>
+                <a:srgbClr val="FFC000"/>
+              </a:buClr>
+              <a:buFont typeface="Wingdings" panose="05000000000000000000" pitchFamily="2" charset="2"/>
+              <a:buChar char="§"/>
+            </a:pPr>
+            <a:r>
+              <a:rPr lang="en-GB" sz="1200" dirty="0">
+                <a:uFillTx/>
+              </a:rPr>
+              <a:t>Until now, no way of uploading files from client to the file system found (because of security issues)</a:t>
             </a:r>
           </a:p>
           <a:p>
@@ -3720,62 +4362,16 @@
               <a:buChar char="§"/>
             </a:pPr>
             <a:r>
-              <a:rPr lang="en-GB" sz="1600" dirty="0">
-                <a:uFillTx/>
-              </a:rPr>
-              <a:t>Function to create data-bindings with data fech</a:t>
-            </a:r>
-            <a:r>
               <a:rPr lang="en-GB" sz="1600" dirty="0"/>
-              <a:t>ted from database</a:t>
-            </a:r>
-            <a:endParaRPr lang="en-GB" sz="1600" dirty="0">
-              <a:uFillTx/>
-            </a:endParaRPr>
-          </a:p>
-          <a:p>
-            <a:pPr algn="just">
-              <a:buClr>
-                <a:srgbClr val="FFC000"/>
-              </a:buClr>
-              <a:buFont typeface="Wingdings" panose="05000000000000000000" pitchFamily="2" charset="2"/>
-              <a:buChar char="§"/>
-            </a:pPr>
-            <a:r>
-              <a:rPr lang="en-GB" sz="2000" dirty="0"/>
-              <a:t>Upload button</a:t>
-            </a:r>
-          </a:p>
-          <a:p>
-            <a:pPr lvl="1" algn="just">
-              <a:buClr>
-                <a:srgbClr val="FFC000"/>
-              </a:buClr>
-              <a:buFont typeface="Wingdings" panose="05000000000000000000" pitchFamily="2" charset="2"/>
-              <a:buChar char="§"/>
-            </a:pPr>
-            <a:r>
-              <a:rPr lang="en-GB" sz="1600" dirty="0">
-                <a:uFillTx/>
-              </a:rPr>
-              <a:t>Until now, no way of uploading files from client to the file system found (because of security issues)</a:t>
-            </a:r>
-            <a:endParaRPr lang="en-GB" sz="1400" dirty="0">
-              <a:uFillTx/>
-            </a:endParaRPr>
-          </a:p>
-          <a:p>
-            <a:pPr algn="just"/>
-            <a:endParaRPr lang="en-GB" sz="1400" dirty="0">
-              <a:uFillTx/>
-            </a:endParaRPr>
+              <a:t>Fix Progress Bar</a:t>
+            </a:r>
           </a:p>
         </p:txBody>
       </p:sp>
     </p:spTree>
     <p:extLst>
       <p:ext uri="{BB962C8B-B14F-4D97-AF65-F5344CB8AC3E}">
-        <p14:creationId xmlns:p14="http://schemas.microsoft.com/office/powerpoint/2010/main" val="124425708"/>
+        <p14:creationId xmlns:p14="http://schemas.microsoft.com/office/powerpoint/2010/main" val="2190960232"/>
       </p:ext>
     </p:extLst>
   </p:cSld>
@@ -3825,28 +4421,31 @@
           <a:lstStyle/>
           <a:p>
             <a:r>
+              <a:rPr lang="en-US" sz="3200" b="1" dirty="0">
+                <a:solidFill>
+                  <a:srgbClr val="339966"/>
+                </a:solidFill>
+                <a:uFillTx/>
+              </a:rPr>
+              <a:t>Next Sprint – </a:t>
+            </a:r>
+            <a:r>
               <a:rPr lang="en-US" sz="3200" b="1" dirty="0" err="1">
                 <a:solidFill>
                   <a:srgbClr val="339966"/>
                 </a:solidFill>
-              </a:rPr>
-              <a:t>Vorläufige</a:t>
+                <a:uFillTx/>
+              </a:rPr>
+              <a:t>ToDos</a:t>
             </a:r>
             <a:r>
               <a:rPr lang="en-US" sz="3200" b="1" dirty="0">
                 <a:solidFill>
                   <a:srgbClr val="339966"/>
                 </a:solidFill>
-              </a:rPr>
-              <a:t> </a:t>
-            </a:r>
-            <a:r>
-              <a:rPr lang="en-US" sz="3200" b="1" dirty="0" err="1">
-                <a:solidFill>
-                  <a:srgbClr val="339966"/>
-                </a:solidFill>
-              </a:rPr>
-              <a:t>Inhaltsverzeichnis</a:t>
+                <a:uFillTx/>
+              </a:rPr>
+              <a:t/>
             </a:r>
             <a:br>
               <a:rPr lang="en-US" sz="3200" b="1" dirty="0">
@@ -3865,7 +4464,7 @@
                 </a:solidFill>
                 <a:uFillTx/>
               </a:rPr>
-              <a:t>Bachelorarbeit</a:t>
+              <a:t>Weekly Sprint 14</a:t>
             </a:r>
             <a:endParaRPr lang="en-US" sz="3200" dirty="0">
               <a:solidFill>
@@ -3934,6 +4533,310 @@
               <a:buChar char="§"/>
             </a:pPr>
             <a:r>
+              <a:rPr lang="en-GB" sz="2000" dirty="0" err="1"/>
+              <a:t>Schreiben</a:t>
+            </a:r>
+            <a:r>
+              <a:rPr lang="en-GB" sz="2000" dirty="0"/>
+              <a:t>! (und </a:t>
+            </a:r>
+            <a:r>
+              <a:rPr lang="en-GB" sz="2000" dirty="0" err="1"/>
+              <a:t>Lernen</a:t>
+            </a:r>
+            <a:r>
+              <a:rPr lang="en-GB" sz="2000" dirty="0"/>
+              <a:t>)</a:t>
+            </a:r>
+          </a:p>
+          <a:p>
+            <a:pPr algn="just">
+              <a:buClr>
+                <a:srgbClr val="FFC000"/>
+              </a:buClr>
+              <a:buFont typeface="Wingdings" panose="05000000000000000000" pitchFamily="2" charset="2"/>
+              <a:buChar char="§"/>
+            </a:pPr>
+            <a:r>
+              <a:rPr lang="en-GB" sz="2000" dirty="0"/>
+              <a:t>Vertex placement algorithm</a:t>
+            </a:r>
+          </a:p>
+          <a:p>
+            <a:pPr lvl="1" algn="just">
+              <a:buClr>
+                <a:srgbClr val="FFC000"/>
+              </a:buClr>
+              <a:buFont typeface="Wingdings" panose="05000000000000000000" pitchFamily="2" charset="2"/>
+              <a:buChar char="§"/>
+            </a:pPr>
+            <a:r>
+              <a:rPr lang="en-GB" sz="1600" dirty="0">
+                <a:uFillTx/>
+              </a:rPr>
+              <a:t>Continuous improvement</a:t>
+            </a:r>
+          </a:p>
+          <a:p>
+            <a:pPr algn="just">
+              <a:buClr>
+                <a:srgbClr val="FFC000"/>
+              </a:buClr>
+              <a:buFont typeface="Wingdings" panose="05000000000000000000" pitchFamily="2" charset="2"/>
+              <a:buChar char="§"/>
+            </a:pPr>
+            <a:r>
+              <a:rPr lang="en-GB" sz="2000" dirty="0">
+                <a:uFillTx/>
+              </a:rPr>
+              <a:t>Animations via sapient-bind</a:t>
+            </a:r>
+          </a:p>
+          <a:p>
+            <a:pPr lvl="1" algn="just">
+              <a:buClr>
+                <a:srgbClr val="FFC000"/>
+              </a:buClr>
+              <a:buFont typeface="Wingdings" panose="05000000000000000000" pitchFamily="2" charset="2"/>
+              <a:buChar char="§"/>
+            </a:pPr>
+            <a:r>
+              <a:rPr lang="en-GB" sz="1600" dirty="0"/>
+              <a:t>Define sapient-bind JSON structure</a:t>
+            </a:r>
+          </a:p>
+          <a:p>
+            <a:pPr lvl="1" algn="just">
+              <a:buClr>
+                <a:srgbClr val="FFC000"/>
+              </a:buClr>
+              <a:buFont typeface="Wingdings" panose="05000000000000000000" pitchFamily="2" charset="2"/>
+              <a:buChar char="§"/>
+            </a:pPr>
+            <a:r>
+              <a:rPr lang="en-GB" sz="1600" dirty="0">
+                <a:uFillTx/>
+              </a:rPr>
+              <a:t>Function to create data-bindings with data fech</a:t>
+            </a:r>
+            <a:r>
+              <a:rPr lang="en-GB" sz="1600" dirty="0"/>
+              <a:t>ted from database</a:t>
+            </a:r>
+            <a:endParaRPr lang="en-GB" sz="1600" dirty="0">
+              <a:uFillTx/>
+            </a:endParaRPr>
+          </a:p>
+          <a:p>
+            <a:pPr algn="just">
+              <a:buClr>
+                <a:srgbClr val="FFC000"/>
+              </a:buClr>
+              <a:buFont typeface="Wingdings" panose="05000000000000000000" pitchFamily="2" charset="2"/>
+              <a:buChar char="§"/>
+            </a:pPr>
+            <a:r>
+              <a:rPr lang="en-GB" sz="2000" dirty="0"/>
+              <a:t>Upload button</a:t>
+            </a:r>
+          </a:p>
+          <a:p>
+            <a:pPr lvl="1" algn="just">
+              <a:buClr>
+                <a:srgbClr val="FFC000"/>
+              </a:buClr>
+              <a:buFont typeface="Wingdings" panose="05000000000000000000" pitchFamily="2" charset="2"/>
+              <a:buChar char="§"/>
+            </a:pPr>
+            <a:r>
+              <a:rPr lang="en-GB" sz="1600" dirty="0">
+                <a:uFillTx/>
+              </a:rPr>
+              <a:t>Until now, no way of uploading files from client to the file system found (because of security issues)</a:t>
+            </a:r>
+            <a:endParaRPr lang="en-GB" sz="1400" dirty="0">
+              <a:uFillTx/>
+            </a:endParaRPr>
+          </a:p>
+          <a:p>
+            <a:pPr algn="just"/>
+            <a:endParaRPr lang="en-GB" sz="1400" dirty="0">
+              <a:uFillTx/>
+            </a:endParaRPr>
+          </a:p>
+        </p:txBody>
+      </p:sp>
+    </p:spTree>
+    <p:extLst>
+      <p:ext uri="{BB962C8B-B14F-4D97-AF65-F5344CB8AC3E}">
+        <p14:creationId xmlns:p14="http://schemas.microsoft.com/office/powerpoint/2010/main" val="124425708"/>
+      </p:ext>
+    </p:extLst>
+  </p:cSld>
+  <p:clrMapOvr>
+    <a:masterClrMapping/>
+  </p:clrMapOvr>
+</p:sld>
+</file>
+
+<file path=ppt/slides/slide12.xml><?xml version="1.0" encoding="utf-8"?>
+<p:sld xmlns:a="http://schemas.openxmlformats.org/drawingml/2006/main" xmlns:r="http://schemas.openxmlformats.org/officeDocument/2006/relationships" xmlns:p="http://schemas.openxmlformats.org/presentationml/2006/main">
+  <p:cSld>
+    <p:spTree>
+      <p:nvGrpSpPr>
+        <p:cNvPr id="1" name=""/>
+        <p:cNvGrpSpPr/>
+        <p:nvPr/>
+      </p:nvGrpSpPr>
+      <p:grpSpPr>
+        <a:xfrm>
+          <a:off x="0" y="0"/>
+          <a:ext cx="0" cy="0"/>
+          <a:chOff x="0" y="0"/>
+          <a:chExt cx="0" cy="0"/>
+        </a:xfrm>
+      </p:grpSpPr>
+      <p:sp>
+        <p:nvSpPr>
+          <p:cNvPr id="2" name="Title 1"/>
+          <p:cNvSpPr>
+            <a:spLocks noGrp="1"/>
+          </p:cNvSpPr>
+          <p:nvPr>
+            <p:ph type="title"/>
+          </p:nvPr>
+        </p:nvSpPr>
+        <p:spPr>
+          <a:xfrm>
+            <a:off x="0" y="18255"/>
+            <a:ext cx="12192000" cy="991939"/>
+          </a:xfrm>
+        </p:spPr>
+        <p:txBody>
+          <a:bodyPr>
+            <a:normAutofit/>
+          </a:bodyPr>
+          <a:lstStyle/>
+          <a:p>
+            <a:r>
+              <a:rPr lang="en-US" sz="3200" b="1" dirty="0" err="1">
+                <a:solidFill>
+                  <a:srgbClr val="339966"/>
+                </a:solidFill>
+              </a:rPr>
+              <a:t>Vorläufige</a:t>
+            </a:r>
+            <a:r>
+              <a:rPr lang="en-US" sz="3200" b="1" dirty="0">
+                <a:solidFill>
+                  <a:srgbClr val="339966"/>
+                </a:solidFill>
+              </a:rPr>
+              <a:t> </a:t>
+            </a:r>
+            <a:r>
+              <a:rPr lang="en-US" sz="3200" b="1" dirty="0" err="1">
+                <a:solidFill>
+                  <a:srgbClr val="339966"/>
+                </a:solidFill>
+              </a:rPr>
+              <a:t>Inhaltsverzeichnis</a:t>
+            </a:r>
+            <a:r>
+              <a:rPr lang="en-US" sz="3200" b="1" dirty="0">
+                <a:solidFill>
+                  <a:srgbClr val="339966"/>
+                </a:solidFill>
+                <a:uFillTx/>
+              </a:rPr>
+              <a:t/>
+            </a:r>
+            <a:br>
+              <a:rPr lang="en-US" sz="3200" b="1" dirty="0">
+                <a:solidFill>
+                  <a:srgbClr val="339966"/>
+                </a:solidFill>
+                <a:uFillTx/>
+              </a:rPr>
+            </a:br>
+            <a:r>
+              <a:rPr lang="en-US" sz="1600" b="1" dirty="0">
+                <a:solidFill>
+                  <a:schemeClr val="bg1">
+                    <a:lumMod val="50000"/>
+                  </a:schemeClr>
+                </a:solidFill>
+                <a:uFillTx/>
+              </a:rPr>
+              <a:t>Bachelorarbeit</a:t>
+            </a:r>
+            <a:endParaRPr lang="en-US" sz="3200" dirty="0">
+              <a:solidFill>
+                <a:schemeClr val="bg1">
+                  <a:lumMod val="50000"/>
+                </a:schemeClr>
+              </a:solidFill>
+              <a:uFillTx/>
+            </a:endParaRPr>
+          </a:p>
+        </p:txBody>
+      </p:sp>
+      <p:pic>
+        <p:nvPicPr>
+          <p:cNvPr id="3" name="Picture 2" descr="Image result for gefasoft logo svg"/>
+          <p:cNvPicPr>
+            <a:picLocks noChangeAspect="1" noChangeArrowheads="1"/>
+          </p:cNvPicPr>
+          <p:nvPr/>
+        </p:nvPicPr>
+        <p:blipFill>
+          <a:blip r:embed="rId2" cstate="hqprint"/>
+          <a:srcRect/>
+          <a:stretch>
+            <a:fillRect/>
+          </a:stretch>
+        </p:blipFill>
+        <p:spPr bwMode="auto">
+          <a:xfrm>
+            <a:off x="10413546" y="140804"/>
+            <a:ext cx="1641442" cy="358638"/>
+          </a:xfrm>
+          <a:prstGeom prst="rect">
+            <a:avLst/>
+          </a:prstGeom>
+          <a:noFill/>
+        </p:spPr>
+      </p:pic>
+      <p:sp>
+        <p:nvSpPr>
+          <p:cNvPr id="4" name="Content Placeholder 2"/>
+          <p:cNvSpPr>
+            <a:spLocks noGrp="1"/>
+          </p:cNvSpPr>
+          <p:nvPr>
+            <p:ph idx="1"/>
+          </p:nvPr>
+        </p:nvSpPr>
+        <p:spPr>
+          <a:xfrm>
+            <a:off x="610225" y="1305007"/>
+            <a:ext cx="10949976" cy="5412189"/>
+          </a:xfrm>
+        </p:spPr>
+        <p:txBody>
+          <a:bodyPr>
+            <a:normAutofit/>
+          </a:bodyPr>
+          <a:lstStyle/>
+          <a:p>
+            <a:pPr algn="just">
+              <a:buClr>
+                <a:srgbClr val="FFC000"/>
+              </a:buClr>
+              <a:buFont typeface="Wingdings" panose="05000000000000000000" pitchFamily="2" charset="2"/>
+              <a:buChar char="§"/>
+            </a:pPr>
+            <a:r>
               <a:rPr lang="en-GB" sz="2000" dirty="0">
                 <a:uFillTx/>
               </a:rPr>
@@ -3964,7 +4867,7 @@
 </p:sld>
 </file>
 
-<file path=ppt/slides/slide12.xml><?xml version="1.0" encoding="utf-8"?>
+<file path=ppt/slides/slide13.xml><?xml version="1.0" encoding="utf-8"?>
 <p:sld xmlns:a="http://schemas.openxmlformats.org/drawingml/2006/main" xmlns:r="http://schemas.openxmlformats.org/officeDocument/2006/relationships" xmlns:p="http://schemas.openxmlformats.org/presentationml/2006/main">
   <p:cSld>
     <p:spTree>
@@ -4467,6 +5370,15 @@
                 <a:uFillTx/>
               </a:rPr>
               <a:t>Boardlet</a:t>
+            </a:r>
+            <a:r>
+              <a:rPr lang="en-US" sz="3200" b="1" dirty="0">
+                <a:solidFill>
+                  <a:srgbClr val="339966"/>
+                </a:solidFill>
+                <a:uFillTx/>
+              </a:rPr>
+              <a:t/>
             </a:r>
             <a:br>
               <a:rPr lang="en-US" sz="3200" b="1" dirty="0">
@@ -6166,6 +7078,15 @@
               </a:rPr>
               <a:t>Simplification of Edges</a:t>
             </a:r>
+            <a:r>
+              <a:rPr lang="en-GB" sz="3200" b="1" dirty="0">
+                <a:solidFill>
+                  <a:srgbClr val="339966"/>
+                </a:solidFill>
+                <a:uFillTx/>
+              </a:rPr>
+              <a:t/>
+            </a:r>
             <a:br>
               <a:rPr lang="en-GB" sz="3200" b="1" dirty="0">
                 <a:solidFill>
@@ -6555,6 +7476,170 @@
 </file>
 
 <file path=ppt/slides/slide7.xml><?xml version="1.0" encoding="utf-8"?>
+<p:sld xmlns:a="http://schemas.openxmlformats.org/drawingml/2006/main" xmlns:r="http://schemas.openxmlformats.org/officeDocument/2006/relationships" xmlns:p="http://schemas.openxmlformats.org/presentationml/2006/main">
+  <p:cSld>
+    <p:spTree>
+      <p:nvGrpSpPr>
+        <p:cNvPr id="1" name=""/>
+        <p:cNvGrpSpPr/>
+        <p:nvPr/>
+      </p:nvGrpSpPr>
+      <p:grpSpPr>
+        <a:xfrm>
+          <a:off x="0" y="0"/>
+          <a:ext cx="0" cy="0"/>
+          <a:chOff x="0" y="0"/>
+          <a:chExt cx="0" cy="0"/>
+        </a:xfrm>
+      </p:grpSpPr>
+      <p:sp>
+        <p:nvSpPr>
+          <p:cNvPr id="2" name="Title 1"/>
+          <p:cNvSpPr>
+            <a:spLocks noGrp="1"/>
+          </p:cNvSpPr>
+          <p:nvPr>
+            <p:ph type="title"/>
+          </p:nvPr>
+        </p:nvSpPr>
+        <p:spPr>
+          <a:xfrm>
+            <a:off x="0" y="18255"/>
+            <a:ext cx="12192000" cy="991939"/>
+          </a:xfrm>
+        </p:spPr>
+        <p:txBody>
+          <a:bodyPr>
+            <a:normAutofit/>
+          </a:bodyPr>
+          <a:lstStyle/>
+          <a:p>
+            <a:r>
+              <a:rPr lang="en-GB" sz="3200" b="1" dirty="0">
+                <a:solidFill>
+                  <a:srgbClr val="339966"/>
+                </a:solidFill>
+              </a:rPr>
+              <a:t>L</a:t>
+            </a:r>
+            <a:r>
+              <a:rPr lang="en-GB" sz="3200" b="1" dirty="0" smtClean="0">
+                <a:solidFill>
+                  <a:srgbClr val="339966"/>
+                </a:solidFill>
+                <a:uFillTx/>
+              </a:rPr>
+              <a:t>ine Jumps</a:t>
+            </a:r>
+            <a:r>
+              <a:rPr lang="en-GB" sz="3200" b="1" dirty="0">
+                <a:solidFill>
+                  <a:srgbClr val="339966"/>
+                </a:solidFill>
+                <a:uFillTx/>
+              </a:rPr>
+              <a:t/>
+            </a:r>
+            <a:br>
+              <a:rPr lang="en-GB" sz="3200" b="1" dirty="0">
+                <a:solidFill>
+                  <a:srgbClr val="339966"/>
+                </a:solidFill>
+                <a:uFillTx/>
+              </a:rPr>
+            </a:br>
+            <a:r>
+              <a:rPr lang="en-GB" sz="1600" b="1" dirty="0" smtClean="0">
+                <a:solidFill>
+                  <a:schemeClr val="bg1">
+                    <a:lumMod val="50000"/>
+                  </a:schemeClr>
+                </a:solidFill>
+                <a:uFillTx/>
+              </a:rPr>
+              <a:t>Example: </a:t>
+            </a:r>
+            <a:endParaRPr lang="en-GB" sz="3200" dirty="0">
+              <a:solidFill>
+                <a:schemeClr val="bg1">
+                  <a:lumMod val="50000"/>
+                </a:schemeClr>
+              </a:solidFill>
+              <a:uFillTx/>
+            </a:endParaRPr>
+          </a:p>
+        </p:txBody>
+      </p:sp>
+      <p:pic>
+        <p:nvPicPr>
+          <p:cNvPr id="9" name="Picture 2" descr="Image result for gefasoft logo svg"/>
+          <p:cNvPicPr>
+            <a:picLocks noChangeAspect="1" noChangeArrowheads="1"/>
+          </p:cNvPicPr>
+          <p:nvPr/>
+        </p:nvPicPr>
+        <p:blipFill>
+          <a:blip r:embed="rId2" cstate="hqprint"/>
+          <a:srcRect/>
+          <a:stretch>
+            <a:fillRect/>
+          </a:stretch>
+        </p:blipFill>
+        <p:spPr bwMode="auto">
+          <a:xfrm>
+            <a:off x="10413546" y="140804"/>
+            <a:ext cx="1641442" cy="358638"/>
+          </a:xfrm>
+          <a:prstGeom prst="rect">
+            <a:avLst/>
+          </a:prstGeom>
+          <a:noFill/>
+        </p:spPr>
+      </p:pic>
+      <p:pic>
+        <p:nvPicPr>
+          <p:cNvPr id="4" name="Grafik 3"/>
+          <p:cNvPicPr>
+            <a:picLocks noChangeAspect="1"/>
+          </p:cNvPicPr>
+          <p:nvPr/>
+        </p:nvPicPr>
+        <p:blipFill>
+          <a:blip r:embed="rId3">
+            <a:extLst>
+              <a:ext uri="{28A0092B-C50C-407E-A947-70E740481C1C}">
+                <a14:useLocalDpi xmlns:a14="http://schemas.microsoft.com/office/drawing/2010/main" val="0"/>
+              </a:ext>
+            </a:extLst>
+          </a:blip>
+          <a:stretch>
+            <a:fillRect/>
+          </a:stretch>
+        </p:blipFill>
+        <p:spPr>
+          <a:xfrm>
+            <a:off x="2984442" y="1719869"/>
+            <a:ext cx="5657850" cy="4781550"/>
+          </a:xfrm>
+          <a:prstGeom prst="rect">
+            <a:avLst/>
+          </a:prstGeom>
+        </p:spPr>
+      </p:pic>
+    </p:spTree>
+    <p:extLst>
+      <p:ext uri="{BB962C8B-B14F-4D97-AF65-F5344CB8AC3E}">
+        <p14:creationId xmlns:p14="http://schemas.microsoft.com/office/powerpoint/2010/main" val="82128592"/>
+      </p:ext>
+    </p:extLst>
+  </p:cSld>
+  <p:clrMapOvr>
+    <a:masterClrMapping/>
+  </p:clrMapOvr>
+</p:sld>
+</file>
+
+<file path=ppt/slides/slide8.xml><?xml version="1.0" encoding="utf-8"?>
 <p:sld xmlns:a="http://schemas.openxmlformats.org/drawingml/2006/main" xmlns:r="http://schemas.openxmlformats.org/officeDocument/2006/relationships" xmlns:p="http://schemas.openxmlformats.org/presentationml/2006/main">
   <p:cSld>
     <p:spTree>
@@ -6689,7 +7774,7 @@
 </p:sld>
 </file>
 
-<file path=ppt/slides/slide8.xml><?xml version="1.0" encoding="utf-8"?>
+<file path=ppt/slides/slide9.xml><?xml version="1.0" encoding="utf-8"?>
 <p:sld xmlns:a="http://schemas.openxmlformats.org/drawingml/2006/main" xmlns:r="http://schemas.openxmlformats.org/officeDocument/2006/relationships" xmlns:p="http://schemas.openxmlformats.org/presentationml/2006/main">
   <p:cSld>
     <p:spTree>
@@ -6836,881 +7921,6 @@
     <p:extLst>
       <p:ext uri="{BB962C8B-B14F-4D97-AF65-F5344CB8AC3E}">
         <p14:creationId xmlns:p14="http://schemas.microsoft.com/office/powerpoint/2010/main" val="470790626"/>
-      </p:ext>
-    </p:extLst>
-  </p:cSld>
-  <p:clrMapOvr>
-    <a:masterClrMapping/>
-  </p:clrMapOvr>
-</p:sld>
-</file>
-
-<file path=ppt/slides/slide9.xml><?xml version="1.0" encoding="utf-8"?>
-<p:sld xmlns:a="http://schemas.openxmlformats.org/drawingml/2006/main" xmlns:r="http://schemas.openxmlformats.org/officeDocument/2006/relationships" xmlns:p="http://schemas.openxmlformats.org/presentationml/2006/main">
-  <p:cSld>
-    <p:spTree>
-      <p:nvGrpSpPr>
-        <p:cNvPr id="1" name=""/>
-        <p:cNvGrpSpPr/>
-        <p:nvPr/>
-      </p:nvGrpSpPr>
-      <p:grpSpPr>
-        <a:xfrm>
-          <a:off x="0" y="0"/>
-          <a:ext cx="0" cy="0"/>
-          <a:chOff x="0" y="0"/>
-          <a:chExt cx="0" cy="0"/>
-        </a:xfrm>
-      </p:grpSpPr>
-      <p:sp>
-        <p:nvSpPr>
-          <p:cNvPr id="2" name="Title 1"/>
-          <p:cNvSpPr>
-            <a:spLocks noGrp="1"/>
-          </p:cNvSpPr>
-          <p:nvPr>
-            <p:ph type="title"/>
-          </p:nvPr>
-        </p:nvSpPr>
-        <p:spPr>
-          <a:xfrm>
-            <a:off x="0" y="18255"/>
-            <a:ext cx="12192000" cy="991939"/>
-          </a:xfrm>
-        </p:spPr>
-        <p:txBody>
-          <a:bodyPr>
-            <a:normAutofit/>
-          </a:bodyPr>
-          <a:lstStyle/>
-          <a:p>
-            <a:r>
-              <a:rPr lang="en-US" sz="3200" b="1" dirty="0">
-                <a:solidFill>
-                  <a:srgbClr val="339966"/>
-                </a:solidFill>
-              </a:rPr>
-              <a:t>Issues and Challenges</a:t>
-            </a:r>
-            <a:br>
-              <a:rPr lang="en-US" sz="3200" b="1" dirty="0">
-                <a:solidFill>
-                  <a:srgbClr val="339966"/>
-                </a:solidFill>
-                <a:uFillTx/>
-              </a:rPr>
-            </a:br>
-            <a:r>
-              <a:rPr lang="en-US" sz="1600" b="1" dirty="0">
-                <a:solidFill>
-                  <a:schemeClr val="bg1">
-                    <a:lumMod val="50000"/>
-                  </a:schemeClr>
-                </a:solidFill>
-                <a:uFillTx/>
-              </a:rPr>
-              <a:t>Weekly Sprint 14</a:t>
-            </a:r>
-            <a:endParaRPr lang="en-US" sz="3200" dirty="0">
-              <a:solidFill>
-                <a:schemeClr val="bg1">
-                  <a:lumMod val="50000"/>
-                </a:schemeClr>
-              </a:solidFill>
-              <a:uFillTx/>
-            </a:endParaRPr>
-          </a:p>
-        </p:txBody>
-      </p:sp>
-      <p:pic>
-        <p:nvPicPr>
-          <p:cNvPr id="3" name="Picture 2" descr="Image result for gefasoft logo svg"/>
-          <p:cNvPicPr>
-            <a:picLocks noChangeAspect="1" noChangeArrowheads="1"/>
-          </p:cNvPicPr>
-          <p:nvPr/>
-        </p:nvPicPr>
-        <p:blipFill>
-          <a:blip r:embed="rId2" cstate="hqprint"/>
-          <a:srcRect/>
-          <a:stretch>
-            <a:fillRect/>
-          </a:stretch>
-        </p:blipFill>
-        <p:spPr bwMode="auto">
-          <a:xfrm>
-            <a:off x="10413546" y="140804"/>
-            <a:ext cx="1641442" cy="358638"/>
-          </a:xfrm>
-          <a:prstGeom prst="rect">
-            <a:avLst/>
-          </a:prstGeom>
-          <a:noFill/>
-        </p:spPr>
-      </p:pic>
-      <p:sp>
-        <p:nvSpPr>
-          <p:cNvPr id="4" name="Content Placeholder 2"/>
-          <p:cNvSpPr>
-            <a:spLocks noGrp="1"/>
-          </p:cNvSpPr>
-          <p:nvPr>
-            <p:ph idx="1"/>
-          </p:nvPr>
-        </p:nvSpPr>
-        <p:spPr>
-          <a:xfrm>
-            <a:off x="610225" y="1305007"/>
-            <a:ext cx="10949976" cy="5412189"/>
-          </a:xfrm>
-        </p:spPr>
-        <p:txBody>
-          <a:bodyPr>
-            <a:normAutofit/>
-          </a:bodyPr>
-          <a:lstStyle/>
-          <a:p>
-            <a:pPr algn="just">
-              <a:buClr>
-                <a:srgbClr val="FFC000"/>
-              </a:buClr>
-              <a:buFont typeface="Wingdings" panose="05000000000000000000" pitchFamily="2" charset="2"/>
-              <a:buChar char="§"/>
-            </a:pPr>
-            <a:r>
-              <a:rPr lang="en-GB" sz="2000" dirty="0" err="1"/>
-              <a:t>Stillstand</a:t>
-            </a:r>
-            <a:r>
-              <a:rPr lang="en-GB" sz="2000" dirty="0"/>
-              <a:t> </a:t>
-            </a:r>
-            <a:r>
-              <a:rPr lang="en-GB" sz="2000" dirty="0" err="1"/>
-              <a:t>beim</a:t>
-            </a:r>
-            <a:r>
-              <a:rPr lang="en-GB" sz="2000" dirty="0"/>
-              <a:t> </a:t>
-            </a:r>
-            <a:r>
-              <a:rPr lang="en-GB" sz="2000" dirty="0" err="1"/>
-              <a:t>vertexPlacement</a:t>
-            </a:r>
-            <a:r>
-              <a:rPr lang="en-GB" sz="2000" dirty="0"/>
-              <a:t> </a:t>
-            </a:r>
-            <a:r>
-              <a:rPr lang="en-GB" sz="2000" dirty="0" err="1"/>
-              <a:t>Algorithmus</a:t>
-            </a:r>
-            <a:endParaRPr lang="en-GB" sz="2000" dirty="0"/>
-          </a:p>
-          <a:p>
-            <a:pPr lvl="1" algn="just">
-              <a:buClr>
-                <a:srgbClr val="FFC000"/>
-              </a:buClr>
-              <a:buFont typeface="Wingdings" panose="05000000000000000000" pitchFamily="2" charset="2"/>
-              <a:buChar char="§"/>
-            </a:pPr>
-            <a:r>
-              <a:rPr lang="en-GB" sz="1600" dirty="0" err="1">
-                <a:uFillTx/>
-              </a:rPr>
-              <a:t>Alles</a:t>
-            </a:r>
-            <a:r>
-              <a:rPr lang="en-GB" sz="1600" dirty="0">
-                <a:uFillTx/>
-              </a:rPr>
-              <a:t> </a:t>
-            </a:r>
-            <a:r>
-              <a:rPr lang="en-GB" sz="1600" dirty="0" err="1">
-                <a:uFillTx/>
-              </a:rPr>
-              <a:t>wofür</a:t>
-            </a:r>
-            <a:r>
-              <a:rPr lang="en-GB" sz="1600" dirty="0">
-                <a:uFillTx/>
-              </a:rPr>
-              <a:t> </a:t>
-            </a:r>
-            <a:r>
-              <a:rPr lang="en-GB" sz="1600" dirty="0" err="1">
-                <a:uFillTx/>
-              </a:rPr>
-              <a:t>es</a:t>
-            </a:r>
-            <a:r>
-              <a:rPr lang="en-GB" sz="1600" dirty="0">
-                <a:uFillTx/>
-              </a:rPr>
-              <a:t> </a:t>
-            </a:r>
-            <a:r>
-              <a:rPr lang="en-GB" sz="1600" dirty="0" err="1">
-                <a:uFillTx/>
-              </a:rPr>
-              <a:t>eine</a:t>
-            </a:r>
-            <a:r>
-              <a:rPr lang="en-GB" sz="1600" dirty="0">
-                <a:uFillTx/>
-              </a:rPr>
-              <a:t> </a:t>
-            </a:r>
-            <a:r>
-              <a:rPr lang="en-GB" sz="1600" dirty="0" err="1">
-                <a:uFillTx/>
-              </a:rPr>
-              <a:t>bestimmte</a:t>
-            </a:r>
-            <a:r>
-              <a:rPr lang="en-GB" sz="1600" dirty="0">
-                <a:uFillTx/>
-              </a:rPr>
-              <a:t> </a:t>
-            </a:r>
-            <a:r>
-              <a:rPr lang="en-GB" sz="1600" dirty="0" err="1">
-                <a:uFillTx/>
-              </a:rPr>
-              <a:t>Logik</a:t>
-            </a:r>
-            <a:r>
-              <a:rPr lang="en-GB" sz="1600" dirty="0">
-                <a:uFillTx/>
-              </a:rPr>
-              <a:t> </a:t>
-            </a:r>
-            <a:r>
-              <a:rPr lang="en-GB" sz="1600" dirty="0" err="1">
-                <a:uFillTx/>
-              </a:rPr>
-              <a:t>dahinter</a:t>
-            </a:r>
-            <a:r>
-              <a:rPr lang="en-GB" sz="1600" dirty="0">
-                <a:uFillTx/>
-              </a:rPr>
-              <a:t> </a:t>
-            </a:r>
-            <a:r>
-              <a:rPr lang="en-GB" sz="1600" dirty="0" err="1">
-                <a:uFillTx/>
-              </a:rPr>
-              <a:t>gibt</a:t>
-            </a:r>
-            <a:r>
-              <a:rPr lang="en-GB" sz="1600" dirty="0">
-                <a:uFillTx/>
-              </a:rPr>
-              <a:t>, </a:t>
-            </a:r>
-            <a:r>
-              <a:rPr lang="en-GB" sz="1600" dirty="0" err="1">
-                <a:uFillTx/>
-              </a:rPr>
-              <a:t>wird</a:t>
-            </a:r>
-            <a:r>
-              <a:rPr lang="en-GB" sz="1600" dirty="0">
-                <a:uFillTx/>
-              </a:rPr>
-              <a:t> </a:t>
-            </a:r>
-            <a:r>
-              <a:rPr lang="en-GB" sz="1600" dirty="0" err="1">
-                <a:uFillTx/>
-              </a:rPr>
-              <a:t>schon</a:t>
-            </a:r>
-            <a:r>
-              <a:rPr lang="en-GB" sz="1600" dirty="0">
-                <a:uFillTx/>
-              </a:rPr>
-              <a:t> </a:t>
-            </a:r>
-            <a:r>
-              <a:rPr lang="en-GB" sz="1600" dirty="0" err="1">
-                <a:uFillTx/>
-              </a:rPr>
-              <a:t>entsprechend</a:t>
-            </a:r>
-            <a:r>
-              <a:rPr lang="en-GB" sz="1600" dirty="0">
-                <a:uFillTx/>
-              </a:rPr>
-              <a:t> </a:t>
-            </a:r>
-            <a:r>
-              <a:rPr lang="en-GB" sz="1600" dirty="0" err="1">
-                <a:uFillTx/>
-              </a:rPr>
-              <a:t>dieser</a:t>
-            </a:r>
-            <a:r>
-              <a:rPr lang="en-GB" sz="1600" dirty="0">
-                <a:uFillTx/>
-              </a:rPr>
-              <a:t> </a:t>
-            </a:r>
-            <a:r>
-              <a:rPr lang="en-GB" sz="1600" dirty="0" err="1">
-                <a:uFillTx/>
-              </a:rPr>
-              <a:t>Logik</a:t>
-            </a:r>
-            <a:r>
-              <a:rPr lang="en-GB" sz="1600" dirty="0">
-                <a:uFillTx/>
-              </a:rPr>
-              <a:t> </a:t>
-            </a:r>
-            <a:r>
-              <a:rPr lang="en-GB" sz="1600" dirty="0" err="1">
-                <a:uFillTx/>
-              </a:rPr>
-              <a:t>platziert</a:t>
-            </a:r>
-            <a:r>
-              <a:rPr lang="en-GB" sz="1600" dirty="0">
-                <a:uFillTx/>
-              </a:rPr>
-              <a:t>.</a:t>
-            </a:r>
-          </a:p>
-          <a:p>
-            <a:pPr lvl="1" algn="just">
-              <a:buClr>
-                <a:srgbClr val="FFC000"/>
-              </a:buClr>
-              <a:buFont typeface="Wingdings" panose="05000000000000000000" pitchFamily="2" charset="2"/>
-              <a:buChar char="§"/>
-            </a:pPr>
-            <a:r>
-              <a:rPr lang="en-GB" sz="1600" dirty="0" err="1"/>
-              <a:t>Nich</a:t>
-            </a:r>
-            <a:r>
-              <a:rPr lang="en-GB" sz="1600" dirty="0"/>
-              <a:t> </a:t>
-            </a:r>
-            <a:r>
-              <a:rPr lang="en-GB" sz="1600" dirty="0" err="1"/>
-              <a:t>viel</a:t>
-            </a:r>
-            <a:r>
-              <a:rPr lang="en-GB" sz="1600" dirty="0"/>
-              <a:t> </a:t>
-            </a:r>
-            <a:r>
-              <a:rPr lang="en-GB" sz="1600" dirty="0" err="1"/>
-              <a:t>mehr</a:t>
-            </a:r>
-            <a:r>
-              <a:rPr lang="en-GB" sz="1600" dirty="0"/>
-              <a:t> </a:t>
-            </a:r>
-            <a:r>
-              <a:rPr lang="en-GB" sz="1600" dirty="0" err="1"/>
-              <a:t>Logik</a:t>
-            </a:r>
-            <a:r>
-              <a:rPr lang="en-GB" sz="1600" dirty="0"/>
-              <a:t> um das </a:t>
-            </a:r>
-            <a:r>
-              <a:rPr lang="en-GB" sz="1600" dirty="0" err="1"/>
-              <a:t>Platzierungsalgorithmus</a:t>
-            </a:r>
-            <a:r>
-              <a:rPr lang="en-GB" sz="1600" dirty="0"/>
-              <a:t> in </a:t>
-            </a:r>
-            <a:r>
-              <a:rPr lang="en-GB" sz="1600" dirty="0" err="1"/>
-              <a:t>wenig</a:t>
-            </a:r>
-            <a:r>
-              <a:rPr lang="en-GB" sz="1600" dirty="0"/>
-              <a:t> </a:t>
-            </a:r>
-            <a:r>
-              <a:rPr lang="en-GB" sz="1600" dirty="0" err="1"/>
-              <a:t>Zeit</a:t>
-            </a:r>
-            <a:r>
-              <a:rPr lang="en-GB" sz="1600" dirty="0"/>
-              <a:t> </a:t>
-            </a:r>
-            <a:r>
-              <a:rPr lang="en-GB" sz="1600" dirty="0" err="1"/>
-              <a:t>noch</a:t>
-            </a:r>
-            <a:r>
-              <a:rPr lang="en-GB" sz="1600" dirty="0"/>
-              <a:t> </a:t>
-            </a:r>
-            <a:r>
-              <a:rPr lang="en-GB" sz="1600" dirty="0" err="1"/>
-              <a:t>zu</a:t>
-            </a:r>
-            <a:r>
-              <a:rPr lang="en-GB" sz="1600" dirty="0"/>
-              <a:t> </a:t>
-            </a:r>
-            <a:r>
-              <a:rPr lang="en-GB" sz="1600" dirty="0" err="1"/>
-              <a:t>verbessern</a:t>
-            </a:r>
-            <a:r>
-              <a:rPr lang="en-GB" sz="1600" dirty="0"/>
-              <a:t>.</a:t>
-            </a:r>
-          </a:p>
-          <a:p>
-            <a:pPr lvl="1" algn="just">
-              <a:buClr>
-                <a:srgbClr val="FFC000"/>
-              </a:buClr>
-              <a:buFont typeface="Wingdings" panose="05000000000000000000" pitchFamily="2" charset="2"/>
-              <a:buChar char="§"/>
-            </a:pPr>
-            <a:r>
-              <a:rPr lang="en-GB" sz="1600" u="sng" dirty="0" err="1"/>
-              <a:t>Vorteile</a:t>
-            </a:r>
-            <a:r>
-              <a:rPr lang="en-GB" sz="1600" dirty="0"/>
-              <a:t>:</a:t>
-            </a:r>
-          </a:p>
-          <a:p>
-            <a:pPr lvl="2" algn="just">
-              <a:buClr>
-                <a:srgbClr val="FFC000"/>
-              </a:buClr>
-              <a:buFont typeface="Wingdings" panose="05000000000000000000" pitchFamily="2" charset="2"/>
-              <a:buChar char="§"/>
-            </a:pPr>
-            <a:r>
-              <a:rPr lang="en-GB" sz="1600" dirty="0" err="1"/>
-              <a:t>Konzentration</a:t>
-            </a:r>
-            <a:r>
-              <a:rPr lang="en-GB" sz="1600" dirty="0"/>
-              <a:t> auf Data-bindings (</a:t>
-            </a:r>
-            <a:r>
-              <a:rPr lang="en-GB" sz="1600" dirty="0" err="1"/>
-              <a:t>dynamisierung</a:t>
-            </a:r>
-            <a:r>
-              <a:rPr lang="en-GB" sz="1600" dirty="0"/>
-              <a:t>)</a:t>
-            </a:r>
-          </a:p>
-          <a:p>
-            <a:pPr lvl="2" algn="just">
-              <a:buClr>
-                <a:srgbClr val="FFC000"/>
-              </a:buClr>
-              <a:buFont typeface="Wingdings" panose="05000000000000000000" pitchFamily="2" charset="2"/>
-              <a:buChar char="§"/>
-            </a:pPr>
-            <a:r>
-              <a:rPr lang="en-GB" sz="1600" dirty="0" err="1"/>
-              <a:t>Verteci</a:t>
-            </a:r>
-            <a:r>
-              <a:rPr lang="en-GB" sz="1600" dirty="0"/>
-              <a:t> </a:t>
-            </a:r>
-            <a:r>
-              <a:rPr lang="en-GB" sz="1600" dirty="0" err="1"/>
-              <a:t>schon</a:t>
-            </a:r>
-            <a:r>
-              <a:rPr lang="en-GB" sz="1600" dirty="0"/>
-              <a:t> </a:t>
-            </a:r>
-            <a:r>
-              <a:rPr lang="en-GB" sz="1600" dirty="0" err="1"/>
-              <a:t>ziemlich</a:t>
-            </a:r>
-            <a:r>
-              <a:rPr lang="en-GB" sz="1600" dirty="0"/>
-              <a:t> gut </a:t>
-            </a:r>
-            <a:r>
-              <a:rPr lang="en-GB" sz="1600" dirty="0" err="1"/>
-              <a:t>platziert</a:t>
-            </a:r>
-            <a:r>
-              <a:rPr lang="en-GB" sz="1600" dirty="0"/>
-              <a:t> und edges </a:t>
-            </a:r>
-            <a:r>
-              <a:rPr lang="en-GB" sz="1600" dirty="0" err="1"/>
-              <a:t>vereinfacht</a:t>
-            </a:r>
-            <a:endParaRPr lang="en-GB" sz="1600" dirty="0"/>
-          </a:p>
-          <a:p>
-            <a:pPr lvl="2" algn="just">
-              <a:buClr>
-                <a:srgbClr val="FFC000"/>
-              </a:buClr>
-              <a:buFont typeface="Wingdings" panose="05000000000000000000" pitchFamily="2" charset="2"/>
-              <a:buChar char="§"/>
-            </a:pPr>
-            <a:r>
-              <a:rPr lang="en-GB" sz="1600" dirty="0" err="1"/>
-              <a:t>Verbesserungsmöglichkeiten</a:t>
-            </a:r>
-            <a:r>
-              <a:rPr lang="en-GB" sz="1600" dirty="0"/>
-              <a:t> </a:t>
-            </a:r>
-            <a:r>
-              <a:rPr lang="en-GB" sz="1600" dirty="0" err="1"/>
-              <a:t>direkt</a:t>
-            </a:r>
-            <a:r>
-              <a:rPr lang="en-GB" sz="1600" dirty="0"/>
-              <a:t> </a:t>
-            </a:r>
-            <a:r>
-              <a:rPr lang="en-GB" sz="1600" dirty="0" err="1"/>
-              <a:t>im</a:t>
-            </a:r>
-            <a:r>
-              <a:rPr lang="en-GB" sz="1600" dirty="0"/>
-              <a:t> draw.io (</a:t>
-            </a:r>
-            <a:r>
-              <a:rPr lang="en-GB" sz="1600" dirty="0" err="1"/>
-              <a:t>Drag&amp;Drop</a:t>
-            </a:r>
-            <a:r>
-              <a:rPr lang="en-GB" sz="1600" dirty="0"/>
-              <a:t>)</a:t>
-            </a:r>
-          </a:p>
-          <a:p>
-            <a:pPr lvl="1" algn="just">
-              <a:buClr>
-                <a:srgbClr val="FFC000"/>
-              </a:buClr>
-              <a:buFont typeface="Wingdings" panose="05000000000000000000" pitchFamily="2" charset="2"/>
-              <a:buChar char="§"/>
-            </a:pPr>
-            <a:r>
-              <a:rPr lang="en-GB" sz="1600" u="sng" dirty="0" err="1">
-                <a:uFillTx/>
-              </a:rPr>
-              <a:t>Nachteile</a:t>
-            </a:r>
-            <a:r>
-              <a:rPr lang="en-GB" sz="1600" dirty="0">
-                <a:uFillTx/>
-              </a:rPr>
-              <a:t>: </a:t>
-            </a:r>
-          </a:p>
-          <a:p>
-            <a:pPr lvl="2" algn="just">
-              <a:buClr>
-                <a:srgbClr val="FFC000"/>
-              </a:buClr>
-              <a:buFont typeface="Wingdings" panose="05000000000000000000" pitchFamily="2" charset="2"/>
-              <a:buChar char="§"/>
-            </a:pPr>
-            <a:r>
-              <a:rPr lang="en-GB" sz="1600" dirty="0" err="1"/>
-              <a:t>Platzierung</a:t>
-            </a:r>
-            <a:r>
-              <a:rPr lang="en-GB" sz="1600" dirty="0"/>
-              <a:t> </a:t>
-            </a:r>
-            <a:r>
-              <a:rPr lang="en-GB" sz="1600" dirty="0" err="1"/>
-              <a:t>ist</a:t>
-            </a:r>
-            <a:r>
-              <a:rPr lang="en-GB" sz="1600" dirty="0"/>
-              <a:t> das </a:t>
-            </a:r>
-            <a:r>
-              <a:rPr lang="en-GB" sz="1600" dirty="0" err="1"/>
-              <a:t>Endergebniss</a:t>
-            </a:r>
-            <a:r>
-              <a:rPr lang="en-GB" sz="1600" dirty="0"/>
-              <a:t> und </a:t>
-            </a:r>
-            <a:r>
-              <a:rPr lang="en-GB" sz="1600" dirty="0" err="1"/>
-              <a:t>alles</a:t>
-            </a:r>
-            <a:r>
-              <a:rPr lang="en-GB" sz="1600" dirty="0"/>
-              <a:t> was man am Ende </a:t>
-            </a:r>
-            <a:r>
-              <a:rPr lang="en-GB" sz="1600" dirty="0" err="1"/>
-              <a:t>sieht</a:t>
-            </a:r>
-            <a:endParaRPr lang="en-GB" sz="1600" dirty="0"/>
-          </a:p>
-          <a:p>
-            <a:pPr lvl="2" algn="just">
-              <a:buClr>
-                <a:srgbClr val="FFC000"/>
-              </a:buClr>
-              <a:buFont typeface="Wingdings" panose="05000000000000000000" pitchFamily="2" charset="2"/>
-              <a:buChar char="§"/>
-            </a:pPr>
-            <a:r>
-              <a:rPr lang="en-GB" sz="1600" dirty="0"/>
-              <a:t>Arbeit und </a:t>
-            </a:r>
-            <a:r>
-              <a:rPr lang="en-GB" sz="1600" dirty="0" err="1"/>
-              <a:t>Aufwand</a:t>
-            </a:r>
-            <a:r>
-              <a:rPr lang="en-GB" sz="1600" dirty="0"/>
-              <a:t> die </a:t>
-            </a:r>
-            <a:r>
-              <a:rPr lang="en-GB" sz="1600" dirty="0" err="1"/>
-              <a:t>hinter</a:t>
-            </a:r>
-            <a:r>
-              <a:rPr lang="en-GB" sz="1600" dirty="0"/>
-              <a:t> die </a:t>
-            </a:r>
-            <a:r>
-              <a:rPr lang="en-GB" sz="1600" dirty="0" err="1"/>
-              <a:t>Visualisierung</a:t>
-            </a:r>
-            <a:r>
-              <a:rPr lang="en-GB" sz="1600" dirty="0"/>
-              <a:t> </a:t>
-            </a:r>
-            <a:r>
-              <a:rPr lang="en-GB" sz="1600" dirty="0" err="1"/>
-              <a:t>sieht</a:t>
-            </a:r>
-            <a:r>
-              <a:rPr lang="en-GB" sz="1600" dirty="0"/>
-              <a:t> man </a:t>
-            </a:r>
-            <a:r>
-              <a:rPr lang="en-GB" sz="1600" dirty="0" err="1"/>
-              <a:t>nicht</a:t>
-            </a:r>
-            <a:endParaRPr lang="en-GB" sz="1600" dirty="0"/>
-          </a:p>
-          <a:p>
-            <a:pPr lvl="2" algn="just">
-              <a:buClr>
-                <a:srgbClr val="FFC000"/>
-              </a:buClr>
-              <a:buFont typeface="Wingdings" panose="05000000000000000000" pitchFamily="2" charset="2"/>
-              <a:buChar char="§"/>
-            </a:pPr>
-            <a:r>
-              <a:rPr lang="en-GB" sz="1600" dirty="0" err="1"/>
-              <a:t>Kann</a:t>
-            </a:r>
-            <a:r>
-              <a:rPr lang="en-GB" sz="1600" dirty="0"/>
-              <a:t> </a:t>
-            </a:r>
-            <a:r>
-              <a:rPr lang="en-GB" sz="1600" dirty="0" err="1"/>
-              <a:t>zu</a:t>
-            </a:r>
-            <a:r>
-              <a:rPr lang="en-GB" sz="1600" dirty="0"/>
-              <a:t> </a:t>
-            </a:r>
-            <a:r>
-              <a:rPr lang="en-GB" sz="1600" dirty="0" err="1"/>
-              <a:t>enttäuschende</a:t>
-            </a:r>
-            <a:r>
-              <a:rPr lang="en-GB" sz="1600" dirty="0"/>
-              <a:t> </a:t>
-            </a:r>
-            <a:r>
-              <a:rPr lang="en-GB" sz="1600" dirty="0" err="1"/>
-              <a:t>Schlussfolgerungen</a:t>
-            </a:r>
-            <a:r>
-              <a:rPr lang="en-GB" sz="1600" dirty="0"/>
-              <a:t> </a:t>
-            </a:r>
-            <a:r>
-              <a:rPr lang="en-GB" sz="1600" dirty="0" err="1"/>
-              <a:t>bezüglich</a:t>
-            </a:r>
-            <a:r>
-              <a:rPr lang="en-GB" sz="1600" dirty="0"/>
-              <a:t> des </a:t>
-            </a:r>
-            <a:r>
-              <a:rPr lang="en-GB" sz="1600" dirty="0" err="1"/>
-              <a:t>Projekts</a:t>
-            </a:r>
-            <a:r>
-              <a:rPr lang="en-GB" sz="1600" dirty="0"/>
-              <a:t> </a:t>
-            </a:r>
-            <a:r>
-              <a:rPr lang="en-GB" sz="1600" dirty="0" err="1"/>
-              <a:t>führen</a:t>
-            </a:r>
-            <a:endParaRPr lang="en-GB" sz="1600" dirty="0"/>
-          </a:p>
-          <a:p>
-            <a:pPr algn="just">
-              <a:buClr>
-                <a:srgbClr val="FFC000"/>
-              </a:buClr>
-              <a:buFont typeface="Wingdings" panose="05000000000000000000" pitchFamily="2" charset="2"/>
-              <a:buChar char="§"/>
-            </a:pPr>
-            <a:r>
-              <a:rPr lang="en-GB" sz="2000" dirty="0">
-                <a:uFillTx/>
-              </a:rPr>
-              <a:t>Animations via sapient-bind</a:t>
-            </a:r>
-          </a:p>
-          <a:p>
-            <a:pPr lvl="1" algn="just">
-              <a:buClr>
-                <a:srgbClr val="FFC000"/>
-              </a:buClr>
-              <a:buFont typeface="Wingdings" panose="05000000000000000000" pitchFamily="2" charset="2"/>
-              <a:buChar char="§"/>
-            </a:pPr>
-            <a:r>
-              <a:rPr lang="en-GB" sz="1600" dirty="0"/>
-              <a:t>Define sapient-bind JSON structure</a:t>
-            </a:r>
-          </a:p>
-          <a:p>
-            <a:pPr lvl="1" algn="just">
-              <a:buClr>
-                <a:srgbClr val="FFC000"/>
-              </a:buClr>
-              <a:buFont typeface="Wingdings" panose="05000000000000000000" pitchFamily="2" charset="2"/>
-              <a:buChar char="§"/>
-            </a:pPr>
-            <a:r>
-              <a:rPr lang="en-GB" sz="1600" dirty="0">
-                <a:uFillTx/>
-              </a:rPr>
-              <a:t>Function to create data-bindings with data fech</a:t>
-            </a:r>
-            <a:r>
-              <a:rPr lang="en-GB" sz="1600" dirty="0"/>
-              <a:t>ted from database</a:t>
-            </a:r>
-            <a:endParaRPr lang="en-GB" sz="1600" dirty="0">
-              <a:uFillTx/>
-            </a:endParaRPr>
-          </a:p>
-          <a:p>
-            <a:pPr algn="just">
-              <a:buClr>
-                <a:srgbClr val="FFC000"/>
-              </a:buClr>
-              <a:buFont typeface="Wingdings" panose="05000000000000000000" pitchFamily="2" charset="2"/>
-              <a:buChar char="§"/>
-            </a:pPr>
-            <a:r>
-              <a:rPr lang="en-GB" sz="2000" dirty="0" err="1"/>
-              <a:t>Boardlet</a:t>
-            </a:r>
-            <a:r>
-              <a:rPr lang="en-GB" sz="2000" dirty="0"/>
-              <a:t> Design (</a:t>
-            </a:r>
-            <a:r>
-              <a:rPr lang="en-GB" sz="2000" dirty="0" err="1"/>
-              <a:t>niedrigste</a:t>
-            </a:r>
-            <a:r>
-              <a:rPr lang="en-GB" sz="2000" dirty="0"/>
-              <a:t> </a:t>
-            </a:r>
-            <a:r>
-              <a:rPr lang="en-GB" sz="2000" dirty="0" err="1"/>
-              <a:t>Priöritäat</a:t>
-            </a:r>
-            <a:r>
-              <a:rPr lang="en-GB" sz="2000" dirty="0"/>
-              <a:t>)</a:t>
-            </a:r>
-          </a:p>
-          <a:p>
-            <a:pPr lvl="1" algn="just">
-              <a:buClr>
-                <a:srgbClr val="FFC000"/>
-              </a:buClr>
-              <a:buFont typeface="Wingdings" panose="05000000000000000000" pitchFamily="2" charset="2"/>
-              <a:buChar char="§"/>
-            </a:pPr>
-            <a:r>
-              <a:rPr lang="en-GB" sz="1600" dirty="0"/>
-              <a:t>Upload button</a:t>
-            </a:r>
-          </a:p>
-          <a:p>
-            <a:pPr lvl="2" algn="just">
-              <a:buClr>
-                <a:srgbClr val="FFC000"/>
-              </a:buClr>
-              <a:buFont typeface="Wingdings" panose="05000000000000000000" pitchFamily="2" charset="2"/>
-              <a:buChar char="§"/>
-            </a:pPr>
-            <a:r>
-              <a:rPr lang="en-GB" sz="1200" dirty="0">
-                <a:uFillTx/>
-              </a:rPr>
-              <a:t>Until now, no way of uploading files from client to the file system found (because of security issues)</a:t>
-            </a:r>
-          </a:p>
-          <a:p>
-            <a:pPr lvl="1" algn="just">
-              <a:buClr>
-                <a:srgbClr val="FFC000"/>
-              </a:buClr>
-              <a:buFont typeface="Wingdings" panose="05000000000000000000" pitchFamily="2" charset="2"/>
-              <a:buChar char="§"/>
-            </a:pPr>
-            <a:r>
-              <a:rPr lang="en-GB" sz="1600" dirty="0"/>
-              <a:t>Fix Progress Bar</a:t>
-            </a:r>
-          </a:p>
-        </p:txBody>
-      </p:sp>
-    </p:spTree>
-    <p:extLst>
-      <p:ext uri="{BB962C8B-B14F-4D97-AF65-F5344CB8AC3E}">
-        <p14:creationId xmlns:p14="http://schemas.microsoft.com/office/powerpoint/2010/main" val="2190960232"/>
       </p:ext>
     </p:extLst>
   </p:cSld>

</xml_diff>

<commit_message>
Adds progressBar animation. Implements functional vertexPlacement algorithm. Algorithm still work in progress.
</commit_message>
<xml_diff>
--- a/3 Entwicklungsphase/weekly_meeting_14.pptx
+++ b/3 Entwicklungsphase/weekly_meeting_14.pptx
@@ -17,10 +17,12 @@
     <p:sldId id="285" r:id="rId11"/>
     <p:sldId id="278" r:id="rId12"/>
     <p:sldId id="281" r:id="rId13"/>
-    <p:sldId id="279" r:id="rId14"/>
-    <p:sldId id="277" r:id="rId15"/>
-    <p:sldId id="282" r:id="rId16"/>
-    <p:sldId id="276" r:id="rId17"/>
+    <p:sldId id="286" r:id="rId14"/>
+    <p:sldId id="287" r:id="rId15"/>
+    <p:sldId id="279" r:id="rId16"/>
+    <p:sldId id="277" r:id="rId17"/>
+    <p:sldId id="282" r:id="rId18"/>
+    <p:sldId id="276" r:id="rId19"/>
   </p:sldIdLst>
   <p:sldSz cx="12192000" cy="6858000"/>
   <p:notesSz cx="6858000" cy="9144000"/>
@@ -293,7 +295,7 @@
               <a:rPr lang="en-US" smtClean="0">
                 <a:uFillTx/>
               </a:rPr>
-              <a:t>7/16/2018</a:t>
+              <a:t>7/17/2018</a:t>
             </a:fld>
             <a:endParaRPr lang="en-US">
               <a:uFillTx/>
@@ -341,7 +343,7 @@
               <a:rPr lang="en-US" smtClean="0">
                 <a:uFillTx/>
               </a:rPr>
-              <a:t>‹#›</a:t>
+              <a:t>‹Nr.›</a:t>
             </a:fld>
             <a:endParaRPr lang="en-US">
               <a:uFillTx/>
@@ -478,7 +480,7 @@
               <a:rPr lang="en-US" smtClean="0">
                 <a:uFillTx/>
               </a:rPr>
-              <a:t>7/16/2018</a:t>
+              <a:t>7/17/2018</a:t>
             </a:fld>
             <a:endParaRPr lang="en-US">
               <a:uFillTx/>
@@ -526,7 +528,7 @@
               <a:rPr lang="en-US" smtClean="0">
                 <a:uFillTx/>
               </a:rPr>
-              <a:t>‹#›</a:t>
+              <a:t>‹Nr.›</a:t>
             </a:fld>
             <a:endParaRPr lang="en-US">
               <a:uFillTx/>
@@ -673,7 +675,7 @@
               <a:rPr lang="en-US" smtClean="0">
                 <a:uFillTx/>
               </a:rPr>
-              <a:t>7/16/2018</a:t>
+              <a:t>7/17/2018</a:t>
             </a:fld>
             <a:endParaRPr lang="en-US">
               <a:uFillTx/>
@@ -721,7 +723,7 @@
               <a:rPr lang="en-US" smtClean="0">
                 <a:uFillTx/>
               </a:rPr>
-              <a:t>‹#›</a:t>
+              <a:t>‹Nr.›</a:t>
             </a:fld>
             <a:endParaRPr lang="en-US">
               <a:uFillTx/>
@@ -858,7 +860,7 @@
               <a:rPr lang="en-US" smtClean="0">
                 <a:uFillTx/>
               </a:rPr>
-              <a:t>7/16/2018</a:t>
+              <a:t>7/17/2018</a:t>
             </a:fld>
             <a:endParaRPr lang="en-US">
               <a:uFillTx/>
@@ -906,7 +908,7 @@
               <a:rPr lang="en-US" smtClean="0">
                 <a:uFillTx/>
               </a:rPr>
-              <a:t>‹#›</a:t>
+              <a:t>‹Nr.›</a:t>
             </a:fld>
             <a:endParaRPr lang="en-US">
               <a:uFillTx/>
@@ -1123,7 +1125,7 @@
               <a:rPr lang="en-US" smtClean="0">
                 <a:uFillTx/>
               </a:rPr>
-              <a:t>7/16/2018</a:t>
+              <a:t>7/17/2018</a:t>
             </a:fld>
             <a:endParaRPr lang="en-US">
               <a:uFillTx/>
@@ -1171,7 +1173,7 @@
               <a:rPr lang="en-US" smtClean="0">
                 <a:uFillTx/>
               </a:rPr>
-              <a:t>‹#›</a:t>
+              <a:t>‹Nr.›</a:t>
             </a:fld>
             <a:endParaRPr lang="en-US">
               <a:uFillTx/>
@@ -1379,7 +1381,7 @@
               <a:rPr lang="en-US" smtClean="0">
                 <a:uFillTx/>
               </a:rPr>
-              <a:t>7/16/2018</a:t>
+              <a:t>7/17/2018</a:t>
             </a:fld>
             <a:endParaRPr lang="en-US">
               <a:uFillTx/>
@@ -1427,7 +1429,7 @@
               <a:rPr lang="en-US" smtClean="0">
                 <a:uFillTx/>
               </a:rPr>
-              <a:t>‹#›</a:t>
+              <a:t>‹Nr.›</a:t>
             </a:fld>
             <a:endParaRPr lang="en-US">
               <a:uFillTx/>
@@ -1810,7 +1812,7 @@
               <a:rPr lang="en-US" smtClean="0">
                 <a:uFillTx/>
               </a:rPr>
-              <a:t>7/16/2018</a:t>
+              <a:t>7/17/2018</a:t>
             </a:fld>
             <a:endParaRPr lang="en-US">
               <a:uFillTx/>
@@ -1858,7 +1860,7 @@
               <a:rPr lang="en-US" smtClean="0">
                 <a:uFillTx/>
               </a:rPr>
-              <a:t>‹#›</a:t>
+              <a:t>‹Nr.›</a:t>
             </a:fld>
             <a:endParaRPr lang="en-US">
               <a:uFillTx/>
@@ -1934,7 +1936,7 @@
               <a:rPr lang="en-US" smtClean="0">
                 <a:uFillTx/>
               </a:rPr>
-              <a:t>7/16/2018</a:t>
+              <a:t>7/17/2018</a:t>
             </a:fld>
             <a:endParaRPr lang="en-US">
               <a:uFillTx/>
@@ -1982,7 +1984,7 @@
               <a:rPr lang="en-US" smtClean="0">
                 <a:uFillTx/>
               </a:rPr>
-              <a:t>‹#›</a:t>
+              <a:t>‹Nr.›</a:t>
             </a:fld>
             <a:endParaRPr lang="en-US">
               <a:uFillTx/>
@@ -2034,7 +2036,7 @@
               <a:rPr lang="en-US" smtClean="0">
                 <a:uFillTx/>
               </a:rPr>
-              <a:t>7/16/2018</a:t>
+              <a:t>7/17/2018</a:t>
             </a:fld>
             <a:endParaRPr lang="en-US">
               <a:uFillTx/>
@@ -2082,7 +2084,7 @@
               <a:rPr lang="en-US" smtClean="0">
                 <a:uFillTx/>
               </a:rPr>
-              <a:t>‹#›</a:t>
+              <a:t>‹Nr.›</a:t>
             </a:fld>
             <a:endParaRPr lang="en-US">
               <a:uFillTx/>
@@ -2366,7 +2368,7 @@
               <a:rPr lang="en-US" smtClean="0">
                 <a:uFillTx/>
               </a:rPr>
-              <a:t>7/16/2018</a:t>
+              <a:t>7/17/2018</a:t>
             </a:fld>
             <a:endParaRPr lang="en-US">
               <a:uFillTx/>
@@ -2414,7 +2416,7 @@
               <a:rPr lang="en-US" smtClean="0">
                 <a:uFillTx/>
               </a:rPr>
-              <a:t>‹#›</a:t>
+              <a:t>‹Nr.›</a:t>
             </a:fld>
             <a:endParaRPr lang="en-US">
               <a:uFillTx/>
@@ -2667,7 +2669,7 @@
               <a:rPr lang="en-US" smtClean="0">
                 <a:uFillTx/>
               </a:rPr>
-              <a:t>7/16/2018</a:t>
+              <a:t>7/17/2018</a:t>
             </a:fld>
             <a:endParaRPr lang="en-US">
               <a:uFillTx/>
@@ -2715,7 +2717,7 @@
               <a:rPr lang="en-US" smtClean="0">
                 <a:uFillTx/>
               </a:rPr>
-              <a:t>‹#›</a:t>
+              <a:t>‹Nr.›</a:t>
             </a:fld>
             <a:endParaRPr lang="en-US">
               <a:uFillTx/>
@@ -2896,7 +2898,7 @@
               <a:rPr lang="en-US" smtClean="0">
                 <a:uFillTx/>
               </a:rPr>
-              <a:t>7/16/2018</a:t>
+              <a:t>7/17/2018</a:t>
             </a:fld>
             <a:endParaRPr lang="en-US">
               <a:uFillTx/>
@@ -2982,7 +2984,7 @@
               <a:rPr lang="en-US" smtClean="0">
                 <a:uFillTx/>
               </a:rPr>
-              <a:t>‹#›</a:t>
+              <a:t>‹Nr.›</a:t>
             </a:fld>
             <a:endParaRPr lang="en-US">
               <a:uFillTx/>
@@ -3546,12 +3548,20 @@
           <a:lstStyle/>
           <a:p>
             <a:r>
+              <a:rPr lang="en-GB" sz="3200" b="1" dirty="0" smtClean="0">
+                <a:solidFill>
+                  <a:srgbClr val="339966"/>
+                </a:solidFill>
+              </a:rPr>
+              <a:t>3. Vertex </a:t>
+            </a:r>
+            <a:r>
               <a:rPr lang="en-GB" sz="3200" b="1" dirty="0">
                 <a:solidFill>
                   <a:srgbClr val="339966"/>
                 </a:solidFill>
               </a:rPr>
-              <a:t>Vertex Placement</a:t>
+              <a:t>Placement</a:t>
             </a:r>
             <a:br>
               <a:rPr lang="en-GB" sz="3200" b="1" dirty="0">
@@ -3686,12 +3696,8 @@
               <a:buChar char="§"/>
             </a:pPr>
             <a:r>
-              <a:rPr lang="en-GB" sz="2400" dirty="0" err="1"/>
-              <a:t>Probleme</a:t>
-            </a:r>
-            <a:r>
-              <a:rPr lang="en-GB" sz="2400" dirty="0"/>
-              <a:t>:</a:t>
+              <a:rPr lang="de-DE" sz="2400" dirty="0" smtClean="0"/>
+              <a:t>Probleme:</a:t>
             </a:r>
           </a:p>
           <a:p>
@@ -3703,68 +3709,24 @@
               <a:buChar char="§"/>
             </a:pPr>
             <a:r>
-              <a:rPr lang="en-GB" sz="2000" dirty="0" err="1"/>
-              <a:t>Inkonsistenzen</a:t>
-            </a:r>
-            <a:r>
-              <a:rPr lang="en-GB" sz="2000" dirty="0"/>
-              <a:t> in das Model (Instance Hierarchy) </a:t>
-            </a:r>
-            <a:r>
-              <a:rPr lang="en-GB" sz="2000" dirty="0" err="1"/>
-              <a:t>wie</a:t>
-            </a:r>
-            <a:r>
-              <a:rPr lang="en-GB" sz="2000" dirty="0"/>
-              <a:t> </a:t>
-            </a:r>
-            <a:r>
-              <a:rPr lang="en-GB" sz="2000" dirty="0" err="1"/>
-              <a:t>z.B</a:t>
-            </a:r>
-            <a:r>
-              <a:rPr lang="en-GB" sz="2000" dirty="0"/>
-              <a:t>. </a:t>
-            </a:r>
-            <a:r>
-              <a:rPr lang="en-GB" sz="2000" dirty="0" err="1"/>
-              <a:t>Groupen</a:t>
-            </a:r>
-            <a:r>
-              <a:rPr lang="en-GB" sz="2000" dirty="0"/>
-              <a:t> die </a:t>
-            </a:r>
-            <a:r>
-              <a:rPr lang="en-GB" sz="2000" dirty="0" err="1"/>
-              <a:t>Groupen</a:t>
-            </a:r>
-            <a:r>
-              <a:rPr lang="en-GB" sz="2000" dirty="0"/>
-              <a:t> </a:t>
-            </a:r>
-            <a:r>
-              <a:rPr lang="en-GB" sz="2000" dirty="0" err="1"/>
-              <a:t>aber</a:t>
-            </a:r>
-            <a:r>
-              <a:rPr lang="en-GB" sz="2000" dirty="0"/>
-              <a:t> </a:t>
-            </a:r>
-            <a:r>
-              <a:rPr lang="en-GB" sz="2000" dirty="0" err="1"/>
-              <a:t>auch</a:t>
-            </a:r>
-            <a:r>
-              <a:rPr lang="en-GB" sz="2000" dirty="0"/>
-              <a:t> Shapes </a:t>
-            </a:r>
-            <a:r>
-              <a:rPr lang="en-GB" sz="2000" dirty="0" err="1"/>
-              <a:t>enthalten</a:t>
-            </a:r>
-            <a:r>
-              <a:rPr lang="en-GB" sz="2000" dirty="0"/>
-              <a:t>.</a:t>
+              <a:rPr lang="de-DE" sz="2000" dirty="0" smtClean="0"/>
+              <a:t>Inkonsistenzen in das Model (Instance </a:t>
+            </a:r>
+            <a:r>
+              <a:rPr lang="de-DE" sz="2000" dirty="0" err="1" smtClean="0"/>
+              <a:t>Hierarchy</a:t>
+            </a:r>
+            <a:r>
+              <a:rPr lang="de-DE" sz="2000" dirty="0" smtClean="0"/>
+              <a:t>) wie z.B. Gruppen </a:t>
+            </a:r>
+            <a:r>
+              <a:rPr lang="de-DE" sz="2000" dirty="0"/>
+              <a:t>die Gruppen </a:t>
+            </a:r>
+            <a:r>
+              <a:rPr lang="de-DE" sz="2000" dirty="0" smtClean="0"/>
+              <a:t>aber auch Shapes enthalten.</a:t>
             </a:r>
           </a:p>
           <a:p>
@@ -3776,94 +3738,18 @@
               <a:buChar char="§"/>
             </a:pPr>
             <a:r>
-              <a:rPr lang="en-GB" sz="2000" dirty="0" err="1"/>
-              <a:t>Führt</a:t>
-            </a:r>
-            <a:r>
-              <a:rPr lang="en-GB" sz="2000" dirty="0"/>
-              <a:t> </a:t>
-            </a:r>
-            <a:r>
-              <a:rPr lang="en-GB" sz="2000" dirty="0" err="1"/>
-              <a:t>zu</a:t>
-            </a:r>
-            <a:r>
-              <a:rPr lang="en-GB" sz="2000" dirty="0"/>
-              <a:t> </a:t>
-            </a:r>
-            <a:r>
-              <a:rPr lang="en-GB" sz="2000" dirty="0" err="1"/>
-              <a:t>Irreguläre</a:t>
-            </a:r>
-            <a:r>
-              <a:rPr lang="en-GB" sz="2000" dirty="0"/>
-              <a:t> </a:t>
-            </a:r>
-            <a:r>
-              <a:rPr lang="en-GB" sz="2000" dirty="0" err="1"/>
-              <a:t>Platzierung</a:t>
-            </a:r>
-            <a:r>
-              <a:rPr lang="en-GB" sz="2000" dirty="0"/>
-              <a:t> in die </a:t>
-            </a:r>
-            <a:r>
-              <a:rPr lang="en-GB" sz="2000" dirty="0" err="1"/>
-              <a:t>Mehrheit</a:t>
-            </a:r>
-            <a:r>
-              <a:rPr lang="en-GB" sz="2000" dirty="0"/>
-              <a:t> der </a:t>
-            </a:r>
-            <a:r>
-              <a:rPr lang="en-GB" sz="2000" dirty="0" err="1"/>
-              <a:t>Fälle</a:t>
-            </a:r>
-            <a:r>
-              <a:rPr lang="en-GB" sz="2000" dirty="0"/>
-              <a:t> </a:t>
-            </a:r>
-            <a:r>
-              <a:rPr lang="en-GB" sz="2000" dirty="0">
+              <a:rPr lang="de-DE" sz="2000" dirty="0" smtClean="0"/>
+              <a:t>Führt zu Irreguläre Platzierung in die Mehrheit der Fälle </a:t>
+            </a:r>
+            <a:r>
+              <a:rPr lang="de-DE" sz="2000" dirty="0" smtClean="0">
                 <a:sym typeface="Wingdings" panose="05000000000000000000" pitchFamily="2" charset="2"/>
               </a:rPr>
               <a:t></a:t>
             </a:r>
             <a:r>
-              <a:rPr lang="en-GB" sz="2000" dirty="0"/>
-              <a:t> </a:t>
-            </a:r>
-            <a:r>
-              <a:rPr lang="en-GB" sz="2000" dirty="0" err="1"/>
-              <a:t>braucht</a:t>
-            </a:r>
-            <a:r>
-              <a:rPr lang="en-GB" sz="2000" dirty="0"/>
-              <a:t> </a:t>
-            </a:r>
-            <a:r>
-              <a:rPr lang="en-GB" sz="2000" dirty="0" err="1"/>
-              <a:t>zu</a:t>
-            </a:r>
-            <a:r>
-              <a:rPr lang="en-GB" sz="2000" dirty="0"/>
-              <a:t> </a:t>
-            </a:r>
-            <a:r>
-              <a:rPr lang="en-GB" sz="2000" dirty="0" err="1"/>
-              <a:t>viel</a:t>
-            </a:r>
-            <a:r>
-              <a:rPr lang="en-GB" sz="2000" dirty="0"/>
-              <a:t> </a:t>
-            </a:r>
-            <a:r>
-              <a:rPr lang="en-GB" sz="2000" dirty="0" err="1"/>
-              <a:t>Logik</a:t>
-            </a:r>
-            <a:r>
-              <a:rPr lang="en-GB" sz="2000" dirty="0"/>
-              <a:t>.</a:t>
+              <a:rPr lang="de-DE" sz="2000" dirty="0" smtClean="0"/>
+              <a:t> braucht zu viel Logik.</a:t>
             </a:r>
           </a:p>
           <a:p>
@@ -3875,56 +3761,16 @@
               <a:buChar char="§"/>
             </a:pPr>
             <a:r>
-              <a:rPr lang="en-GB" sz="2000" dirty="0"/>
+              <a:rPr lang="de-DE" sz="2000" dirty="0" smtClean="0"/>
               <a:t>Relative </a:t>
             </a:r>
             <a:r>
-              <a:rPr lang="en-GB" sz="2000" dirty="0" err="1"/>
+              <a:rPr lang="de-DE" sz="2000" dirty="0" err="1" smtClean="0"/>
               <a:t>positionierung</a:t>
             </a:r>
             <a:r>
-              <a:rPr lang="en-GB" sz="2000" dirty="0"/>
-              <a:t> </a:t>
-            </a:r>
-            <a:r>
-              <a:rPr lang="en-GB" sz="2000" dirty="0" err="1"/>
-              <a:t>deswegen</a:t>
-            </a:r>
-            <a:r>
-              <a:rPr lang="en-GB" sz="2000" dirty="0"/>
-              <a:t> </a:t>
-            </a:r>
-            <a:r>
-              <a:rPr lang="en-GB" sz="2000" dirty="0" err="1"/>
-              <a:t>manchmal</a:t>
-            </a:r>
-            <a:r>
-              <a:rPr lang="en-GB" sz="2000" dirty="0"/>
-              <a:t> suboptimal, </a:t>
-            </a:r>
-            <a:r>
-              <a:rPr lang="en-GB" sz="2000" dirty="0" err="1"/>
-              <a:t>aber</a:t>
-            </a:r>
-            <a:r>
-              <a:rPr lang="en-GB" sz="2000" dirty="0"/>
-              <a:t> </a:t>
-            </a:r>
-            <a:r>
-              <a:rPr lang="en-GB" sz="2000" dirty="0" err="1"/>
-              <a:t>trotzdem</a:t>
-            </a:r>
-            <a:r>
-              <a:rPr lang="en-GB" sz="2000" dirty="0"/>
-              <a:t> die </a:t>
-            </a:r>
-            <a:r>
-              <a:rPr lang="en-GB" sz="2000" dirty="0" err="1"/>
-              <a:t>beste</a:t>
-            </a:r>
-            <a:r>
-              <a:rPr lang="en-GB" sz="2000" dirty="0"/>
-              <a:t> Alternative</a:t>
+              <a:rPr lang="de-DE" sz="2000" dirty="0" smtClean="0"/>
+              <a:t> deswegen manchmal suboptimal, aber trotzdem die beste Alternative</a:t>
             </a:r>
           </a:p>
           <a:p>
@@ -3936,60 +3782,8 @@
               <a:buChar char="§"/>
             </a:pPr>
             <a:r>
-              <a:rPr lang="en-GB" sz="2000" dirty="0" err="1"/>
-              <a:t>Viel</a:t>
-            </a:r>
-            <a:r>
-              <a:rPr lang="en-GB" sz="2000" dirty="0"/>
-              <a:t> </a:t>
-            </a:r>
-            <a:r>
-              <a:rPr lang="en-GB" sz="2000" dirty="0" err="1"/>
-              <a:t>Aufwand</a:t>
-            </a:r>
-            <a:r>
-              <a:rPr lang="en-GB" sz="2000" dirty="0"/>
-              <a:t> und </a:t>
-            </a:r>
-            <a:r>
-              <a:rPr lang="en-GB" sz="2000" dirty="0" err="1"/>
-              <a:t>wenig</a:t>
-            </a:r>
-            <a:r>
-              <a:rPr lang="en-GB" sz="2000" dirty="0"/>
-              <a:t> </a:t>
-            </a:r>
-            <a:r>
-              <a:rPr lang="en-GB" sz="2000" dirty="0" err="1"/>
-              <a:t>Fortschritt</a:t>
-            </a:r>
-            <a:r>
-              <a:rPr lang="en-GB" sz="2000" dirty="0"/>
-              <a:t> </a:t>
-            </a:r>
-            <a:r>
-              <a:rPr lang="en-GB" sz="2000" dirty="0" err="1"/>
-              <a:t>bei</a:t>
-            </a:r>
-            <a:r>
-              <a:rPr lang="en-GB" sz="2000" dirty="0"/>
-              <a:t> der </a:t>
-            </a:r>
-            <a:r>
-              <a:rPr lang="en-GB" sz="2000" dirty="0" err="1"/>
-              <a:t>Verbesserung</a:t>
-            </a:r>
-            <a:r>
-              <a:rPr lang="en-GB" sz="2000" dirty="0"/>
-              <a:t> des </a:t>
-            </a:r>
-            <a:r>
-              <a:rPr lang="en-GB" sz="2000" dirty="0" err="1"/>
-              <a:t>Algorithmus</a:t>
-            </a:r>
-            <a:r>
-              <a:rPr lang="en-GB" sz="2000" dirty="0"/>
-              <a:t>.</a:t>
+              <a:rPr lang="de-DE" sz="2000" dirty="0" smtClean="0"/>
+              <a:t>Viel Aufwand und wenig Fortschritt bei der Verbesserung des Algorithmus.</a:t>
             </a:r>
           </a:p>
           <a:p>
@@ -4000,7 +3794,7 @@
               <a:buFont typeface="Wingdings" panose="05000000000000000000" pitchFamily="2" charset="2"/>
               <a:buChar char="§"/>
             </a:pPr>
-            <a:endParaRPr lang="en-GB" sz="2000" dirty="0"/>
+            <a:endParaRPr lang="de-DE" sz="2000" dirty="0" smtClean="0"/>
           </a:p>
           <a:p>
             <a:pPr lvl="1" algn="just">
@@ -4010,7 +3804,7 @@
               <a:buFont typeface="Wingdings" panose="05000000000000000000" pitchFamily="2" charset="2"/>
               <a:buChar char="§"/>
             </a:pPr>
-            <a:endParaRPr lang="en-GB" sz="2000" dirty="0"/>
+            <a:endParaRPr lang="de-DE" sz="2000" dirty="0" smtClean="0"/>
           </a:p>
           <a:p>
             <a:pPr algn="just">
@@ -4021,28 +3815,8 @@
               <a:buChar char="§"/>
             </a:pPr>
             <a:r>
-              <a:rPr lang="en-GB" sz="2400" dirty="0" err="1"/>
-              <a:t>Lösungen</a:t>
-            </a:r>
-            <a:r>
-              <a:rPr lang="en-GB" sz="2400" dirty="0"/>
-              <a:t> (</a:t>
-            </a:r>
-            <a:r>
-              <a:rPr lang="en-GB" sz="2400" dirty="0" err="1"/>
-              <a:t>zum</a:t>
-            </a:r>
-            <a:r>
-              <a:rPr lang="en-GB" sz="2400" dirty="0"/>
-              <a:t> </a:t>
-            </a:r>
-            <a:r>
-              <a:rPr lang="en-GB" sz="2400" dirty="0" err="1"/>
-              <a:t>Teil</a:t>
-            </a:r>
-            <a:r>
-              <a:rPr lang="en-GB" sz="2400" dirty="0"/>
-              <a:t>):</a:t>
+              <a:rPr lang="de-DE" sz="2400" dirty="0" smtClean="0"/>
+              <a:t>Lösungen (zum Teil):</a:t>
             </a:r>
           </a:p>
           <a:p>
@@ -4054,46 +3828,29 @@
               <a:buChar char="§"/>
             </a:pPr>
             <a:r>
-              <a:rPr lang="en-GB" sz="2000" dirty="0"/>
-              <a:t>Specification of Constraints </a:t>
-            </a:r>
-            <a:r>
-              <a:rPr lang="en-GB" sz="2000" dirty="0" err="1"/>
-              <a:t>erlaubt</a:t>
-            </a:r>
-            <a:r>
-              <a:rPr lang="en-GB" sz="2000" dirty="0"/>
+              <a:rPr lang="de-DE" sz="2000" dirty="0" err="1" smtClean="0"/>
+              <a:t>Specification</a:t>
+            </a:r>
+            <a:r>
+              <a:rPr lang="de-DE" sz="2000" dirty="0" smtClean="0"/>
               <a:t> </a:t>
             </a:r>
             <a:r>
-              <a:rPr lang="en-GB" sz="2000" dirty="0" err="1"/>
-              <a:t>Logik</a:t>
-            </a:r>
-            <a:r>
-              <a:rPr lang="en-GB" sz="2000" dirty="0"/>
+              <a:rPr lang="de-DE" sz="2000" dirty="0" err="1" smtClean="0"/>
+              <a:t>of</a:t>
+            </a:r>
+            <a:r>
+              <a:rPr lang="de-DE" sz="2000" dirty="0" smtClean="0"/>
               <a:t> </a:t>
             </a:r>
             <a:r>
-              <a:rPr lang="en-GB" sz="2000" dirty="0" err="1"/>
-              <a:t>gezielt</a:t>
-            </a:r>
-            <a:r>
-              <a:rPr lang="en-GB" sz="2000" dirty="0"/>
-              <a:t> </a:t>
-            </a:r>
-            <a:r>
-              <a:rPr lang="en-GB" sz="2000" dirty="0" err="1"/>
-              <a:t>zu</a:t>
-            </a:r>
-            <a:r>
-              <a:rPr lang="en-GB" sz="2000" dirty="0"/>
-              <a:t> </a:t>
-            </a:r>
-            <a:r>
-              <a:rPr lang="en-GB" sz="2000" dirty="0" err="1"/>
-              <a:t>programmieren</a:t>
-            </a:r>
-            <a:endParaRPr lang="en-GB" sz="2000" dirty="0"/>
+              <a:rPr lang="de-DE" sz="2000" dirty="0" err="1" smtClean="0"/>
+              <a:t>Constraints</a:t>
+            </a:r>
+            <a:r>
+              <a:rPr lang="de-DE" sz="2000" dirty="0" smtClean="0"/>
+              <a:t> erlaubt Logik gezielt zu programmieren</a:t>
+            </a:r>
           </a:p>
           <a:p>
             <a:pPr lvl="1" algn="just">
@@ -4104,25 +3861,18 @@
               <a:buChar char="§"/>
             </a:pPr>
             <a:r>
-              <a:rPr lang="en-GB" sz="2000" dirty="0"/>
-              <a:t>Constraints </a:t>
-            </a:r>
-            <a:r>
-              <a:rPr lang="en-GB" sz="2000" dirty="0" err="1"/>
-              <a:t>erlauben</a:t>
-            </a:r>
-            <a:r>
-              <a:rPr lang="en-GB" sz="2000" dirty="0"/>
-              <a:t> </a:t>
-            </a:r>
-            <a:r>
-              <a:rPr lang="en-GB" sz="2000" dirty="0" err="1"/>
-              <a:t>auch</a:t>
-            </a:r>
-            <a:r>
-              <a:rPr lang="en-GB" sz="2000" dirty="0"/>
-              <a:t> das progressive Enhancement</a:t>
-            </a:r>
+              <a:rPr lang="de-DE" sz="2000" dirty="0" err="1" smtClean="0"/>
+              <a:t>Constraints</a:t>
+            </a:r>
+            <a:r>
+              <a:rPr lang="de-DE" sz="2000" dirty="0" smtClean="0"/>
+              <a:t> erlauben auch das progressive </a:t>
+            </a:r>
+            <a:r>
+              <a:rPr lang="de-DE" sz="2000" dirty="0" err="1" smtClean="0"/>
+              <a:t>Enhancement</a:t>
+            </a:r>
+            <a:endParaRPr lang="de-DE" sz="2000" dirty="0" smtClean="0"/>
           </a:p>
           <a:p>
             <a:pPr lvl="1" algn="just">
@@ -4133,96 +3883,44 @@
               <a:buChar char="§"/>
             </a:pPr>
             <a:r>
-              <a:rPr lang="en-GB" sz="2000" dirty="0"/>
-              <a:t>Block packing algorithm </a:t>
-            </a:r>
-            <a:r>
-              <a:rPr lang="en-GB" sz="2000" dirty="0" err="1"/>
-              <a:t>ist</a:t>
-            </a:r>
-            <a:r>
-              <a:rPr lang="en-GB" sz="2000" dirty="0"/>
+              <a:rPr lang="de-DE" sz="2000" dirty="0" smtClean="0"/>
+              <a:t>Block </a:t>
+            </a:r>
+            <a:r>
+              <a:rPr lang="de-DE" sz="2000" dirty="0" err="1" smtClean="0"/>
+              <a:t>packing</a:t>
+            </a:r>
+            <a:r>
+              <a:rPr lang="de-DE" sz="2000" dirty="0" smtClean="0"/>
               <a:t> </a:t>
             </a:r>
             <a:r>
-              <a:rPr lang="en-GB" sz="2000" dirty="0" err="1"/>
-              <a:t>eine</a:t>
-            </a:r>
-            <a:r>
-              <a:rPr lang="en-GB" sz="2000" dirty="0"/>
-              <a:t> </a:t>
-            </a:r>
-            <a:r>
-              <a:rPr lang="en-GB" sz="2000" dirty="0" err="1"/>
-              <a:t>optimale</a:t>
-            </a:r>
-            <a:r>
-              <a:rPr lang="en-GB" sz="2000" dirty="0"/>
-              <a:t> </a:t>
-            </a:r>
-            <a:r>
-              <a:rPr lang="en-GB" sz="2000" dirty="0" err="1"/>
-              <a:t>Lösung</a:t>
-            </a:r>
-            <a:r>
-              <a:rPr lang="en-GB" sz="2000" dirty="0"/>
-              <a:t> für P&amp;ID </a:t>
-            </a:r>
-            <a:r>
-              <a:rPr lang="en-GB" sz="2000" dirty="0" err="1"/>
-              <a:t>Diagramme</a:t>
-            </a:r>
-            <a:r>
-              <a:rPr lang="en-GB" sz="2000" dirty="0"/>
-              <a:t> falls </a:t>
-            </a:r>
-            <a:r>
-              <a:rPr lang="en-GB" sz="2000" dirty="0" err="1"/>
-              <a:t>alle</a:t>
-            </a:r>
-            <a:r>
-              <a:rPr lang="en-GB" sz="2000" dirty="0"/>
-              <a:t> children </a:t>
-            </a:r>
-            <a:r>
-              <a:rPr lang="en-GB" sz="2000" dirty="0" err="1"/>
-              <a:t>Grupen</a:t>
-            </a:r>
-            <a:r>
-              <a:rPr lang="en-GB" sz="2000" dirty="0"/>
-              <a:t> </a:t>
-            </a:r>
-            <a:r>
-              <a:rPr lang="en-GB" sz="2000" dirty="0" err="1"/>
-              <a:t>sind</a:t>
-            </a:r>
-            <a:r>
-              <a:rPr lang="en-GB" sz="2000" dirty="0"/>
-              <a:t> (</a:t>
-            </a:r>
-            <a:r>
-              <a:rPr lang="en-GB" sz="2000" dirty="0" err="1"/>
-              <a:t>rechteckige</a:t>
-            </a:r>
-            <a:r>
-              <a:rPr lang="en-GB" sz="2000" dirty="0"/>
-              <a:t> Blocks). </a:t>
-            </a:r>
-            <a:r>
-              <a:rPr lang="en-GB" sz="2000" dirty="0" err="1"/>
-              <a:t>Nicht</a:t>
-            </a:r>
-            <a:r>
-              <a:rPr lang="en-GB" sz="2000" dirty="0"/>
-              <a:t> </a:t>
-            </a:r>
-            <a:r>
-              <a:rPr lang="en-GB" sz="2000" dirty="0" err="1"/>
-              <a:t>aber</a:t>
-            </a:r>
-            <a:r>
-              <a:rPr lang="en-GB" sz="2000" dirty="0"/>
-              <a:t> für shapes.</a:t>
+              <a:rPr lang="de-DE" sz="2000" dirty="0" err="1" smtClean="0"/>
+              <a:t>algorithm</a:t>
+            </a:r>
+            <a:r>
+              <a:rPr lang="de-DE" sz="2000" dirty="0" smtClean="0"/>
+              <a:t> ist eine optimale Lösung für P&amp;ID Diagramme falls alle </a:t>
+            </a:r>
+            <a:r>
+              <a:rPr lang="de-DE" sz="2000" dirty="0" err="1" smtClean="0"/>
+              <a:t>children</a:t>
+            </a:r>
+            <a:r>
+              <a:rPr lang="de-DE" sz="2000" dirty="0"/>
+              <a:t> Gruppen </a:t>
+            </a:r>
+            <a:r>
+              <a:rPr lang="de-DE" sz="2000" dirty="0" smtClean="0"/>
+              <a:t>sind (rechteckige Blocks). Nicht aber für </a:t>
+            </a:r>
+            <a:r>
+              <a:rPr lang="de-DE" sz="2000" dirty="0" err="1" smtClean="0"/>
+              <a:t>shapes</a:t>
+            </a:r>
+            <a:r>
+              <a:rPr lang="de-DE" sz="2000" dirty="0" smtClean="0"/>
+              <a:t>.</a:t>
             </a:r>
           </a:p>
           <a:p>
@@ -4233,7 +3931,7 @@
               <a:buFont typeface="Wingdings" panose="05000000000000000000" pitchFamily="2" charset="2"/>
               <a:buChar char="§"/>
             </a:pPr>
-            <a:endParaRPr lang="en-GB" sz="2000" dirty="0"/>
+            <a:endParaRPr lang="de-DE" sz="2000" dirty="0"/>
           </a:p>
         </p:txBody>
       </p:sp>
@@ -4290,22 +3988,31 @@
           <a:lstStyle/>
           <a:p>
             <a:r>
+              <a:rPr lang="en-GB" sz="3200" b="1" dirty="0" smtClean="0">
+                <a:solidFill>
+                  <a:srgbClr val="339966"/>
+                </a:solidFill>
+                <a:uFillTx/>
+              </a:rPr>
+              <a:t>3.1 Business </a:t>
+            </a:r>
+            <a:r>
+              <a:rPr lang="en-GB" sz="3200" b="1" dirty="0" err="1">
+                <a:solidFill>
+                  <a:srgbClr val="339966"/>
+                </a:solidFill>
+                <a:uFillTx/>
+              </a:rPr>
+              <a:t>Logik</a:t>
+            </a:r>
+            <a:r>
               <a:rPr lang="en-GB" sz="3200" b="1" dirty="0">
                 <a:solidFill>
                   <a:srgbClr val="339966"/>
                 </a:solidFill>
                 <a:uFillTx/>
               </a:rPr>
-              <a:t>Business </a:t>
-            </a:r>
-            <a:r>
-              <a:rPr lang="en-GB" sz="3200" b="1" dirty="0" err="1">
-                <a:solidFill>
-                  <a:srgbClr val="339966"/>
-                </a:solidFill>
-                <a:uFillTx/>
-              </a:rPr>
-              <a:t>Logik</a:t>
+              <a:t/>
             </a:r>
             <a:br>
               <a:rPr lang="en-GB" sz="3200" b="1" dirty="0">
@@ -4543,7 +4250,15 @@
           <a:lstStyle/>
           <a:p>
             <a:r>
-              <a:rPr lang="en-GB" sz="3200" b="1" dirty="0" err="1">
+              <a:rPr lang="en-GB" sz="3200" b="1" dirty="0" smtClean="0">
+                <a:solidFill>
+                  <a:srgbClr val="339966"/>
+                </a:solidFill>
+              </a:rPr>
+              <a:t>3.2 </a:t>
+            </a:r>
+            <a:r>
+              <a:rPr lang="en-GB" sz="3200" b="1" dirty="0" err="1" smtClean="0">
                 <a:solidFill>
                   <a:srgbClr val="339966"/>
                 </a:solidFill>
@@ -4625,15 +4340,254 @@
           <a:noFill/>
         </p:spPr>
       </p:pic>
-      <p:pic>
-        <p:nvPicPr>
-          <p:cNvPr id="4" name="Picture 3">
+      <p:sp>
+        <p:nvSpPr>
+          <p:cNvPr id="6" name="Content Placeholder 2">
             <a:extLst>
               <a:ext uri="{FF2B5EF4-FFF2-40B4-BE49-F238E27FC236}">
-                <a16:creationId xmlns:a16="http://schemas.microsoft.com/office/drawing/2014/main" id="{3FAA938E-572D-44DD-B40C-C831F1A72E20}"/>
+                <a16:creationId xmlns:a16="http://schemas.microsoft.com/office/drawing/2014/main" id="{78CA1F25-BAFB-4CE3-9C14-7750D71C99C2}"/>
               </a:ext>
             </a:extLst>
           </p:cNvPr>
+          <p:cNvSpPr>
+            <a:spLocks noGrp="1"/>
+          </p:cNvSpPr>
+          <p:nvPr>
+            <p:ph idx="1"/>
+          </p:nvPr>
+        </p:nvSpPr>
+        <p:spPr>
+          <a:xfrm>
+            <a:off x="610225" y="1305007"/>
+            <a:ext cx="4933325" cy="5412189"/>
+          </a:xfrm>
+        </p:spPr>
+        <p:txBody>
+          <a:bodyPr>
+            <a:normAutofit fontScale="92500"/>
+          </a:bodyPr>
+          <a:lstStyle/>
+          <a:p>
+            <a:pPr>
+              <a:buClr>
+                <a:srgbClr val="FFC000"/>
+              </a:buClr>
+              <a:buFont typeface="Wingdings" panose="05000000000000000000" pitchFamily="2" charset="2"/>
+              <a:buChar char="§"/>
+            </a:pPr>
+            <a:r>
+              <a:rPr lang="en-GB" sz="2400" b="1" dirty="0"/>
+              <a:t>Binary tree block packing </a:t>
+            </a:r>
+            <a:r>
+              <a:rPr lang="en-GB" sz="2400" b="1" dirty="0" smtClean="0"/>
+              <a:t>algorithm (for groups):</a:t>
+            </a:r>
+            <a:endParaRPr lang="en-GB" sz="2400" b="1" dirty="0"/>
+          </a:p>
+          <a:p>
+            <a:pPr>
+              <a:buClr>
+                <a:srgbClr val="FFC000"/>
+              </a:buClr>
+              <a:buFont typeface="Wingdings" panose="05000000000000000000" pitchFamily="2" charset="2"/>
+              <a:buChar char="§"/>
+            </a:pPr>
+            <a:endParaRPr lang="en-GB" sz="2400" dirty="0"/>
+          </a:p>
+          <a:p>
+            <a:pPr marL="457200" indent="-457200">
+              <a:buClr>
+                <a:srgbClr val="FFC000"/>
+              </a:buClr>
+              <a:buFont typeface="+mj-lt"/>
+              <a:buAutoNum type="arabicPeriod"/>
+            </a:pPr>
+            <a:r>
+              <a:rPr lang="en-GB" sz="2400" b="1" dirty="0"/>
+              <a:t>Sort blocks </a:t>
+            </a:r>
+            <a:r>
+              <a:rPr lang="en-GB" sz="2400" dirty="0"/>
+              <a:t>(clones) based on selected </a:t>
+            </a:r>
+            <a:r>
+              <a:rPr lang="en-GB" sz="2400" dirty="0" err="1"/>
+              <a:t>sortOrder</a:t>
+            </a:r>
+            <a:r>
+              <a:rPr lang="en-GB" sz="2400" dirty="0"/>
+              <a:t> option (none, width, height, area, </a:t>
+            </a:r>
+            <a:r>
+              <a:rPr lang="en-GB" sz="2400" b="1" dirty="0" err="1"/>
+              <a:t>maxSide</a:t>
+            </a:r>
+            <a:r>
+              <a:rPr lang="en-GB" sz="2400" b="1" dirty="0"/>
+              <a:t>)</a:t>
+            </a:r>
+          </a:p>
+          <a:p>
+            <a:pPr marL="457200" indent="-457200">
+              <a:buClr>
+                <a:srgbClr val="FFC000"/>
+              </a:buClr>
+              <a:buFont typeface="+mj-lt"/>
+              <a:buAutoNum type="arabicPeriod"/>
+            </a:pPr>
+            <a:r>
+              <a:rPr lang="en-GB" sz="2400" b="1" dirty="0"/>
+              <a:t>Place first </a:t>
+            </a:r>
+            <a:r>
+              <a:rPr lang="en-GB" sz="2400" dirty="0"/>
+              <a:t>(root) </a:t>
+            </a:r>
+            <a:r>
+              <a:rPr lang="en-GB" sz="2400" b="1" dirty="0"/>
+              <a:t>block</a:t>
+            </a:r>
+            <a:r>
+              <a:rPr lang="en-GB" sz="2400" dirty="0"/>
+              <a:t> at (0, 0).</a:t>
+            </a:r>
+          </a:p>
+          <a:p>
+            <a:pPr marL="457200" indent="-457200">
+              <a:buClr>
+                <a:srgbClr val="FFC000"/>
+              </a:buClr>
+              <a:buFont typeface="+mj-lt"/>
+              <a:buAutoNum type="arabicPeriod"/>
+            </a:pPr>
+            <a:r>
+              <a:rPr lang="en-GB" sz="2400" b="1" dirty="0"/>
+              <a:t>Place next block </a:t>
+            </a:r>
+            <a:r>
+              <a:rPr lang="en-GB" sz="2400" dirty="0"/>
+              <a:t>either right or bellow of previous (minimize area)</a:t>
+            </a:r>
+          </a:p>
+          <a:p>
+            <a:pPr marL="457200" indent="-457200">
+              <a:buClr>
+                <a:srgbClr val="FFC000"/>
+              </a:buClr>
+              <a:buFont typeface="+mj-lt"/>
+              <a:buAutoNum type="arabicPeriod"/>
+            </a:pPr>
+            <a:r>
+              <a:rPr lang="en-GB" sz="2400" b="1" dirty="0"/>
+              <a:t>Repeat</a:t>
+            </a:r>
+            <a:r>
+              <a:rPr lang="en-GB" sz="2400" dirty="0"/>
+              <a:t> 3 until all blocks placed.</a:t>
+            </a:r>
+          </a:p>
+          <a:p>
+            <a:pPr marL="457200" indent="-457200">
+              <a:buClr>
+                <a:srgbClr val="FFC000"/>
+              </a:buClr>
+              <a:buFont typeface="+mj-lt"/>
+              <a:buAutoNum type="arabicPeriod"/>
+            </a:pPr>
+            <a:r>
+              <a:rPr lang="en-GB" sz="2400" b="1" dirty="0"/>
+              <a:t>Update properties </a:t>
+            </a:r>
+            <a:r>
+              <a:rPr lang="en-GB" sz="2400" dirty="0"/>
+              <a:t>in original objects.</a:t>
+            </a:r>
+          </a:p>
+          <a:p>
+            <a:pPr marL="457200" indent="-457200">
+              <a:buClr>
+                <a:srgbClr val="FFC000"/>
+              </a:buClr>
+              <a:buFont typeface="+mj-lt"/>
+              <a:buAutoNum type="arabicPeriod"/>
+            </a:pPr>
+            <a:endParaRPr lang="en-GB" sz="2400" dirty="0"/>
+          </a:p>
+          <a:p>
+            <a:pPr>
+              <a:buClr>
+                <a:srgbClr val="FFC000"/>
+              </a:buClr>
+            </a:pPr>
+            <a:r>
+              <a:rPr lang="en-GB" sz="2400" dirty="0"/>
+              <a:t>Sehr </a:t>
+            </a:r>
+            <a:r>
+              <a:rPr lang="en-GB" sz="2400" dirty="0" err="1"/>
+              <a:t>gute</a:t>
+            </a:r>
+            <a:r>
+              <a:rPr lang="en-GB" sz="2400" dirty="0"/>
+              <a:t> </a:t>
+            </a:r>
+            <a:r>
+              <a:rPr lang="en-GB" sz="2400" dirty="0" err="1"/>
+              <a:t>Ergebnisse</a:t>
+            </a:r>
+            <a:r>
+              <a:rPr lang="en-GB" sz="2400" dirty="0"/>
+              <a:t> für Blocks die </a:t>
+            </a:r>
+            <a:r>
+              <a:rPr lang="en-GB" sz="2400" dirty="0" err="1"/>
+              <a:t>nur</a:t>
+            </a:r>
+            <a:r>
+              <a:rPr lang="en-GB" sz="2400" dirty="0"/>
+              <a:t> </a:t>
+            </a:r>
+            <a:r>
+              <a:rPr lang="en-GB" sz="2400" dirty="0" err="1"/>
+              <a:t>Groupen</a:t>
+            </a:r>
+            <a:r>
+              <a:rPr lang="en-GB" sz="2400" dirty="0"/>
+              <a:t> </a:t>
+            </a:r>
+            <a:r>
+              <a:rPr lang="en-GB" sz="2400" dirty="0" err="1"/>
+              <a:t>sind</a:t>
+            </a:r>
+            <a:r>
+              <a:rPr lang="en-GB" sz="2400" dirty="0"/>
+              <a:t> (</a:t>
+            </a:r>
+            <a:r>
+              <a:rPr lang="en-GB" sz="2400" dirty="0" err="1"/>
+              <a:t>ohne</a:t>
+            </a:r>
+            <a:r>
+              <a:rPr lang="en-GB" sz="2400" dirty="0"/>
+              <a:t> Shapes)</a:t>
+            </a:r>
+          </a:p>
+          <a:p>
+            <a:pPr marL="457200" indent="-457200">
+              <a:buClr>
+                <a:srgbClr val="FFC000"/>
+              </a:buClr>
+              <a:buFont typeface="+mj-lt"/>
+              <a:buAutoNum type="arabicPeriod"/>
+            </a:pPr>
+            <a:endParaRPr lang="en-GB" sz="2400" dirty="0"/>
+          </a:p>
+        </p:txBody>
+      </p:sp>
+      <p:pic>
+        <p:nvPicPr>
+          <p:cNvPr id="3" name="Grafik 2"/>
           <p:cNvPicPr>
             <a:picLocks noChangeAspect="1"/>
           </p:cNvPicPr>
@@ -4653,254 +4607,14 @@
         </p:blipFill>
         <p:spPr>
           <a:xfrm>
-            <a:off x="6007637" y="1938655"/>
-            <a:ext cx="5938963" cy="4711700"/>
+            <a:off x="6074726" y="1641973"/>
+            <a:ext cx="5980262" cy="4738255"/>
           </a:xfrm>
           <a:prstGeom prst="rect">
             <a:avLst/>
           </a:prstGeom>
         </p:spPr>
       </p:pic>
-      <p:sp>
-        <p:nvSpPr>
-          <p:cNvPr id="6" name="Content Placeholder 2">
-            <a:extLst>
-              <a:ext uri="{FF2B5EF4-FFF2-40B4-BE49-F238E27FC236}">
-                <a16:creationId xmlns:a16="http://schemas.microsoft.com/office/drawing/2014/main" id="{78CA1F25-BAFB-4CE3-9C14-7750D71C99C2}"/>
-              </a:ext>
-            </a:extLst>
-          </p:cNvPr>
-          <p:cNvSpPr>
-            <a:spLocks noGrp="1"/>
-          </p:cNvSpPr>
-          <p:nvPr>
-            <p:ph idx="1"/>
-          </p:nvPr>
-        </p:nvSpPr>
-        <p:spPr>
-          <a:xfrm>
-            <a:off x="610225" y="1305007"/>
-            <a:ext cx="4933325" cy="5412189"/>
-          </a:xfrm>
-        </p:spPr>
-        <p:txBody>
-          <a:bodyPr>
-            <a:normAutofit fontScale="92500"/>
-          </a:bodyPr>
-          <a:lstStyle/>
-          <a:p>
-            <a:pPr>
-              <a:buClr>
-                <a:srgbClr val="FFC000"/>
-              </a:buClr>
-              <a:buFont typeface="Wingdings" panose="05000000000000000000" pitchFamily="2" charset="2"/>
-              <a:buChar char="§"/>
-            </a:pPr>
-            <a:r>
-              <a:rPr lang="en-GB" sz="2400" b="1" dirty="0"/>
-              <a:t>Binary tree block packing algorithm:</a:t>
-            </a:r>
-          </a:p>
-          <a:p>
-            <a:pPr>
-              <a:buClr>
-                <a:srgbClr val="FFC000"/>
-              </a:buClr>
-              <a:buFont typeface="Wingdings" panose="05000000000000000000" pitchFamily="2" charset="2"/>
-              <a:buChar char="§"/>
-            </a:pPr>
-            <a:endParaRPr lang="en-GB" sz="2400" dirty="0"/>
-          </a:p>
-          <a:p>
-            <a:pPr marL="457200" indent="-457200">
-              <a:buClr>
-                <a:srgbClr val="FFC000"/>
-              </a:buClr>
-              <a:buFont typeface="+mj-lt"/>
-              <a:buAutoNum type="arabicPeriod"/>
-            </a:pPr>
-            <a:r>
-              <a:rPr lang="en-GB" sz="2400" b="1" dirty="0"/>
-              <a:t>Sort blocks </a:t>
-            </a:r>
-            <a:r>
-              <a:rPr lang="en-GB" sz="2400" dirty="0"/>
-              <a:t>(clones) based on selected </a:t>
-            </a:r>
-            <a:r>
-              <a:rPr lang="en-GB" sz="2400" dirty="0" err="1"/>
-              <a:t>sortOrder</a:t>
-            </a:r>
-            <a:r>
-              <a:rPr lang="en-GB" sz="2400" dirty="0"/>
-              <a:t> option (none, width, height, area, </a:t>
-            </a:r>
-            <a:r>
-              <a:rPr lang="en-GB" sz="2400" b="1" dirty="0" err="1"/>
-              <a:t>maxSide</a:t>
-            </a:r>
-            <a:r>
-              <a:rPr lang="en-GB" sz="2400" b="1" dirty="0"/>
-              <a:t>)</a:t>
-            </a:r>
-          </a:p>
-          <a:p>
-            <a:pPr marL="457200" indent="-457200">
-              <a:buClr>
-                <a:srgbClr val="FFC000"/>
-              </a:buClr>
-              <a:buFont typeface="+mj-lt"/>
-              <a:buAutoNum type="arabicPeriod"/>
-            </a:pPr>
-            <a:r>
-              <a:rPr lang="en-GB" sz="2400" b="1" dirty="0"/>
-              <a:t>Place first </a:t>
-            </a:r>
-            <a:r>
-              <a:rPr lang="en-GB" sz="2400" dirty="0"/>
-              <a:t>(root) </a:t>
-            </a:r>
-            <a:r>
-              <a:rPr lang="en-GB" sz="2400" b="1" dirty="0"/>
-              <a:t>block</a:t>
-            </a:r>
-            <a:r>
-              <a:rPr lang="en-GB" sz="2400" dirty="0"/>
-              <a:t> at (0, 0).</a:t>
-            </a:r>
-          </a:p>
-          <a:p>
-            <a:pPr marL="457200" indent="-457200">
-              <a:buClr>
-                <a:srgbClr val="FFC000"/>
-              </a:buClr>
-              <a:buFont typeface="+mj-lt"/>
-              <a:buAutoNum type="arabicPeriod"/>
-            </a:pPr>
-            <a:r>
-              <a:rPr lang="en-GB" sz="2400" b="1" dirty="0"/>
-              <a:t>Place next block </a:t>
-            </a:r>
-            <a:r>
-              <a:rPr lang="en-GB" sz="2400" dirty="0"/>
-              <a:t>either right or bellow of previous (minimize area)</a:t>
-            </a:r>
-          </a:p>
-          <a:p>
-            <a:pPr marL="457200" indent="-457200">
-              <a:buClr>
-                <a:srgbClr val="FFC000"/>
-              </a:buClr>
-              <a:buFont typeface="+mj-lt"/>
-              <a:buAutoNum type="arabicPeriod"/>
-            </a:pPr>
-            <a:r>
-              <a:rPr lang="en-GB" sz="2400" b="1" dirty="0"/>
-              <a:t>Repeat</a:t>
-            </a:r>
-            <a:r>
-              <a:rPr lang="en-GB" sz="2400" dirty="0"/>
-              <a:t> 3 until all blocks placed.</a:t>
-            </a:r>
-          </a:p>
-          <a:p>
-            <a:pPr marL="457200" indent="-457200">
-              <a:buClr>
-                <a:srgbClr val="FFC000"/>
-              </a:buClr>
-              <a:buFont typeface="+mj-lt"/>
-              <a:buAutoNum type="arabicPeriod"/>
-            </a:pPr>
-            <a:r>
-              <a:rPr lang="en-GB" sz="2400" b="1" dirty="0"/>
-              <a:t>Update properties </a:t>
-            </a:r>
-            <a:r>
-              <a:rPr lang="en-GB" sz="2400" dirty="0"/>
-              <a:t>in original objects.</a:t>
-            </a:r>
-          </a:p>
-          <a:p>
-            <a:pPr marL="457200" indent="-457200">
-              <a:buClr>
-                <a:srgbClr val="FFC000"/>
-              </a:buClr>
-              <a:buFont typeface="+mj-lt"/>
-              <a:buAutoNum type="arabicPeriod"/>
-            </a:pPr>
-            <a:endParaRPr lang="en-GB" sz="2400" dirty="0"/>
-          </a:p>
-          <a:p>
-            <a:pPr>
-              <a:buClr>
-                <a:srgbClr val="FFC000"/>
-              </a:buClr>
-            </a:pPr>
-            <a:r>
-              <a:rPr lang="en-GB" sz="2400" dirty="0"/>
-              <a:t>Sehr </a:t>
-            </a:r>
-            <a:r>
-              <a:rPr lang="en-GB" sz="2400" dirty="0" err="1"/>
-              <a:t>gute</a:t>
-            </a:r>
-            <a:r>
-              <a:rPr lang="en-GB" sz="2400" dirty="0"/>
-              <a:t> </a:t>
-            </a:r>
-            <a:r>
-              <a:rPr lang="en-GB" sz="2400" dirty="0" err="1"/>
-              <a:t>Ergebnisse</a:t>
-            </a:r>
-            <a:r>
-              <a:rPr lang="en-GB" sz="2400" dirty="0"/>
-              <a:t> für Blocks die </a:t>
-            </a:r>
-            <a:r>
-              <a:rPr lang="en-GB" sz="2400" dirty="0" err="1"/>
-              <a:t>nur</a:t>
-            </a:r>
-            <a:r>
-              <a:rPr lang="en-GB" sz="2400" dirty="0"/>
-              <a:t> </a:t>
-            </a:r>
-            <a:r>
-              <a:rPr lang="en-GB" sz="2400" dirty="0" err="1"/>
-              <a:t>Groupen</a:t>
-            </a:r>
-            <a:r>
-              <a:rPr lang="en-GB" sz="2400" dirty="0"/>
-              <a:t> </a:t>
-            </a:r>
-            <a:r>
-              <a:rPr lang="en-GB" sz="2400" dirty="0" err="1"/>
-              <a:t>sind</a:t>
-            </a:r>
-            <a:r>
-              <a:rPr lang="en-GB" sz="2400" dirty="0"/>
-              <a:t> (</a:t>
-            </a:r>
-            <a:r>
-              <a:rPr lang="en-GB" sz="2400" dirty="0" err="1"/>
-              <a:t>ohne</a:t>
-            </a:r>
-            <a:r>
-              <a:rPr lang="en-GB" sz="2400" dirty="0"/>
-              <a:t> Shapes)</a:t>
-            </a:r>
-          </a:p>
-          <a:p>
-            <a:pPr marL="457200" indent="-457200">
-              <a:buClr>
-                <a:srgbClr val="FFC000"/>
-              </a:buClr>
-              <a:buFont typeface="+mj-lt"/>
-              <a:buAutoNum type="arabicPeriod"/>
-            </a:pPr>
-            <a:endParaRPr lang="en-GB" sz="2400" dirty="0"/>
-          </a:p>
-        </p:txBody>
-      </p:sp>
     </p:spTree>
     <p:extLst>
       <p:ext uri="{BB962C8B-B14F-4D97-AF65-F5344CB8AC3E}">
@@ -4954,16 +4668,32 @@
           <a:lstStyle/>
           <a:p>
             <a:r>
-              <a:rPr lang="en-US" sz="3200" b="1" dirty="0">
+              <a:rPr lang="en-GB" sz="3200" b="1" dirty="0" smtClean="0">
                 <a:solidFill>
                   <a:srgbClr val="339966"/>
                 </a:solidFill>
-                <a:uFillTx/>
-              </a:rPr>
-              <a:t>Issues and Challenges</a:t>
+              </a:rPr>
+              <a:t>3.2 </a:t>
+            </a:r>
+            <a:r>
+              <a:rPr lang="en-GB" sz="3200" b="1" dirty="0" err="1" smtClean="0">
+                <a:solidFill>
+                  <a:srgbClr val="339966"/>
+                </a:solidFill>
+              </a:rPr>
+              <a:t>packBlocks</a:t>
+            </a:r>
+            <a:r>
+              <a:rPr lang="en-GB" sz="3200" b="1" dirty="0">
+                <a:solidFill>
+                  <a:srgbClr val="339966"/>
+                </a:solidFill>
+                <a:uFillTx/>
+              </a:rPr>
+              <a:t>()</a:t>
             </a:r>
             <a:br>
-              <a:rPr lang="en-US" sz="3200" b="1" dirty="0">
+              <a:rPr lang="en-GB" sz="3200" b="1" dirty="0">
                 <a:solidFill>
                   <a:srgbClr val="339966"/>
                 </a:solidFill>
@@ -4971,17 +4701,27 @@
               </a:rPr>
             </a:br>
             <a:r>
-              <a:rPr lang="en-US" sz="1600" b="1" dirty="0">
+              <a:rPr lang="en-GB" sz="1600" b="1" dirty="0" smtClean="0">
                 <a:solidFill>
                   <a:schemeClr val="bg1">
                     <a:lumMod val="50000"/>
                   </a:schemeClr>
                 </a:solidFill>
-                <a:uFillTx/>
-              </a:rPr>
-              <a:t>Weekly Sprint 14</a:t>
-            </a:r>
-            <a:endParaRPr lang="en-US" sz="3200" dirty="0">
+              </a:rPr>
+              <a:t>Sort Order Options</a:t>
+            </a:r>
+            <a:r>
+              <a:rPr lang="en-GB" sz="1600" b="1" dirty="0" smtClean="0">
+                <a:solidFill>
+                  <a:schemeClr val="bg1">
+                    <a:lumMod val="50000"/>
+                  </a:schemeClr>
+                </a:solidFill>
+                <a:uFillTx/>
+              </a:rPr>
+              <a:t> </a:t>
+            </a:r>
+            <a:endParaRPr lang="en-GB" sz="3200" dirty="0">
               <a:solidFill>
                 <a:schemeClr val="bg1">
                   <a:lumMod val="50000"/>
@@ -4994,7 +4734,7 @@
       </p:sp>
       <p:pic>
         <p:nvPicPr>
-          <p:cNvPr id="3" name="Picture 2" descr="Image result for gefasoft logo svg"/>
+          <p:cNvPr id="9" name="Picture 2" descr="Image result for gefasoft logo svg"/>
           <p:cNvPicPr>
             <a:picLocks noChangeAspect="1" noChangeArrowheads="1"/>
           </p:cNvPicPr>
@@ -5018,9 +4758,479 @@
           <a:noFill/>
         </p:spPr>
       </p:pic>
+      <p:grpSp>
+        <p:nvGrpSpPr>
+          <p:cNvPr id="19" name="Gruppieren 18"/>
+          <p:cNvGrpSpPr/>
+          <p:nvPr/>
+        </p:nvGrpSpPr>
+        <p:grpSpPr>
+          <a:xfrm>
+            <a:off x="357569" y="2351701"/>
+            <a:ext cx="2140410" cy="2406451"/>
+            <a:chOff x="266700" y="3022601"/>
+            <a:chExt cx="2140410" cy="2406451"/>
+          </a:xfrm>
+        </p:grpSpPr>
+        <p:pic>
+          <p:nvPicPr>
+            <p:cNvPr id="11" name="Grafik 10"/>
+            <p:cNvPicPr>
+              <a:picLocks noChangeAspect="1"/>
+            </p:cNvPicPr>
+            <p:nvPr/>
+          </p:nvPicPr>
+          <p:blipFill rotWithShape="1">
+            <a:blip r:embed="rId3" cstate="print">
+              <a:extLst>
+                <a:ext uri="{28A0092B-C50C-407E-A947-70E740481C1C}">
+                  <a14:useLocalDpi xmlns:a14="http://schemas.microsoft.com/office/drawing/2010/main" val="0"/>
+                </a:ext>
+              </a:extLst>
+            </a:blip>
+            <a:srcRect l="24192" t="15205" b="6558"/>
+            <a:stretch/>
+          </p:blipFill>
+          <p:spPr>
+            <a:xfrm>
+              <a:off x="266700" y="3022601"/>
+              <a:ext cx="2140410" cy="2098674"/>
+            </a:xfrm>
+            <a:prstGeom prst="rect">
+              <a:avLst/>
+            </a:prstGeom>
+          </p:spPr>
+        </p:pic>
+        <p:sp>
+          <p:nvSpPr>
+            <p:cNvPr id="12" name="Textfeld 11"/>
+            <p:cNvSpPr txBox="1"/>
+            <p:nvPr/>
+          </p:nvSpPr>
+          <p:spPr>
+            <a:xfrm>
+              <a:off x="763326" y="5121275"/>
+              <a:ext cx="1147157" cy="307777"/>
+            </a:xfrm>
+            <a:prstGeom prst="rect">
+              <a:avLst/>
+            </a:prstGeom>
+          </p:spPr>
+          <p:txBody>
+            <a:bodyPr wrap="square" rtlCol="0">
+              <a:spAutoFit/>
+            </a:bodyPr>
+            <a:lstStyle/>
+            <a:p>
+              <a:pPr algn="ctr"/>
+              <a:r>
+                <a:rPr lang="de-DE" sz="1400" dirty="0" err="1" smtClean="0"/>
+                <a:t>by</a:t>
+              </a:r>
+              <a:r>
+                <a:rPr lang="de-DE" sz="1400" dirty="0" smtClean="0"/>
+                <a:t> </a:t>
+              </a:r>
+              <a:r>
+                <a:rPr lang="de-DE" sz="1400" dirty="0" err="1" smtClean="0"/>
+                <a:t>width</a:t>
+              </a:r>
+              <a:endParaRPr lang="de-DE" sz="1400" dirty="0"/>
+            </a:p>
+          </p:txBody>
+        </p:sp>
+      </p:grpSp>
+      <p:grpSp>
+        <p:nvGrpSpPr>
+          <p:cNvPr id="23" name="Gruppieren 22"/>
+          <p:cNvGrpSpPr/>
+          <p:nvPr/>
+        </p:nvGrpSpPr>
+        <p:grpSpPr>
+          <a:xfrm>
+            <a:off x="9704968" y="2983808"/>
+            <a:ext cx="2103120" cy="1542494"/>
+            <a:chOff x="8534401" y="4190999"/>
+            <a:chExt cx="2103120" cy="1542494"/>
+          </a:xfrm>
+        </p:grpSpPr>
+        <p:pic>
+          <p:nvPicPr>
+            <p:cNvPr id="8" name="Grafik 7"/>
+            <p:cNvPicPr>
+              <a:picLocks noChangeAspect="1"/>
+            </p:cNvPicPr>
+            <p:nvPr/>
+          </p:nvPicPr>
+          <p:blipFill rotWithShape="1">
+            <a:blip r:embed="rId4" cstate="print">
+              <a:extLst>
+                <a:ext uri="{28A0092B-C50C-407E-A947-70E740481C1C}">
+                  <a14:useLocalDpi xmlns:a14="http://schemas.microsoft.com/office/drawing/2010/main" val="0"/>
+                </a:ext>
+              </a:extLst>
+            </a:blip>
+            <a:srcRect l="24115" t="15221" r="892" b="45466"/>
+            <a:stretch/>
+          </p:blipFill>
+          <p:spPr>
+            <a:xfrm>
+              <a:off x="8534401" y="4190999"/>
+              <a:ext cx="2103120" cy="1051561"/>
+            </a:xfrm>
+            <a:prstGeom prst="rect">
+              <a:avLst/>
+            </a:prstGeom>
+          </p:spPr>
+        </p:pic>
+        <p:sp>
+          <p:nvSpPr>
+            <p:cNvPr id="14" name="Textfeld 13"/>
+            <p:cNvSpPr txBox="1"/>
+            <p:nvPr/>
+          </p:nvSpPr>
+          <p:spPr>
+            <a:xfrm>
+              <a:off x="9012382" y="5210273"/>
+              <a:ext cx="1147157" cy="523220"/>
+            </a:xfrm>
+            <a:prstGeom prst="rect">
+              <a:avLst/>
+            </a:prstGeom>
+          </p:spPr>
+          <p:txBody>
+            <a:bodyPr wrap="square" rtlCol="0">
+              <a:spAutoFit/>
+            </a:bodyPr>
+            <a:lstStyle/>
+            <a:p>
+              <a:pPr algn="ctr"/>
+              <a:r>
+                <a:rPr lang="de-DE" sz="1400" dirty="0" err="1" smtClean="0"/>
+                <a:t>none</a:t>
+              </a:r>
+              <a:r>
+                <a:rPr lang="de-DE" sz="1400" dirty="0" smtClean="0"/>
+                <a:t> (</a:t>
+              </a:r>
+              <a:r>
+                <a:rPr lang="de-DE" sz="1400" dirty="0" err="1" smtClean="0"/>
+                <a:t>default</a:t>
+              </a:r>
+              <a:r>
+                <a:rPr lang="de-DE" sz="1400" dirty="0" smtClean="0"/>
+                <a:t>)</a:t>
+              </a:r>
+              <a:endParaRPr lang="de-DE" sz="1400" dirty="0"/>
+            </a:p>
+          </p:txBody>
+        </p:sp>
+      </p:grpSp>
+      <p:grpSp>
+        <p:nvGrpSpPr>
+          <p:cNvPr id="22" name="Gruppieren 21"/>
+          <p:cNvGrpSpPr/>
+          <p:nvPr/>
+        </p:nvGrpSpPr>
+        <p:grpSpPr>
+          <a:xfrm>
+            <a:off x="5023850" y="2878433"/>
+            <a:ext cx="2133600" cy="1571942"/>
+            <a:chOff x="5356860" y="2484120"/>
+            <a:chExt cx="2133600" cy="1571942"/>
+          </a:xfrm>
+        </p:grpSpPr>
+        <p:pic>
+          <p:nvPicPr>
+            <p:cNvPr id="4" name="Grafik 3"/>
+            <p:cNvPicPr>
+              <a:picLocks noChangeAspect="1"/>
+            </p:cNvPicPr>
+            <p:nvPr/>
+          </p:nvPicPr>
+          <p:blipFill rotWithShape="1">
+            <a:blip r:embed="rId5" cstate="print">
+              <a:extLst>
+                <a:ext uri="{28A0092B-C50C-407E-A947-70E740481C1C}">
+                  <a14:useLocalDpi xmlns:a14="http://schemas.microsoft.com/office/drawing/2010/main" val="0"/>
+                </a:ext>
+              </a:extLst>
+            </a:blip>
+            <a:srcRect l="23963" t="14876" r="876" b="37253"/>
+            <a:stretch/>
+          </p:blipFill>
+          <p:spPr>
+            <a:xfrm>
+              <a:off x="5356860" y="2484120"/>
+              <a:ext cx="2133600" cy="1287780"/>
+            </a:xfrm>
+            <a:prstGeom prst="rect">
+              <a:avLst/>
+            </a:prstGeom>
+          </p:spPr>
+        </p:pic>
+        <p:sp>
+          <p:nvSpPr>
+            <p:cNvPr id="15" name="Textfeld 14"/>
+            <p:cNvSpPr txBox="1"/>
+            <p:nvPr/>
+          </p:nvSpPr>
+          <p:spPr>
+            <a:xfrm>
+              <a:off x="5850081" y="3748285"/>
+              <a:ext cx="1147157" cy="307777"/>
+            </a:xfrm>
+            <a:prstGeom prst="rect">
+              <a:avLst/>
+            </a:prstGeom>
+          </p:spPr>
+          <p:txBody>
+            <a:bodyPr wrap="square" rtlCol="0">
+              <a:spAutoFit/>
+            </a:bodyPr>
+            <a:lstStyle/>
+            <a:p>
+              <a:pPr algn="ctr"/>
+              <a:r>
+                <a:rPr lang="de-DE" sz="1400" dirty="0" err="1" smtClean="0"/>
+                <a:t>by</a:t>
+              </a:r>
+              <a:r>
+                <a:rPr lang="de-DE" sz="1400" dirty="0" smtClean="0"/>
+                <a:t> </a:t>
+              </a:r>
+              <a:r>
+                <a:rPr lang="de-DE" sz="1400" dirty="0" err="1" smtClean="0"/>
+                <a:t>area</a:t>
+              </a:r>
+              <a:endParaRPr lang="de-DE" sz="1400" dirty="0"/>
+            </a:p>
+          </p:txBody>
+        </p:sp>
+      </p:grpSp>
+      <p:grpSp>
+        <p:nvGrpSpPr>
+          <p:cNvPr id="20" name="Gruppieren 19"/>
+          <p:cNvGrpSpPr/>
+          <p:nvPr/>
+        </p:nvGrpSpPr>
+        <p:grpSpPr>
+          <a:xfrm>
+            <a:off x="2681703" y="2983808"/>
+            <a:ext cx="2128838" cy="1385176"/>
+            <a:chOff x="5500688" y="2652713"/>
+            <a:chExt cx="2128838" cy="1385176"/>
+          </a:xfrm>
+        </p:grpSpPr>
+        <p:pic>
+          <p:nvPicPr>
+            <p:cNvPr id="5" name="Grafik 4"/>
+            <p:cNvPicPr>
+              <a:picLocks noChangeAspect="1"/>
+            </p:cNvPicPr>
+            <p:nvPr/>
+          </p:nvPicPr>
+          <p:blipFill rotWithShape="1">
+            <a:blip r:embed="rId6" cstate="print">
+              <a:extLst>
+                <a:ext uri="{28A0092B-C50C-407E-A947-70E740481C1C}">
+                  <a14:useLocalDpi xmlns:a14="http://schemas.microsoft.com/office/drawing/2010/main" val="0"/>
+                </a:ext>
+              </a:extLst>
+            </a:blip>
+            <a:srcRect l="23779" t="15172" r="1328" b="42508"/>
+            <a:stretch/>
+          </p:blipFill>
+          <p:spPr>
+            <a:xfrm>
+              <a:off x="5500688" y="2652713"/>
+              <a:ext cx="2128838" cy="1125537"/>
+            </a:xfrm>
+            <a:prstGeom prst="rect">
+              <a:avLst/>
+            </a:prstGeom>
+          </p:spPr>
+        </p:pic>
+        <p:sp>
+          <p:nvSpPr>
+            <p:cNvPr id="16" name="Textfeld 15"/>
+            <p:cNvSpPr txBox="1"/>
+            <p:nvPr/>
+          </p:nvSpPr>
+          <p:spPr>
+            <a:xfrm>
+              <a:off x="5991528" y="3730112"/>
+              <a:ext cx="1147157" cy="307777"/>
+            </a:xfrm>
+            <a:prstGeom prst="rect">
+              <a:avLst/>
+            </a:prstGeom>
+          </p:spPr>
+          <p:txBody>
+            <a:bodyPr wrap="square" rtlCol="0">
+              <a:spAutoFit/>
+            </a:bodyPr>
+            <a:lstStyle/>
+            <a:p>
+              <a:pPr algn="ctr"/>
+              <a:r>
+                <a:rPr lang="de-DE" sz="1400" dirty="0" err="1" smtClean="0"/>
+                <a:t>by</a:t>
+              </a:r>
+              <a:r>
+                <a:rPr lang="de-DE" sz="1400" dirty="0" smtClean="0"/>
+                <a:t> </a:t>
+              </a:r>
+              <a:r>
+                <a:rPr lang="de-DE" sz="1400" dirty="0" err="1" smtClean="0"/>
+                <a:t>height</a:t>
+              </a:r>
+              <a:endParaRPr lang="de-DE" sz="1400" dirty="0"/>
+            </a:p>
+          </p:txBody>
+        </p:sp>
+      </p:grpSp>
+      <p:grpSp>
+        <p:nvGrpSpPr>
+          <p:cNvPr id="18" name="Gruppieren 17"/>
+          <p:cNvGrpSpPr/>
+          <p:nvPr/>
+        </p:nvGrpSpPr>
+        <p:grpSpPr>
+          <a:xfrm>
+            <a:off x="7370759" y="2434878"/>
+            <a:ext cx="2120900" cy="2369986"/>
+            <a:chOff x="3362202" y="4340225"/>
+            <a:chExt cx="2120900" cy="2369986"/>
+          </a:xfrm>
+        </p:grpSpPr>
+        <p:pic>
+          <p:nvPicPr>
+            <p:cNvPr id="7" name="Grafik 6"/>
+            <p:cNvPicPr>
+              <a:picLocks noChangeAspect="1"/>
+            </p:cNvPicPr>
+            <p:nvPr/>
+          </p:nvPicPr>
+          <p:blipFill rotWithShape="1">
+            <a:blip r:embed="rId7" cstate="print">
+              <a:extLst>
+                <a:ext uri="{28A0092B-C50C-407E-A947-70E740481C1C}">
+                  <a14:useLocalDpi xmlns:a14="http://schemas.microsoft.com/office/drawing/2010/main" val="0"/>
+                </a:ext>
+              </a:extLst>
+            </a:blip>
+            <a:srcRect l="24444" t="15779" r="842" b="7442"/>
+            <a:stretch/>
+          </p:blipFill>
+          <p:spPr>
+            <a:xfrm>
+              <a:off x="3362202" y="4340225"/>
+              <a:ext cx="2120900" cy="2047875"/>
+            </a:xfrm>
+            <a:prstGeom prst="rect">
+              <a:avLst/>
+            </a:prstGeom>
+          </p:spPr>
+        </p:pic>
+        <p:sp>
+          <p:nvSpPr>
+            <p:cNvPr id="17" name="Textfeld 16"/>
+            <p:cNvSpPr txBox="1"/>
+            <p:nvPr/>
+          </p:nvSpPr>
+          <p:spPr>
+            <a:xfrm>
+              <a:off x="3849073" y="6402434"/>
+              <a:ext cx="1147157" cy="307777"/>
+            </a:xfrm>
+            <a:prstGeom prst="rect">
+              <a:avLst/>
+            </a:prstGeom>
+          </p:spPr>
+          <p:txBody>
+            <a:bodyPr wrap="square" rtlCol="0">
+              <a:spAutoFit/>
+            </a:bodyPr>
+            <a:lstStyle/>
+            <a:p>
+              <a:pPr algn="ctr"/>
+              <a:r>
+                <a:rPr lang="de-DE" sz="1400" b="1" dirty="0" err="1" smtClean="0"/>
+                <a:t>by</a:t>
+              </a:r>
+              <a:r>
+                <a:rPr lang="de-DE" sz="1400" b="1" dirty="0" smtClean="0"/>
+                <a:t> </a:t>
+              </a:r>
+              <a:r>
+                <a:rPr lang="de-DE" sz="1400" b="1" dirty="0" err="1" smtClean="0"/>
+                <a:t>maxSide</a:t>
+              </a:r>
+              <a:endParaRPr lang="de-DE" sz="1400" b="1" dirty="0"/>
+            </a:p>
+          </p:txBody>
+        </p:sp>
+      </p:grpSp>
       <p:sp>
         <p:nvSpPr>
-          <p:cNvPr id="4" name="Content Placeholder 2"/>
+          <p:cNvPr id="25" name="Rectangle 5">
+            <a:extLst>
+              <a:ext uri="{FF2B5EF4-FFF2-40B4-BE49-F238E27FC236}">
+                <a16:creationId xmlns:a16="http://schemas.microsoft.com/office/drawing/2014/main" id="{840023B0-A423-4E13-837F-179F396E82C6}"/>
+              </a:ext>
+            </a:extLst>
+          </p:cNvPr>
+          <p:cNvSpPr/>
+          <p:nvPr/>
+        </p:nvSpPr>
+        <p:spPr>
+          <a:xfrm>
+            <a:off x="7257143" y="2264229"/>
+            <a:ext cx="2336725" cy="2584092"/>
+          </a:xfrm>
+          <a:prstGeom prst="rect">
+            <a:avLst/>
+          </a:prstGeom>
+          <a:noFill/>
+          <a:ln w="38100">
+            <a:solidFill>
+              <a:srgbClr val="FF0000"/>
+            </a:solidFill>
+          </a:ln>
+        </p:spPr>
+        <p:style>
+          <a:lnRef idx="1">
+            <a:schemeClr val="accent1"/>
+          </a:lnRef>
+          <a:fillRef idx="1">
+            <a:schemeClr val="accent1"/>
+          </a:fillRef>
+          <a:effectRef idx="1">
+            <a:schemeClr val="accent1"/>
+          </a:effectRef>
+          <a:fontRef idx="minor">
+            <a:schemeClr val="lt1"/>
+          </a:fontRef>
+        </p:style>
+        <p:txBody>
+          <a:bodyPr rtlCol="0" anchor="ctr"/>
+          <a:lstStyle/>
+          <a:p>
+            <a:pPr algn="ctr"/>
+            <a:endParaRPr lang="en-US" dirty="0"/>
+          </a:p>
+        </p:txBody>
+      </p:sp>
+      <p:sp>
+        <p:nvSpPr>
+          <p:cNvPr id="26" name="Content Placeholder 2">
+            <a:extLst>
+              <a:ext uri="{FF2B5EF4-FFF2-40B4-BE49-F238E27FC236}">
+                <a16:creationId xmlns:a16="http://schemas.microsoft.com/office/drawing/2014/main" id="{78CA1F25-BAFB-4CE3-9C14-7750D71C99C2}"/>
+              </a:ext>
+            </a:extLst>
+          </p:cNvPr>
           <p:cNvSpPr>
             <a:spLocks noGrp="1"/>
           </p:cNvSpPr>
@@ -5030,8 +5240,8 @@
         </p:nvSpPr>
         <p:spPr>
           <a:xfrm>
-            <a:off x="610225" y="1305007"/>
-            <a:ext cx="10949976" cy="5412189"/>
+            <a:off x="610225" y="1291771"/>
+            <a:ext cx="10768975" cy="5425425"/>
           </a:xfrm>
         </p:spPr>
         <p:txBody>
@@ -5040,7 +5250,7 @@
           </a:bodyPr>
           <a:lstStyle/>
           <a:p>
-            <a:pPr algn="just">
+            <a:pPr>
               <a:buClr>
                 <a:srgbClr val="FFC000"/>
               </a:buClr>
@@ -5048,744 +5258,37 @@
               <a:buChar char="§"/>
             </a:pPr>
             <a:r>
-              <a:rPr lang="en-GB" sz="2000" dirty="0" err="1"/>
-              <a:t>Stillstand</a:t>
-            </a:r>
-            <a:r>
-              <a:rPr lang="en-GB" sz="2000" dirty="0"/>
+              <a:rPr lang="en-GB" sz="2400" dirty="0" err="1" smtClean="0"/>
+              <a:t>Beispiel</a:t>
+            </a:r>
+            <a:r>
+              <a:rPr lang="en-GB" sz="2400" dirty="0" smtClean="0"/>
               <a:t> </a:t>
             </a:r>
             <a:r>
-              <a:rPr lang="en-GB" sz="2000" dirty="0" err="1"/>
-              <a:t>beim</a:t>
-            </a:r>
-            <a:r>
-              <a:rPr lang="en-GB" sz="2000" dirty="0"/>
-              <a:t> </a:t>
-            </a:r>
-            <a:r>
-              <a:rPr lang="en-GB" sz="2000" dirty="0" err="1"/>
-              <a:t>vertexPlacement</a:t>
-            </a:r>
-            <a:r>
-              <a:rPr lang="en-GB" sz="2000" dirty="0"/>
-              <a:t> </a:t>
-            </a:r>
-            <a:r>
-              <a:rPr lang="en-GB" sz="2000" dirty="0" err="1"/>
-              <a:t>Algorithmus</a:t>
-            </a:r>
-            <a:endParaRPr lang="en-GB" sz="2000" dirty="0"/>
-          </a:p>
-          <a:p>
-            <a:pPr lvl="1" algn="just">
+              <a:rPr lang="en-GB" sz="2400" dirty="0" err="1" smtClean="0"/>
+              <a:t>mit</a:t>
+            </a:r>
+            <a:r>
+              <a:rPr lang="en-GB" sz="2400" dirty="0" smtClean="0"/>
+              <a:t> 4 Units in Brewery (block dimensions to scale)</a:t>
+            </a:r>
+          </a:p>
+          <a:p>
+            <a:pPr marL="0" indent="0">
               <a:buClr>
                 <a:srgbClr val="FFC000"/>
               </a:buClr>
-              <a:buFont typeface="Wingdings" panose="05000000000000000000" pitchFamily="2" charset="2"/>
-              <a:buChar char="§"/>
+              <a:buNone/>
             </a:pPr>
-            <a:r>
-              <a:rPr lang="en-GB" sz="1600" dirty="0" err="1">
-                <a:uFillTx/>
-              </a:rPr>
-              <a:t>Alles</a:t>
-            </a:r>
-            <a:r>
-              <a:rPr lang="en-GB" sz="1600" dirty="0">
-                <a:uFillTx/>
-              </a:rPr>
-              <a:t> </a:t>
-            </a:r>
-            <a:r>
-              <a:rPr lang="en-GB" sz="1600" dirty="0" err="1">
-                <a:uFillTx/>
-              </a:rPr>
-              <a:t>wofür</a:t>
-            </a:r>
-            <a:r>
-              <a:rPr lang="en-GB" sz="1600" dirty="0">
-                <a:uFillTx/>
-              </a:rPr>
-              <a:t> </a:t>
-            </a:r>
-            <a:r>
-              <a:rPr lang="en-GB" sz="1600" dirty="0" err="1">
-                <a:uFillTx/>
-              </a:rPr>
-              <a:t>es</a:t>
-            </a:r>
-            <a:r>
-              <a:rPr lang="en-GB" sz="1600" dirty="0">
-                <a:uFillTx/>
-              </a:rPr>
-              <a:t> </a:t>
-            </a:r>
-            <a:r>
-              <a:rPr lang="en-GB" sz="1600" dirty="0" err="1">
-                <a:uFillTx/>
-              </a:rPr>
-              <a:t>eine</a:t>
-            </a:r>
-            <a:r>
-              <a:rPr lang="en-GB" sz="1600" dirty="0">
-                <a:uFillTx/>
-              </a:rPr>
-              <a:t> </a:t>
-            </a:r>
-            <a:r>
-              <a:rPr lang="en-GB" sz="1600" dirty="0" err="1">
-                <a:uFillTx/>
-              </a:rPr>
-              <a:t>bestimmte</a:t>
-            </a:r>
-            <a:r>
-              <a:rPr lang="en-GB" sz="1600" dirty="0">
-                <a:uFillTx/>
-              </a:rPr>
-              <a:t> </a:t>
-            </a:r>
-            <a:r>
-              <a:rPr lang="en-GB" sz="1600" dirty="0" err="1">
-                <a:uFillTx/>
-              </a:rPr>
-              <a:t>Logik</a:t>
-            </a:r>
-            <a:r>
-              <a:rPr lang="en-GB" sz="1600" dirty="0">
-                <a:uFillTx/>
-              </a:rPr>
-              <a:t> </a:t>
-            </a:r>
-            <a:r>
-              <a:rPr lang="en-GB" sz="1600" dirty="0" err="1">
-                <a:uFillTx/>
-              </a:rPr>
-              <a:t>dahinter</a:t>
-            </a:r>
-            <a:r>
-              <a:rPr lang="en-GB" sz="1600" dirty="0">
-                <a:uFillTx/>
-              </a:rPr>
-              <a:t> </a:t>
-            </a:r>
-            <a:r>
-              <a:rPr lang="en-GB" sz="1600" dirty="0" err="1">
-                <a:uFillTx/>
-              </a:rPr>
-              <a:t>gibt</a:t>
-            </a:r>
-            <a:r>
-              <a:rPr lang="en-GB" sz="1600" dirty="0">
-                <a:uFillTx/>
-              </a:rPr>
-              <a:t>, </a:t>
-            </a:r>
-            <a:r>
-              <a:rPr lang="en-GB" sz="1600" dirty="0" err="1">
-                <a:uFillTx/>
-              </a:rPr>
-              <a:t>wird</a:t>
-            </a:r>
-            <a:r>
-              <a:rPr lang="en-GB" sz="1600" dirty="0">
-                <a:uFillTx/>
-              </a:rPr>
-              <a:t> </a:t>
-            </a:r>
-            <a:r>
-              <a:rPr lang="en-GB" sz="1600" dirty="0" err="1">
-                <a:uFillTx/>
-              </a:rPr>
-              <a:t>schon</a:t>
-            </a:r>
-            <a:r>
-              <a:rPr lang="en-GB" sz="1600" dirty="0">
-                <a:uFillTx/>
-              </a:rPr>
-              <a:t> </a:t>
-            </a:r>
-            <a:r>
-              <a:rPr lang="en-GB" sz="1600" dirty="0" err="1">
-                <a:uFillTx/>
-              </a:rPr>
-              <a:t>entsprechend</a:t>
-            </a:r>
-            <a:r>
-              <a:rPr lang="en-GB" sz="1600" dirty="0">
-                <a:uFillTx/>
-              </a:rPr>
-              <a:t> </a:t>
-            </a:r>
-            <a:r>
-              <a:rPr lang="en-GB" sz="1600" dirty="0" err="1">
-                <a:uFillTx/>
-              </a:rPr>
-              <a:t>dieser</a:t>
-            </a:r>
-            <a:r>
-              <a:rPr lang="en-GB" sz="1600" dirty="0">
-                <a:uFillTx/>
-              </a:rPr>
-              <a:t> </a:t>
-            </a:r>
-            <a:r>
-              <a:rPr lang="en-GB" sz="1600" dirty="0" err="1">
-                <a:uFillTx/>
-              </a:rPr>
-              <a:t>Logik</a:t>
-            </a:r>
-            <a:r>
-              <a:rPr lang="en-GB" sz="1600" dirty="0">
-                <a:uFillTx/>
-              </a:rPr>
-              <a:t> </a:t>
-            </a:r>
-            <a:r>
-              <a:rPr lang="en-GB" sz="1600" dirty="0" err="1">
-                <a:uFillTx/>
-              </a:rPr>
-              <a:t>platziert</a:t>
-            </a:r>
-            <a:r>
-              <a:rPr lang="en-GB" sz="1600" dirty="0">
-                <a:uFillTx/>
-              </a:rPr>
-              <a:t>.</a:t>
-            </a:r>
-          </a:p>
-          <a:p>
-            <a:pPr lvl="1" algn="just">
-              <a:buClr>
-                <a:srgbClr val="FFC000"/>
-              </a:buClr>
-              <a:buFont typeface="Wingdings" panose="05000000000000000000" pitchFamily="2" charset="2"/>
-              <a:buChar char="§"/>
-            </a:pPr>
-            <a:r>
-              <a:rPr lang="en-GB" sz="1600" dirty="0" err="1"/>
-              <a:t>Nich</a:t>
-            </a:r>
-            <a:r>
-              <a:rPr lang="en-GB" sz="1600" dirty="0"/>
-              <a:t> </a:t>
-            </a:r>
-            <a:r>
-              <a:rPr lang="en-GB" sz="1600" dirty="0" err="1"/>
-              <a:t>viel</a:t>
-            </a:r>
-            <a:r>
-              <a:rPr lang="en-GB" sz="1600" dirty="0"/>
-              <a:t> </a:t>
-            </a:r>
-            <a:r>
-              <a:rPr lang="en-GB" sz="1600" dirty="0" err="1"/>
-              <a:t>mehr</a:t>
-            </a:r>
-            <a:r>
-              <a:rPr lang="en-GB" sz="1600" dirty="0"/>
-              <a:t> </a:t>
-            </a:r>
-            <a:r>
-              <a:rPr lang="en-GB" sz="1600" dirty="0" err="1"/>
-              <a:t>Logik</a:t>
-            </a:r>
-            <a:r>
-              <a:rPr lang="en-GB" sz="1600" dirty="0"/>
-              <a:t> um das </a:t>
-            </a:r>
-            <a:r>
-              <a:rPr lang="en-GB" sz="1600" dirty="0" err="1"/>
-              <a:t>Platzierungsalgorithmus</a:t>
-            </a:r>
-            <a:r>
-              <a:rPr lang="en-GB" sz="1600" dirty="0"/>
-              <a:t> in </a:t>
-            </a:r>
-            <a:r>
-              <a:rPr lang="en-GB" sz="1600" dirty="0" err="1"/>
-              <a:t>wenig</a:t>
-            </a:r>
-            <a:r>
-              <a:rPr lang="en-GB" sz="1600" dirty="0"/>
-              <a:t> </a:t>
-            </a:r>
-            <a:r>
-              <a:rPr lang="en-GB" sz="1600" dirty="0" err="1"/>
-              <a:t>Zeit</a:t>
-            </a:r>
-            <a:r>
-              <a:rPr lang="en-GB" sz="1600" dirty="0"/>
-              <a:t> </a:t>
-            </a:r>
-            <a:r>
-              <a:rPr lang="en-GB" sz="1600" dirty="0" err="1"/>
-              <a:t>noch</a:t>
-            </a:r>
-            <a:r>
-              <a:rPr lang="en-GB" sz="1600" dirty="0"/>
-              <a:t> </a:t>
-            </a:r>
-            <a:r>
-              <a:rPr lang="en-GB" sz="1600" dirty="0" err="1"/>
-              <a:t>zu</a:t>
-            </a:r>
-            <a:r>
-              <a:rPr lang="en-GB" sz="1600" dirty="0"/>
-              <a:t> </a:t>
-            </a:r>
-            <a:r>
-              <a:rPr lang="en-GB" sz="1600" dirty="0" err="1"/>
-              <a:t>verbessern</a:t>
-            </a:r>
-            <a:r>
-              <a:rPr lang="en-GB" sz="1600" dirty="0"/>
-              <a:t>.</a:t>
-            </a:r>
-          </a:p>
-          <a:p>
-            <a:pPr lvl="1" algn="just">
-              <a:buClr>
-                <a:srgbClr val="FFC000"/>
-              </a:buClr>
-              <a:buFont typeface="Wingdings" panose="05000000000000000000" pitchFamily="2" charset="2"/>
-              <a:buChar char="§"/>
-            </a:pPr>
-            <a:r>
-              <a:rPr lang="en-GB" sz="1600" u="sng" dirty="0" err="1"/>
-              <a:t>Vorteile</a:t>
-            </a:r>
-            <a:r>
-              <a:rPr lang="en-GB" sz="1600" dirty="0"/>
-              <a:t>:</a:t>
-            </a:r>
-          </a:p>
-          <a:p>
-            <a:pPr lvl="2" algn="just">
-              <a:buClr>
-                <a:srgbClr val="FFC000"/>
-              </a:buClr>
-              <a:buFont typeface="Wingdings" panose="05000000000000000000" pitchFamily="2" charset="2"/>
-              <a:buChar char="§"/>
-            </a:pPr>
-            <a:r>
-              <a:rPr lang="en-GB" sz="1600" dirty="0" err="1"/>
-              <a:t>Konzentration</a:t>
-            </a:r>
-            <a:r>
-              <a:rPr lang="en-GB" sz="1600" dirty="0"/>
-              <a:t> auf Data-bindings (</a:t>
-            </a:r>
-            <a:r>
-              <a:rPr lang="en-GB" sz="1600" dirty="0" err="1"/>
-              <a:t>dynamisierung</a:t>
-            </a:r>
-            <a:r>
-              <a:rPr lang="en-GB" sz="1600" dirty="0"/>
-              <a:t>)</a:t>
-            </a:r>
-          </a:p>
-          <a:p>
-            <a:pPr lvl="2" algn="just">
-              <a:buClr>
-                <a:srgbClr val="FFC000"/>
-              </a:buClr>
-              <a:buFont typeface="Wingdings" panose="05000000000000000000" pitchFamily="2" charset="2"/>
-              <a:buChar char="§"/>
-            </a:pPr>
-            <a:r>
-              <a:rPr lang="en-GB" sz="1600" dirty="0" err="1"/>
-              <a:t>Verteci</a:t>
-            </a:r>
-            <a:r>
-              <a:rPr lang="en-GB" sz="1600" dirty="0"/>
-              <a:t> </a:t>
-            </a:r>
-            <a:r>
-              <a:rPr lang="en-GB" sz="1600" dirty="0" err="1"/>
-              <a:t>schon</a:t>
-            </a:r>
-            <a:r>
-              <a:rPr lang="en-GB" sz="1600" dirty="0"/>
-              <a:t> </a:t>
-            </a:r>
-            <a:r>
-              <a:rPr lang="en-GB" sz="1600" dirty="0" err="1"/>
-              <a:t>ziemlich</a:t>
-            </a:r>
-            <a:r>
-              <a:rPr lang="en-GB" sz="1600" dirty="0"/>
-              <a:t> gut </a:t>
-            </a:r>
-            <a:r>
-              <a:rPr lang="en-GB" sz="1600" dirty="0" err="1"/>
-              <a:t>platziert</a:t>
-            </a:r>
-            <a:r>
-              <a:rPr lang="en-GB" sz="1600" dirty="0"/>
-              <a:t> und edges </a:t>
-            </a:r>
-            <a:r>
-              <a:rPr lang="en-GB" sz="1600" dirty="0" err="1"/>
-              <a:t>vereinfacht</a:t>
-            </a:r>
-            <a:endParaRPr lang="en-GB" sz="1600" dirty="0"/>
-          </a:p>
-          <a:p>
-            <a:pPr lvl="2" algn="just">
-              <a:buClr>
-                <a:srgbClr val="FFC000"/>
-              </a:buClr>
-              <a:buFont typeface="Wingdings" panose="05000000000000000000" pitchFamily="2" charset="2"/>
-              <a:buChar char="§"/>
-            </a:pPr>
-            <a:r>
-              <a:rPr lang="en-GB" sz="1600" dirty="0" err="1"/>
-              <a:t>Verbesserungsmöglichkeiten</a:t>
-            </a:r>
-            <a:r>
-              <a:rPr lang="en-GB" sz="1600" dirty="0"/>
-              <a:t> </a:t>
-            </a:r>
-            <a:r>
-              <a:rPr lang="en-GB" sz="1600" dirty="0" err="1"/>
-              <a:t>direkt</a:t>
-            </a:r>
-            <a:r>
-              <a:rPr lang="en-GB" sz="1600" dirty="0"/>
-              <a:t> </a:t>
-            </a:r>
-            <a:r>
-              <a:rPr lang="en-GB" sz="1600" dirty="0" err="1"/>
-              <a:t>im</a:t>
-            </a:r>
-            <a:r>
-              <a:rPr lang="en-GB" sz="1600" dirty="0"/>
-              <a:t> draw.io (</a:t>
-            </a:r>
-            <a:r>
-              <a:rPr lang="en-GB" sz="1600" dirty="0" err="1"/>
-              <a:t>Drag&amp;Drop</a:t>
-            </a:r>
-            <a:r>
-              <a:rPr lang="en-GB" sz="1600" dirty="0"/>
-              <a:t>)</a:t>
-            </a:r>
-          </a:p>
-          <a:p>
-            <a:pPr lvl="1" algn="just">
-              <a:buClr>
-                <a:srgbClr val="FFC000"/>
-              </a:buClr>
-              <a:buFont typeface="Wingdings" panose="05000000000000000000" pitchFamily="2" charset="2"/>
-              <a:buChar char="§"/>
-            </a:pPr>
-            <a:r>
-              <a:rPr lang="en-GB" sz="1600" u="sng" dirty="0" err="1">
-                <a:uFillTx/>
-              </a:rPr>
-              <a:t>Nachteile</a:t>
-            </a:r>
-            <a:r>
-              <a:rPr lang="en-GB" sz="1600" dirty="0">
-                <a:uFillTx/>
-              </a:rPr>
-              <a:t>: </a:t>
-            </a:r>
-          </a:p>
-          <a:p>
-            <a:pPr lvl="2" algn="just">
-              <a:buClr>
-                <a:srgbClr val="FFC000"/>
-              </a:buClr>
-              <a:buFont typeface="Wingdings" panose="05000000000000000000" pitchFamily="2" charset="2"/>
-              <a:buChar char="§"/>
-            </a:pPr>
-            <a:r>
-              <a:rPr lang="en-GB" sz="1600" dirty="0" err="1"/>
-              <a:t>Platzierung</a:t>
-            </a:r>
-            <a:r>
-              <a:rPr lang="en-GB" sz="1600" dirty="0"/>
-              <a:t> </a:t>
-            </a:r>
-            <a:r>
-              <a:rPr lang="en-GB" sz="1600" dirty="0" err="1"/>
-              <a:t>ist</a:t>
-            </a:r>
-            <a:r>
-              <a:rPr lang="en-GB" sz="1600" dirty="0"/>
-              <a:t> das </a:t>
-            </a:r>
-            <a:r>
-              <a:rPr lang="en-GB" sz="1600" dirty="0" err="1"/>
-              <a:t>Endergebniss</a:t>
-            </a:r>
-            <a:r>
-              <a:rPr lang="en-GB" sz="1600" dirty="0"/>
-              <a:t> und </a:t>
-            </a:r>
-            <a:r>
-              <a:rPr lang="en-GB" sz="1600" dirty="0" err="1"/>
-              <a:t>alles</a:t>
-            </a:r>
-            <a:r>
-              <a:rPr lang="en-GB" sz="1600" dirty="0"/>
-              <a:t> was man am Ende </a:t>
-            </a:r>
-            <a:r>
-              <a:rPr lang="en-GB" sz="1600" dirty="0" err="1"/>
-              <a:t>sieht</a:t>
-            </a:r>
-            <a:endParaRPr lang="en-GB" sz="1600" dirty="0"/>
-          </a:p>
-          <a:p>
-            <a:pPr lvl="2" algn="just">
-              <a:buClr>
-                <a:srgbClr val="FFC000"/>
-              </a:buClr>
-              <a:buFont typeface="Wingdings" panose="05000000000000000000" pitchFamily="2" charset="2"/>
-              <a:buChar char="§"/>
-            </a:pPr>
-            <a:r>
-              <a:rPr lang="en-GB" sz="1600" dirty="0"/>
-              <a:t>Arbeit und </a:t>
-            </a:r>
-            <a:r>
-              <a:rPr lang="en-GB" sz="1600" dirty="0" err="1"/>
-              <a:t>Aufwand</a:t>
-            </a:r>
-            <a:r>
-              <a:rPr lang="en-GB" sz="1600" dirty="0"/>
-              <a:t> die </a:t>
-            </a:r>
-            <a:r>
-              <a:rPr lang="en-GB" sz="1600" dirty="0" err="1"/>
-              <a:t>hinter</a:t>
-            </a:r>
-            <a:r>
-              <a:rPr lang="en-GB" sz="1600" dirty="0"/>
-              <a:t> die </a:t>
-            </a:r>
-            <a:r>
-              <a:rPr lang="en-GB" sz="1600" dirty="0" err="1"/>
-              <a:t>Visualisierung</a:t>
-            </a:r>
-            <a:r>
-              <a:rPr lang="en-GB" sz="1600" dirty="0"/>
-              <a:t> </a:t>
-            </a:r>
-            <a:r>
-              <a:rPr lang="en-GB" sz="1600" dirty="0" err="1"/>
-              <a:t>sieht</a:t>
-            </a:r>
-            <a:r>
-              <a:rPr lang="en-GB" sz="1600" dirty="0"/>
-              <a:t> man </a:t>
-            </a:r>
-            <a:r>
-              <a:rPr lang="en-GB" sz="1600" dirty="0" err="1"/>
-              <a:t>nicht</a:t>
-            </a:r>
-            <a:endParaRPr lang="en-GB" sz="1600" dirty="0"/>
-          </a:p>
-          <a:p>
-            <a:pPr lvl="2" algn="just">
-              <a:buClr>
-                <a:srgbClr val="FFC000"/>
-              </a:buClr>
-              <a:buFont typeface="Wingdings" panose="05000000000000000000" pitchFamily="2" charset="2"/>
-              <a:buChar char="§"/>
-            </a:pPr>
-            <a:r>
-              <a:rPr lang="en-GB" sz="1600" dirty="0" err="1"/>
-              <a:t>Kann</a:t>
-            </a:r>
-            <a:r>
-              <a:rPr lang="en-GB" sz="1600" dirty="0"/>
-              <a:t> </a:t>
-            </a:r>
-            <a:r>
-              <a:rPr lang="en-GB" sz="1600" dirty="0" err="1"/>
-              <a:t>zu</a:t>
-            </a:r>
-            <a:r>
-              <a:rPr lang="en-GB" sz="1600" dirty="0"/>
-              <a:t> </a:t>
-            </a:r>
-            <a:r>
-              <a:rPr lang="en-GB" sz="1600" dirty="0" err="1"/>
-              <a:t>enttäuschende</a:t>
-            </a:r>
-            <a:r>
-              <a:rPr lang="en-GB" sz="1600" dirty="0"/>
-              <a:t> </a:t>
-            </a:r>
-            <a:r>
-              <a:rPr lang="en-GB" sz="1600" dirty="0" err="1"/>
-              <a:t>Schlussfolgerungen</a:t>
-            </a:r>
-            <a:r>
-              <a:rPr lang="en-GB" sz="1600" dirty="0"/>
-              <a:t> </a:t>
-            </a:r>
-            <a:r>
-              <a:rPr lang="en-GB" sz="1600" dirty="0" err="1"/>
-              <a:t>bezüglich</a:t>
-            </a:r>
-            <a:r>
-              <a:rPr lang="en-GB" sz="1600" dirty="0"/>
-              <a:t> des </a:t>
-            </a:r>
-            <a:r>
-              <a:rPr lang="en-GB" sz="1600" dirty="0" err="1"/>
-              <a:t>Projekts</a:t>
-            </a:r>
-            <a:r>
-              <a:rPr lang="en-GB" sz="1600" dirty="0"/>
-              <a:t> </a:t>
-            </a:r>
-            <a:r>
-              <a:rPr lang="en-GB" sz="1600" dirty="0" err="1"/>
-              <a:t>führen</a:t>
-            </a:r>
-            <a:endParaRPr lang="en-GB" sz="1600" dirty="0"/>
-          </a:p>
-          <a:p>
-            <a:pPr algn="just">
-              <a:buClr>
-                <a:srgbClr val="FFC000"/>
-              </a:buClr>
-              <a:buFont typeface="Wingdings" panose="05000000000000000000" pitchFamily="2" charset="2"/>
-              <a:buChar char="§"/>
-            </a:pPr>
-            <a:r>
-              <a:rPr lang="en-GB" sz="2000" dirty="0">
-                <a:uFillTx/>
-              </a:rPr>
-              <a:t>Animations via sapient-bind</a:t>
-            </a:r>
-          </a:p>
-          <a:p>
-            <a:pPr lvl="1" algn="just">
-              <a:buClr>
-                <a:srgbClr val="FFC000"/>
-              </a:buClr>
-              <a:buFont typeface="Wingdings" panose="05000000000000000000" pitchFamily="2" charset="2"/>
-              <a:buChar char="§"/>
-            </a:pPr>
-            <a:r>
-              <a:rPr lang="en-GB" sz="1600" dirty="0"/>
-              <a:t>Sapient-bind JSON structure as JS Object, then </a:t>
-            </a:r>
-            <a:r>
-              <a:rPr lang="en-GB" sz="1600" dirty="0" err="1"/>
-              <a:t>stringified</a:t>
-            </a:r>
-            <a:endParaRPr lang="en-GB" sz="1600" dirty="0"/>
-          </a:p>
-          <a:p>
-            <a:pPr lvl="1" algn="just">
-              <a:buClr>
-                <a:srgbClr val="FFC000"/>
-              </a:buClr>
-              <a:buFont typeface="Wingdings" panose="05000000000000000000" pitchFamily="2" charset="2"/>
-              <a:buChar char="§"/>
-            </a:pPr>
-            <a:r>
-              <a:rPr lang="en-GB" sz="1600" dirty="0">
-                <a:uFillTx/>
-              </a:rPr>
-              <a:t>Function to create data-bindings with data fech</a:t>
-            </a:r>
-            <a:r>
-              <a:rPr lang="en-GB" sz="1600" dirty="0"/>
-              <a:t>ted from database</a:t>
-            </a:r>
-            <a:endParaRPr lang="en-GB" sz="1600" dirty="0">
-              <a:uFillTx/>
-            </a:endParaRPr>
-          </a:p>
-          <a:p>
-            <a:pPr algn="just">
-              <a:buClr>
-                <a:srgbClr val="FFC000"/>
-              </a:buClr>
-              <a:buFont typeface="Wingdings" panose="05000000000000000000" pitchFamily="2" charset="2"/>
-              <a:buChar char="§"/>
-            </a:pPr>
-            <a:r>
-              <a:rPr lang="en-GB" sz="2000" dirty="0" err="1"/>
-              <a:t>Boardlet</a:t>
-            </a:r>
-            <a:r>
-              <a:rPr lang="en-GB" sz="2000" dirty="0"/>
-              <a:t> Design (</a:t>
-            </a:r>
-            <a:r>
-              <a:rPr lang="en-GB" sz="2000" dirty="0" err="1"/>
-              <a:t>niedrigste</a:t>
-            </a:r>
-            <a:r>
-              <a:rPr lang="en-GB" sz="2000" dirty="0"/>
-              <a:t> </a:t>
-            </a:r>
-            <a:r>
-              <a:rPr lang="en-GB" sz="2000" dirty="0" err="1"/>
-              <a:t>Priöritäat</a:t>
-            </a:r>
-            <a:r>
-              <a:rPr lang="en-GB" sz="2000" dirty="0"/>
-              <a:t>)</a:t>
-            </a:r>
-          </a:p>
-          <a:p>
-            <a:pPr lvl="1" algn="just">
-              <a:buClr>
-                <a:srgbClr val="FFC000"/>
-              </a:buClr>
-              <a:buFont typeface="Wingdings" panose="05000000000000000000" pitchFamily="2" charset="2"/>
-              <a:buChar char="§"/>
-            </a:pPr>
-            <a:r>
-              <a:rPr lang="en-GB" sz="1600" dirty="0"/>
-              <a:t>Upload button</a:t>
-            </a:r>
-          </a:p>
-          <a:p>
-            <a:pPr lvl="2" algn="just">
-              <a:buClr>
-                <a:srgbClr val="FFC000"/>
-              </a:buClr>
-              <a:buFont typeface="Wingdings" panose="05000000000000000000" pitchFamily="2" charset="2"/>
-              <a:buChar char="§"/>
-            </a:pPr>
-            <a:r>
-              <a:rPr lang="en-GB" sz="1200" dirty="0">
-                <a:uFillTx/>
-              </a:rPr>
-              <a:t>Until now, no way of uploading files from client to the file system found (because of security issues)</a:t>
-            </a:r>
-          </a:p>
-          <a:p>
-            <a:pPr lvl="1" algn="just">
-              <a:buClr>
-                <a:srgbClr val="FFC000"/>
-              </a:buClr>
-              <a:buFont typeface="Wingdings" panose="05000000000000000000" pitchFamily="2" charset="2"/>
-              <a:buChar char="§"/>
-            </a:pPr>
-            <a:r>
-              <a:rPr lang="en-GB" sz="1600" dirty="0"/>
-              <a:t>Fix Progress Bar</a:t>
-            </a:r>
+            <a:endParaRPr lang="en-GB" sz="2400" dirty="0" smtClean="0"/>
           </a:p>
         </p:txBody>
       </p:sp>
     </p:spTree>
     <p:extLst>
       <p:ext uri="{BB962C8B-B14F-4D97-AF65-F5344CB8AC3E}">
-        <p14:creationId xmlns:p14="http://schemas.microsoft.com/office/powerpoint/2010/main" val="2190960232"/>
+        <p14:creationId xmlns:p14="http://schemas.microsoft.com/office/powerpoint/2010/main" val="586809526"/>
       </p:ext>
     </p:extLst>
   </p:cSld>
@@ -5835,25 +5338,56 @@
           <a:lstStyle/>
           <a:p>
             <a:r>
-              <a:rPr lang="en-US" sz="3200" b="1" dirty="0">
+              <a:rPr lang="en-GB" sz="3200" b="1" dirty="0" smtClean="0">
                 <a:solidFill>
                   <a:srgbClr val="339966"/>
                 </a:solidFill>
-                <a:uFillTx/>
-              </a:rPr>
-              <a:t>Next Sprint – </a:t>
-            </a:r>
-            <a:r>
-              <a:rPr lang="en-US" sz="3200" b="1" dirty="0" err="1">
+              </a:rPr>
+              <a:t>3.2 Bugs in </a:t>
+            </a:r>
+            <a:r>
+              <a:rPr lang="en-GB" sz="3200" b="1" dirty="0" err="1" smtClean="0">
                 <a:solidFill>
                   <a:srgbClr val="339966"/>
                 </a:solidFill>
-                <a:uFillTx/>
-              </a:rPr>
-              <a:t>ToDos</a:t>
+              </a:rPr>
+              <a:t>Boardlet</a:t>
+            </a:r>
+            <a:r>
+              <a:rPr lang="en-GB" sz="3200" b="1" dirty="0" smtClean="0">
+                <a:solidFill>
+                  <a:srgbClr val="339966"/>
+                </a:solidFill>
+              </a:rPr>
+              <a:t> </a:t>
+            </a:r>
+            <a:r>
+              <a:rPr lang="en-GB" sz="3200" b="1" dirty="0" err="1" smtClean="0">
+                <a:solidFill>
+                  <a:srgbClr val="339966"/>
+                </a:solidFill>
+              </a:rPr>
+              <a:t>Algorithmus</a:t>
+            </a:r>
+            <a:r>
+              <a:rPr lang="en-GB" sz="3200" b="1" dirty="0" smtClean="0">
+                <a:solidFill>
+                  <a:srgbClr val="339966"/>
+                </a:solidFill>
+              </a:rPr>
+              <a:t> </a:t>
+            </a:r>
+            <a:r>
+              <a:rPr lang="en-GB" sz="3200" b="1" dirty="0">
+                <a:solidFill>
+                  <a:srgbClr val="339966"/>
+                </a:solidFill>
+                <a:uFillTx/>
+              </a:rPr>
+              <a:t/>
             </a:r>
             <a:br>
-              <a:rPr lang="en-US" sz="3200" b="1" dirty="0">
+              <a:rPr lang="en-GB" sz="3200" b="1" dirty="0">
                 <a:solidFill>
                   <a:srgbClr val="339966"/>
                 </a:solidFill>
@@ -5861,17 +5395,27 @@
               </a:rPr>
             </a:br>
             <a:r>
-              <a:rPr lang="en-US" sz="1600" b="1" dirty="0">
+              <a:rPr lang="en-GB" sz="1600" b="1" dirty="0" smtClean="0">
                 <a:solidFill>
                   <a:schemeClr val="bg1">
                     <a:lumMod val="50000"/>
                   </a:schemeClr>
                 </a:solidFill>
-                <a:uFillTx/>
-              </a:rPr>
-              <a:t>Weekly Sprint 14</a:t>
-            </a:r>
-            <a:endParaRPr lang="en-US" sz="3200" dirty="0">
+              </a:rPr>
+              <a:t>Sort Order Options</a:t>
+            </a:r>
+            <a:r>
+              <a:rPr lang="en-GB" sz="1600" b="1" dirty="0" smtClean="0">
+                <a:solidFill>
+                  <a:schemeClr val="bg1">
+                    <a:lumMod val="50000"/>
+                  </a:schemeClr>
+                </a:solidFill>
+                <a:uFillTx/>
+              </a:rPr>
+              <a:t> </a:t>
+            </a:r>
+            <a:endParaRPr lang="en-GB" sz="3200" dirty="0">
               <a:solidFill>
                 <a:schemeClr val="bg1">
                   <a:lumMod val="50000"/>
@@ -5884,7 +5428,7 @@
       </p:sp>
       <p:pic>
         <p:nvPicPr>
-          <p:cNvPr id="3" name="Picture 2" descr="Image result for gefasoft logo svg"/>
+          <p:cNvPr id="9" name="Picture 2" descr="Image result for gefasoft logo svg"/>
           <p:cNvPicPr>
             <a:picLocks noChangeAspect="1" noChangeArrowheads="1"/>
           </p:cNvPicPr>
@@ -5910,7 +5454,13 @@
       </p:pic>
       <p:sp>
         <p:nvSpPr>
-          <p:cNvPr id="4" name="Content Placeholder 2"/>
+          <p:cNvPr id="21" name="Content Placeholder 2">
+            <a:extLst>
+              <a:ext uri="{FF2B5EF4-FFF2-40B4-BE49-F238E27FC236}">
+                <a16:creationId xmlns:a16="http://schemas.microsoft.com/office/drawing/2014/main" id="{78CA1F25-BAFB-4CE3-9C14-7750D71C99C2}"/>
+              </a:ext>
+            </a:extLst>
+          </p:cNvPr>
           <p:cNvSpPr>
             <a:spLocks noGrp="1"/>
           </p:cNvSpPr>
@@ -5920,8 +5470,8 @@
         </p:nvSpPr>
         <p:spPr>
           <a:xfrm>
-            <a:off x="610225" y="1305007"/>
-            <a:ext cx="10949976" cy="5412189"/>
+            <a:off x="610225" y="1132743"/>
+            <a:ext cx="10768975" cy="5584453"/>
           </a:xfrm>
         </p:spPr>
         <p:txBody>
@@ -5930,7 +5480,7 @@
           </a:bodyPr>
           <a:lstStyle/>
           <a:p>
-            <a:pPr algn="just">
+            <a:pPr>
               <a:buClr>
                 <a:srgbClr val="FFC000"/>
               </a:buClr>
@@ -5938,143 +5488,179 @@
               <a:buChar char="§"/>
             </a:pPr>
             <a:r>
-              <a:rPr lang="en-GB" sz="2000" dirty="0" err="1"/>
-              <a:t>Schreiben</a:t>
-            </a:r>
-            <a:r>
-              <a:rPr lang="en-GB" sz="2000" dirty="0"/>
-              <a:t>! (und </a:t>
-            </a:r>
-            <a:r>
-              <a:rPr lang="en-GB" sz="2000" dirty="0" err="1"/>
-              <a:t>Lernen</a:t>
-            </a:r>
-            <a:r>
-              <a:rPr lang="en-GB" sz="2000" dirty="0"/>
-              <a:t>)</a:t>
-            </a:r>
-          </a:p>
-          <a:p>
-            <a:pPr algn="just">
+              <a:rPr lang="en-GB" sz="2400" dirty="0" err="1" smtClean="0"/>
+              <a:t>Obwohl</a:t>
+            </a:r>
+            <a:r>
+              <a:rPr lang="en-GB" sz="2400" dirty="0" smtClean="0"/>
+              <a:t> </a:t>
+            </a:r>
+            <a:r>
+              <a:rPr lang="en-GB" sz="2400" dirty="0" err="1" smtClean="0"/>
+              <a:t>praktish</a:t>
+            </a:r>
+            <a:r>
+              <a:rPr lang="en-GB" sz="2400" dirty="0" smtClean="0"/>
+              <a:t> </a:t>
+            </a:r>
+            <a:r>
+              <a:rPr lang="en-GB" sz="2400" dirty="0" err="1" smtClean="0"/>
+              <a:t>identische</a:t>
+            </a:r>
+            <a:r>
+              <a:rPr lang="en-GB" sz="2400" dirty="0" smtClean="0"/>
+              <a:t> Code, </a:t>
+            </a:r>
+            <a:r>
+              <a:rPr lang="en-GB" sz="2400" dirty="0" err="1" smtClean="0"/>
+              <a:t>nicht</a:t>
+            </a:r>
+            <a:r>
+              <a:rPr lang="en-GB" sz="2400" dirty="0" smtClean="0"/>
+              <a:t> </a:t>
+            </a:r>
+            <a:r>
+              <a:rPr lang="en-GB" sz="2400" dirty="0" err="1" smtClean="0"/>
+              <a:t>gleiche</a:t>
+            </a:r>
+            <a:r>
+              <a:rPr lang="en-GB" sz="2400" dirty="0" smtClean="0"/>
+              <a:t> </a:t>
+            </a:r>
+            <a:r>
+              <a:rPr lang="en-GB" sz="2400" dirty="0" err="1" smtClean="0"/>
+              <a:t>Visu</a:t>
+            </a:r>
+            <a:r>
+              <a:rPr lang="en-GB" sz="2400" dirty="0" smtClean="0"/>
+              <a:t> Output.</a:t>
+            </a:r>
+          </a:p>
+          <a:p>
+            <a:pPr>
               <a:buClr>
                 <a:srgbClr val="FFC000"/>
               </a:buClr>
               <a:buFont typeface="Wingdings" panose="05000000000000000000" pitchFamily="2" charset="2"/>
               <a:buChar char="§"/>
             </a:pPr>
-            <a:r>
-              <a:rPr lang="en-GB" sz="2000" dirty="0"/>
-              <a:t>Vertex placement algorithm</a:t>
-            </a:r>
-          </a:p>
-          <a:p>
-            <a:pPr lvl="1" algn="just">
+            <a:endParaRPr lang="en-GB" sz="1800" dirty="0" smtClean="0"/>
+          </a:p>
+          <a:p>
+            <a:pPr marL="0" indent="0">
               <a:buClr>
                 <a:srgbClr val="FFC000"/>
               </a:buClr>
-              <a:buFont typeface="Wingdings" panose="05000000000000000000" pitchFamily="2" charset="2"/>
-              <a:buChar char="§"/>
+              <a:buNone/>
             </a:pPr>
             <a:r>
-              <a:rPr lang="en-GB" sz="1600" dirty="0">
-                <a:uFillTx/>
-              </a:rPr>
-              <a:t>Continuous improvement</a:t>
-            </a:r>
-          </a:p>
-          <a:p>
-            <a:pPr algn="just">
+              <a:rPr lang="en-GB" sz="2400" b="1" dirty="0"/>
+              <a:t>	</a:t>
+            </a:r>
+            <a:r>
+              <a:rPr lang="en-GB" sz="2400" b="1" dirty="0" smtClean="0"/>
+              <a:t>Testing </a:t>
+            </a:r>
+            <a:r>
+              <a:rPr lang="en-GB" sz="2400" b="1" dirty="0" err="1" smtClean="0"/>
+              <a:t>Boardlet</a:t>
+            </a:r>
+            <a:r>
+              <a:rPr lang="en-GB" sz="2400" b="1" dirty="0" smtClean="0"/>
+              <a:t>				         Sapient </a:t>
+            </a:r>
+            <a:r>
+              <a:rPr lang="en-GB" sz="2400" b="1" dirty="0" err="1" smtClean="0"/>
+              <a:t>Boardlet</a:t>
+            </a:r>
+            <a:endParaRPr lang="en-GB" sz="2400" b="1" dirty="0"/>
+          </a:p>
+          <a:p>
+            <a:pPr marL="457200" indent="-457200">
               <a:buClr>
                 <a:srgbClr val="FFC000"/>
               </a:buClr>
-              <a:buFont typeface="Wingdings" panose="05000000000000000000" pitchFamily="2" charset="2"/>
-              <a:buChar char="§"/>
+              <a:buFont typeface="+mj-lt"/>
+              <a:buAutoNum type="arabicPeriod"/>
             </a:pPr>
-            <a:r>
-              <a:rPr lang="en-GB" sz="2000" dirty="0">
-                <a:uFillTx/>
-              </a:rPr>
-              <a:t>Animations via sapient-bind</a:t>
-            </a:r>
-          </a:p>
-          <a:p>
-            <a:pPr lvl="1" algn="just">
-              <a:buClr>
-                <a:srgbClr val="FFC000"/>
-              </a:buClr>
-              <a:buFont typeface="Wingdings" panose="05000000000000000000" pitchFamily="2" charset="2"/>
-              <a:buChar char="§"/>
-            </a:pPr>
-            <a:r>
-              <a:rPr lang="en-GB" sz="1600" dirty="0"/>
-              <a:t>Define sapient-bind JSON structure</a:t>
-            </a:r>
-          </a:p>
-          <a:p>
-            <a:pPr lvl="1" algn="just">
-              <a:buClr>
-                <a:srgbClr val="FFC000"/>
-              </a:buClr>
-              <a:buFont typeface="Wingdings" panose="05000000000000000000" pitchFamily="2" charset="2"/>
-              <a:buChar char="§"/>
-            </a:pPr>
-            <a:r>
-              <a:rPr lang="en-GB" sz="1600" dirty="0">
-                <a:uFillTx/>
-              </a:rPr>
-              <a:t>Function to create data-bindings with data fech</a:t>
-            </a:r>
-            <a:r>
-              <a:rPr lang="en-GB" sz="1600" dirty="0"/>
-              <a:t>ted from database</a:t>
-            </a:r>
-            <a:endParaRPr lang="en-GB" sz="1600" dirty="0">
-              <a:uFillTx/>
-            </a:endParaRPr>
-          </a:p>
-          <a:p>
-            <a:pPr algn="just">
-              <a:buClr>
-                <a:srgbClr val="FFC000"/>
-              </a:buClr>
-              <a:buFont typeface="Wingdings" panose="05000000000000000000" pitchFamily="2" charset="2"/>
-              <a:buChar char="§"/>
-            </a:pPr>
-            <a:r>
-              <a:rPr lang="en-GB" sz="2000" dirty="0"/>
-              <a:t>Upload button</a:t>
-            </a:r>
-          </a:p>
-          <a:p>
-            <a:pPr lvl="1" algn="just">
-              <a:buClr>
-                <a:srgbClr val="FFC000"/>
-              </a:buClr>
-              <a:buFont typeface="Wingdings" panose="05000000000000000000" pitchFamily="2" charset="2"/>
-              <a:buChar char="§"/>
-            </a:pPr>
-            <a:r>
-              <a:rPr lang="en-GB" sz="1600" dirty="0">
-                <a:uFillTx/>
-              </a:rPr>
-              <a:t>Until now, no way of uploading files from client to the file system found (because of security issues)</a:t>
-            </a:r>
-            <a:endParaRPr lang="en-GB" sz="1400" dirty="0">
-              <a:uFillTx/>
-            </a:endParaRPr>
-          </a:p>
-          <a:p>
-            <a:pPr algn="just"/>
-            <a:endParaRPr lang="en-GB" sz="1400" dirty="0">
-              <a:uFillTx/>
-            </a:endParaRPr>
+            <a:endParaRPr lang="en-GB" sz="2400" dirty="0"/>
           </a:p>
         </p:txBody>
       </p:sp>
+      <p:pic>
+        <p:nvPicPr>
+          <p:cNvPr id="3" name="Grafik 2"/>
+          <p:cNvPicPr>
+            <a:picLocks noChangeAspect="1"/>
+          </p:cNvPicPr>
+          <p:nvPr/>
+        </p:nvPicPr>
+        <p:blipFill>
+          <a:blip r:embed="rId3">
+            <a:extLst>
+              <a:ext uri="{28A0092B-C50C-407E-A947-70E740481C1C}">
+                <a14:useLocalDpi xmlns:a14="http://schemas.microsoft.com/office/drawing/2010/main" val="0"/>
+              </a:ext>
+            </a:extLst>
+          </a:blip>
+          <a:stretch>
+            <a:fillRect/>
+          </a:stretch>
+        </p:blipFill>
+        <p:spPr>
+          <a:xfrm>
+            <a:off x="5683217" y="2389318"/>
+            <a:ext cx="6197600" cy="3238815"/>
+          </a:xfrm>
+          <a:prstGeom prst="rect">
+            <a:avLst/>
+          </a:prstGeom>
+          <a:ln>
+            <a:solidFill>
+              <a:schemeClr val="tx1"/>
+            </a:solidFill>
+          </a:ln>
+        </p:spPr>
+      </p:pic>
+      <p:pic>
+        <p:nvPicPr>
+          <p:cNvPr id="6" name="Grafik 5"/>
+          <p:cNvPicPr>
+            <a:picLocks noChangeAspect="1"/>
+          </p:cNvPicPr>
+          <p:nvPr/>
+        </p:nvPicPr>
+        <p:blipFill>
+          <a:blip r:embed="rId4">
+            <a:extLst>
+              <a:ext uri="{28A0092B-C50C-407E-A947-70E740481C1C}">
+                <a14:useLocalDpi xmlns:a14="http://schemas.microsoft.com/office/drawing/2010/main" val="0"/>
+              </a:ext>
+            </a:extLst>
+          </a:blip>
+          <a:stretch>
+            <a:fillRect/>
+          </a:stretch>
+        </p:blipFill>
+        <p:spPr>
+          <a:xfrm>
+            <a:off x="740228" y="2389318"/>
+            <a:ext cx="4159041" cy="4371418"/>
+          </a:xfrm>
+          <a:prstGeom prst="rect">
+            <a:avLst/>
+          </a:prstGeom>
+          <a:ln>
+            <a:solidFill>
+              <a:schemeClr val="tx1"/>
+            </a:solidFill>
+          </a:ln>
+        </p:spPr>
+      </p:pic>
     </p:spTree>
     <p:extLst>
       <p:ext uri="{BB962C8B-B14F-4D97-AF65-F5344CB8AC3E}">
-        <p14:creationId xmlns:p14="http://schemas.microsoft.com/office/powerpoint/2010/main" val="124425708"/>
+        <p14:creationId xmlns:p14="http://schemas.microsoft.com/office/powerpoint/2010/main" val="2053214188"/>
       </p:ext>
     </p:extLst>
   </p:cSld>
@@ -6124,28 +5710,22 @@
           <a:lstStyle/>
           <a:p>
             <a:r>
-              <a:rPr lang="en-US" sz="3200" b="1" dirty="0" err="1">
+              <a:rPr lang="en-US" sz="3200" b="1" dirty="0" smtClean="0">
                 <a:solidFill>
                   <a:srgbClr val="339966"/>
                 </a:solidFill>
-              </a:rPr>
-              <a:t>Vorläufige</a:t>
+                <a:uFillTx/>
+              </a:rPr>
+              <a:t>3.3 Issues </a:t>
             </a:r>
             <a:r>
               <a:rPr lang="en-US" sz="3200" b="1" dirty="0">
                 <a:solidFill>
                   <a:srgbClr val="339966"/>
                 </a:solidFill>
-              </a:rPr>
-              <a:t> </a:t>
-            </a:r>
-            <a:r>
-              <a:rPr lang="en-US" sz="3200" b="1" dirty="0" err="1">
-                <a:solidFill>
-                  <a:srgbClr val="339966"/>
-                </a:solidFill>
-              </a:rPr>
-              <a:t>Inhaltsverzeichnis</a:t>
+                <a:uFillTx/>
+              </a:rPr>
+              <a:t>and Challenges</a:t>
             </a:r>
             <a:br>
               <a:rPr lang="en-US" sz="3200" b="1" dirty="0">
@@ -6164,7 +5744,7 @@
                 </a:solidFill>
                 <a:uFillTx/>
               </a:rPr>
-              <a:t>Bachelorarbeit</a:t>
+              <a:t>Weekly Sprint 14</a:t>
             </a:r>
             <a:endParaRPr lang="en-US" sz="3200" dirty="0">
               <a:solidFill>
@@ -6215,13 +5795,13 @@
         </p:nvSpPr>
         <p:spPr>
           <a:xfrm>
-            <a:off x="610225" y="1305007"/>
+            <a:off x="610225" y="1217923"/>
             <a:ext cx="10949976" cy="5412189"/>
           </a:xfrm>
         </p:spPr>
         <p:txBody>
           <a:bodyPr>
-            <a:normAutofit/>
+            <a:normAutofit fontScale="92500" lnSpcReduction="10000"/>
           </a:bodyPr>
           <a:lstStyle/>
           <a:p>
@@ -6233,27 +5813,731 @@
               <a:buChar char="§"/>
             </a:pPr>
             <a:r>
-              <a:rPr lang="en-GB" sz="2000" dirty="0">
-                <a:uFillTx/>
-              </a:rPr>
-              <a:t>In Word…</a:t>
-            </a:r>
-            <a:endParaRPr lang="en-GB" sz="1400" dirty="0">
+              <a:rPr lang="de-DE" sz="2000" dirty="0" smtClean="0"/>
+              <a:t>Stillstand beim </a:t>
+            </a:r>
+            <a:r>
+              <a:rPr lang="de-DE" sz="2000" dirty="0" err="1" smtClean="0"/>
+              <a:t>vertexPlacement</a:t>
+            </a:r>
+            <a:r>
+              <a:rPr lang="de-DE" sz="2000" dirty="0" smtClean="0"/>
+              <a:t> Algorithmus</a:t>
+            </a:r>
+          </a:p>
+          <a:p>
+            <a:pPr lvl="1" algn="just">
+              <a:buClr>
+                <a:srgbClr val="FFC000"/>
+              </a:buClr>
+              <a:buFont typeface="Wingdings" panose="05000000000000000000" pitchFamily="2" charset="2"/>
+              <a:buChar char="§"/>
+            </a:pPr>
+            <a:r>
+              <a:rPr lang="de-DE" sz="1600" dirty="0" smtClean="0">
+                <a:uFillTx/>
+              </a:rPr>
+              <a:t>Alles wofür es eine bestimmte Logik dahinter gibt, wird schon entsprechend dieser Logik platziert.</a:t>
+            </a:r>
+          </a:p>
+          <a:p>
+            <a:pPr lvl="1" algn="just">
+              <a:buClr>
+                <a:srgbClr val="FFC000"/>
+              </a:buClr>
+              <a:buFont typeface="Wingdings" panose="05000000000000000000" pitchFamily="2" charset="2"/>
+              <a:buChar char="§"/>
+            </a:pPr>
+            <a:r>
+              <a:rPr lang="de-DE" sz="1600" dirty="0" err="1" smtClean="0"/>
+              <a:t>Nich</a:t>
+            </a:r>
+            <a:r>
+              <a:rPr lang="de-DE" sz="1600" dirty="0" smtClean="0"/>
+              <a:t> viel mehr Logik um das Platzierungsalgorithmus in wenig Zeit noch zu verbessern.</a:t>
+            </a:r>
+          </a:p>
+          <a:p>
+            <a:pPr lvl="1" algn="just">
+              <a:buClr>
+                <a:srgbClr val="FFC000"/>
+              </a:buClr>
+              <a:buFont typeface="Wingdings" panose="05000000000000000000" pitchFamily="2" charset="2"/>
+              <a:buChar char="§"/>
+            </a:pPr>
+            <a:r>
+              <a:rPr lang="de-DE" sz="1600" dirty="0" smtClean="0"/>
+              <a:t>Verbesserungen machen manchmal andere Teilen von Code </a:t>
+            </a:r>
+            <a:r>
+              <a:rPr lang="de-DE" sz="1600" dirty="0" err="1" smtClean="0"/>
+              <a:t>kaput</a:t>
+            </a:r>
+            <a:r>
+              <a:rPr lang="de-DE" sz="1600" dirty="0" smtClean="0"/>
+              <a:t>.</a:t>
+            </a:r>
+            <a:endParaRPr lang="de-DE" sz="1600" dirty="0" smtClean="0"/>
+          </a:p>
+          <a:p>
+            <a:pPr lvl="1" algn="just">
+              <a:buClr>
+                <a:srgbClr val="FFC000"/>
+              </a:buClr>
+              <a:buFont typeface="Wingdings" panose="05000000000000000000" pitchFamily="2" charset="2"/>
+              <a:buChar char="§"/>
+            </a:pPr>
+            <a:r>
+              <a:rPr lang="de-DE" sz="1600" dirty="0" smtClean="0"/>
+              <a:t>Bugs im Algorithmus in </a:t>
+            </a:r>
+            <a:r>
+              <a:rPr lang="de-DE" sz="1600" dirty="0" err="1" smtClean="0"/>
+              <a:t>Boardlet</a:t>
+            </a:r>
+            <a:r>
+              <a:rPr lang="de-DE" sz="1600" dirty="0" smtClean="0"/>
+              <a:t> Script.</a:t>
+            </a:r>
+            <a:endParaRPr lang="de-DE" sz="1600" dirty="0" smtClean="0"/>
+          </a:p>
+          <a:p>
+            <a:pPr lvl="1" algn="just">
+              <a:buClr>
+                <a:srgbClr val="FFC000"/>
+              </a:buClr>
+              <a:buFont typeface="Wingdings" panose="05000000000000000000" pitchFamily="2" charset="2"/>
+              <a:buChar char="§"/>
+            </a:pPr>
+            <a:r>
+              <a:rPr lang="de-DE" sz="1600" u="sng" dirty="0" smtClean="0"/>
+              <a:t>Vorteile</a:t>
+            </a:r>
+            <a:r>
+              <a:rPr lang="de-DE" sz="1600" dirty="0" smtClean="0"/>
+              <a:t>:</a:t>
+            </a:r>
+          </a:p>
+          <a:p>
+            <a:pPr lvl="2" algn="just">
+              <a:buClr>
+                <a:srgbClr val="FFC000"/>
+              </a:buClr>
+              <a:buFont typeface="Wingdings" panose="05000000000000000000" pitchFamily="2" charset="2"/>
+              <a:buChar char="§"/>
+            </a:pPr>
+            <a:r>
+              <a:rPr lang="de-DE" sz="1600" dirty="0" smtClean="0"/>
+              <a:t>Konzentration auf Data-</a:t>
+            </a:r>
+            <a:r>
+              <a:rPr lang="de-DE" sz="1600" dirty="0" err="1" smtClean="0"/>
+              <a:t>bindings</a:t>
+            </a:r>
+            <a:r>
+              <a:rPr lang="de-DE" sz="1600" dirty="0" smtClean="0"/>
+              <a:t> (</a:t>
+            </a:r>
+            <a:r>
+              <a:rPr lang="de-DE" sz="1600" dirty="0" err="1" smtClean="0"/>
+              <a:t>dynamisierung</a:t>
+            </a:r>
+            <a:r>
+              <a:rPr lang="de-DE" sz="1600" dirty="0" smtClean="0"/>
+              <a:t>)</a:t>
+            </a:r>
+          </a:p>
+          <a:p>
+            <a:pPr lvl="2" algn="just">
+              <a:buClr>
+                <a:srgbClr val="FFC000"/>
+              </a:buClr>
+              <a:buFont typeface="Wingdings" panose="05000000000000000000" pitchFamily="2" charset="2"/>
+              <a:buChar char="§"/>
+            </a:pPr>
+            <a:r>
+              <a:rPr lang="de-DE" sz="1600" dirty="0" err="1" smtClean="0"/>
+              <a:t>Verteci</a:t>
+            </a:r>
+            <a:r>
+              <a:rPr lang="de-DE" sz="1600" dirty="0" smtClean="0"/>
+              <a:t> schon ziemlich gut platziert und </a:t>
+            </a:r>
+            <a:r>
+              <a:rPr lang="de-DE" sz="1600" dirty="0" err="1" smtClean="0"/>
+              <a:t>edges</a:t>
+            </a:r>
+            <a:r>
+              <a:rPr lang="de-DE" sz="1600" dirty="0" smtClean="0"/>
+              <a:t> vereinfacht</a:t>
+            </a:r>
+          </a:p>
+          <a:p>
+            <a:pPr lvl="2" algn="just">
+              <a:buClr>
+                <a:srgbClr val="FFC000"/>
+              </a:buClr>
+              <a:buFont typeface="Wingdings" panose="05000000000000000000" pitchFamily="2" charset="2"/>
+              <a:buChar char="§"/>
+            </a:pPr>
+            <a:r>
+              <a:rPr lang="de-DE" sz="1600" dirty="0" smtClean="0"/>
+              <a:t>Verbesserungsmöglichkeiten direkt im draw.io (</a:t>
+            </a:r>
+            <a:r>
+              <a:rPr lang="de-DE" sz="1600" dirty="0" err="1" smtClean="0"/>
+              <a:t>Drag&amp;Drop</a:t>
+            </a:r>
+            <a:r>
+              <a:rPr lang="de-DE" sz="1600" dirty="0" smtClean="0"/>
+              <a:t>)</a:t>
+            </a:r>
+          </a:p>
+          <a:p>
+            <a:pPr lvl="1" algn="just">
+              <a:buClr>
+                <a:srgbClr val="FFC000"/>
+              </a:buClr>
+              <a:buFont typeface="Wingdings" panose="05000000000000000000" pitchFamily="2" charset="2"/>
+              <a:buChar char="§"/>
+            </a:pPr>
+            <a:r>
+              <a:rPr lang="de-DE" sz="1600" u="sng" dirty="0" smtClean="0">
+                <a:uFillTx/>
+              </a:rPr>
+              <a:t>Nachteile</a:t>
+            </a:r>
+            <a:r>
+              <a:rPr lang="de-DE" sz="1600" dirty="0" smtClean="0">
+                <a:uFillTx/>
+              </a:rPr>
+              <a:t>: </a:t>
+            </a:r>
+          </a:p>
+          <a:p>
+            <a:pPr lvl="2" algn="just">
+              <a:buClr>
+                <a:srgbClr val="FFC000"/>
+              </a:buClr>
+              <a:buFont typeface="Wingdings" panose="05000000000000000000" pitchFamily="2" charset="2"/>
+              <a:buChar char="§"/>
+            </a:pPr>
+            <a:r>
+              <a:rPr lang="de-DE" sz="1600" dirty="0" smtClean="0"/>
+              <a:t>Platzierung ist das </a:t>
+            </a:r>
+            <a:r>
+              <a:rPr lang="de-DE" sz="1600" dirty="0" err="1" smtClean="0"/>
+              <a:t>Endergebniss</a:t>
+            </a:r>
+            <a:r>
+              <a:rPr lang="de-DE" sz="1600" dirty="0" smtClean="0"/>
+              <a:t> und alles was man am Ende sieht</a:t>
+            </a:r>
+          </a:p>
+          <a:p>
+            <a:pPr lvl="2" algn="just">
+              <a:buClr>
+                <a:srgbClr val="FFC000"/>
+              </a:buClr>
+              <a:buFont typeface="Wingdings" panose="05000000000000000000" pitchFamily="2" charset="2"/>
+              <a:buChar char="§"/>
+            </a:pPr>
+            <a:r>
+              <a:rPr lang="de-DE" sz="1600" dirty="0" smtClean="0"/>
+              <a:t>Arbeit und Aufwand die hinter die Visualisierung sieht man nicht</a:t>
+            </a:r>
+          </a:p>
+          <a:p>
+            <a:pPr lvl="2" algn="just">
+              <a:buClr>
+                <a:srgbClr val="FFC000"/>
+              </a:buClr>
+              <a:buFont typeface="Wingdings" panose="05000000000000000000" pitchFamily="2" charset="2"/>
+              <a:buChar char="§"/>
+            </a:pPr>
+            <a:r>
+              <a:rPr lang="de-DE" sz="1600" dirty="0" smtClean="0"/>
+              <a:t>Kann zu enttäuschende Schlussfolgerungen bezüglich des Projekts führen</a:t>
+            </a:r>
+          </a:p>
+          <a:p>
+            <a:pPr algn="just">
+              <a:buClr>
+                <a:srgbClr val="FFC000"/>
+              </a:buClr>
+              <a:buFont typeface="Wingdings" panose="05000000000000000000" pitchFamily="2" charset="2"/>
+              <a:buChar char="§"/>
+            </a:pPr>
+            <a:r>
+              <a:rPr lang="de-DE" sz="2000" dirty="0" err="1" smtClean="0">
+                <a:uFillTx/>
+              </a:rPr>
+              <a:t>Animations</a:t>
+            </a:r>
+            <a:r>
+              <a:rPr lang="de-DE" sz="2000" dirty="0" smtClean="0">
+                <a:uFillTx/>
+              </a:rPr>
+              <a:t> via </a:t>
+            </a:r>
+            <a:r>
+              <a:rPr lang="de-DE" sz="2000" dirty="0" err="1" smtClean="0">
+                <a:uFillTx/>
+              </a:rPr>
+              <a:t>sapient</a:t>
+            </a:r>
+            <a:r>
+              <a:rPr lang="de-DE" sz="2000" dirty="0" smtClean="0">
+                <a:uFillTx/>
+              </a:rPr>
+              <a:t>-bind</a:t>
+            </a:r>
+          </a:p>
+          <a:p>
+            <a:pPr lvl="1" algn="just">
+              <a:buClr>
+                <a:srgbClr val="FFC000"/>
+              </a:buClr>
+              <a:buFont typeface="Wingdings" panose="05000000000000000000" pitchFamily="2" charset="2"/>
+              <a:buChar char="§"/>
+            </a:pPr>
+            <a:r>
+              <a:rPr lang="de-DE" sz="1600" dirty="0" err="1" smtClean="0"/>
+              <a:t>Sapient</a:t>
+            </a:r>
+            <a:r>
+              <a:rPr lang="de-DE" sz="1600" dirty="0" smtClean="0"/>
+              <a:t>-bind JSON </a:t>
+            </a:r>
+            <a:r>
+              <a:rPr lang="de-DE" sz="1600" dirty="0" err="1" smtClean="0"/>
+              <a:t>structure</a:t>
+            </a:r>
+            <a:r>
+              <a:rPr lang="de-DE" sz="1600" dirty="0" smtClean="0"/>
+              <a:t> </a:t>
+            </a:r>
+            <a:r>
+              <a:rPr lang="de-DE" sz="1600" dirty="0" err="1" smtClean="0"/>
+              <a:t>as</a:t>
+            </a:r>
+            <a:r>
+              <a:rPr lang="de-DE" sz="1600" dirty="0" smtClean="0"/>
+              <a:t> JS </a:t>
+            </a:r>
+            <a:r>
+              <a:rPr lang="de-DE" sz="1600" dirty="0" err="1" smtClean="0"/>
+              <a:t>Object</a:t>
+            </a:r>
+            <a:r>
+              <a:rPr lang="de-DE" sz="1600" dirty="0" smtClean="0"/>
+              <a:t>, </a:t>
+            </a:r>
+            <a:r>
+              <a:rPr lang="de-DE" sz="1600" dirty="0" err="1" smtClean="0"/>
+              <a:t>then</a:t>
+            </a:r>
+            <a:r>
+              <a:rPr lang="de-DE" sz="1600" dirty="0" smtClean="0"/>
+              <a:t> </a:t>
+            </a:r>
+            <a:r>
+              <a:rPr lang="de-DE" sz="1600" dirty="0" err="1" smtClean="0"/>
+              <a:t>stringified</a:t>
+            </a:r>
+            <a:endParaRPr lang="de-DE" sz="1600" dirty="0" smtClean="0"/>
+          </a:p>
+          <a:p>
+            <a:pPr lvl="1" algn="just">
+              <a:buClr>
+                <a:srgbClr val="FFC000"/>
+              </a:buClr>
+              <a:buFont typeface="Wingdings" panose="05000000000000000000" pitchFamily="2" charset="2"/>
+              <a:buChar char="§"/>
+            </a:pPr>
+            <a:r>
+              <a:rPr lang="de-DE" sz="1600" dirty="0" err="1" smtClean="0">
+                <a:uFillTx/>
+              </a:rPr>
+              <a:t>Function</a:t>
+            </a:r>
+            <a:r>
+              <a:rPr lang="de-DE" sz="1600" dirty="0" smtClean="0">
+                <a:uFillTx/>
+              </a:rPr>
+              <a:t> </a:t>
+            </a:r>
+            <a:r>
+              <a:rPr lang="de-DE" sz="1600" dirty="0" err="1" smtClean="0">
+                <a:uFillTx/>
+              </a:rPr>
+              <a:t>to</a:t>
+            </a:r>
+            <a:r>
+              <a:rPr lang="de-DE" sz="1600" dirty="0" smtClean="0">
+                <a:uFillTx/>
+              </a:rPr>
+              <a:t> </a:t>
+            </a:r>
+            <a:r>
+              <a:rPr lang="de-DE" sz="1600" dirty="0" err="1" smtClean="0">
+                <a:uFillTx/>
+              </a:rPr>
+              <a:t>create</a:t>
+            </a:r>
+            <a:r>
+              <a:rPr lang="de-DE" sz="1600" dirty="0" smtClean="0">
+                <a:uFillTx/>
+              </a:rPr>
+              <a:t> </a:t>
+            </a:r>
+            <a:r>
+              <a:rPr lang="de-DE" sz="1600" dirty="0" err="1" smtClean="0">
+                <a:uFillTx/>
+              </a:rPr>
+              <a:t>data-bindings</a:t>
+            </a:r>
+            <a:r>
+              <a:rPr lang="de-DE" sz="1600" dirty="0" smtClean="0">
+                <a:uFillTx/>
+              </a:rPr>
+              <a:t> </a:t>
+            </a:r>
+            <a:r>
+              <a:rPr lang="de-DE" sz="1600" dirty="0" err="1" smtClean="0">
+                <a:uFillTx/>
+              </a:rPr>
+              <a:t>with</a:t>
+            </a:r>
+            <a:r>
+              <a:rPr lang="de-DE" sz="1600" dirty="0" smtClean="0">
+                <a:uFillTx/>
+              </a:rPr>
+              <a:t> </a:t>
+            </a:r>
+            <a:r>
+              <a:rPr lang="de-DE" sz="1600" dirty="0" err="1" smtClean="0">
+                <a:uFillTx/>
+              </a:rPr>
+              <a:t>data</a:t>
+            </a:r>
+            <a:r>
+              <a:rPr lang="de-DE" sz="1600" dirty="0" smtClean="0">
+                <a:uFillTx/>
+              </a:rPr>
+              <a:t> </a:t>
+            </a:r>
+            <a:r>
+              <a:rPr lang="de-DE" sz="1600" dirty="0" err="1" smtClean="0">
+                <a:uFillTx/>
+              </a:rPr>
+              <a:t>fech</a:t>
+            </a:r>
+            <a:r>
+              <a:rPr lang="de-DE" sz="1600" dirty="0" err="1" smtClean="0"/>
+              <a:t>ted</a:t>
+            </a:r>
+            <a:r>
+              <a:rPr lang="de-DE" sz="1600" dirty="0" smtClean="0"/>
+              <a:t> </a:t>
+            </a:r>
+            <a:r>
+              <a:rPr lang="de-DE" sz="1600" dirty="0" err="1" smtClean="0"/>
+              <a:t>from</a:t>
+            </a:r>
+            <a:r>
+              <a:rPr lang="de-DE" sz="1600" dirty="0" smtClean="0"/>
+              <a:t> </a:t>
+            </a:r>
+            <a:r>
+              <a:rPr lang="de-DE" sz="1600" dirty="0" err="1" smtClean="0"/>
+              <a:t>database</a:t>
+            </a:r>
+            <a:endParaRPr lang="de-DE" sz="1600" dirty="0" smtClean="0">
               <a:uFillTx/>
             </a:endParaRPr>
           </a:p>
           <a:p>
-            <a:pPr algn="just"/>
-            <a:endParaRPr lang="en-GB" sz="1400" dirty="0">
-              <a:uFillTx/>
-            </a:endParaRPr>
+            <a:pPr algn="just">
+              <a:buClr>
+                <a:srgbClr val="FFC000"/>
+              </a:buClr>
+              <a:buFont typeface="Wingdings" panose="05000000000000000000" pitchFamily="2" charset="2"/>
+              <a:buChar char="§"/>
+            </a:pPr>
+            <a:r>
+              <a:rPr lang="de-DE" sz="2000" dirty="0" err="1" smtClean="0"/>
+              <a:t>Boardlet</a:t>
+            </a:r>
+            <a:r>
+              <a:rPr lang="de-DE" sz="2000" dirty="0" smtClean="0"/>
+              <a:t> Design</a:t>
+            </a:r>
+          </a:p>
+          <a:p>
+            <a:pPr lvl="1" algn="just">
+              <a:buClr>
+                <a:srgbClr val="FFC000"/>
+              </a:buClr>
+              <a:buFont typeface="Wingdings" panose="05000000000000000000" pitchFamily="2" charset="2"/>
+              <a:buChar char="§"/>
+            </a:pPr>
+            <a:r>
+              <a:rPr lang="de-DE" sz="1600" dirty="0" smtClean="0"/>
+              <a:t>Upload </a:t>
+            </a:r>
+            <a:r>
+              <a:rPr lang="de-DE" sz="1600" dirty="0" err="1" smtClean="0"/>
+              <a:t>button</a:t>
+            </a:r>
+            <a:endParaRPr lang="de-DE" sz="1600" dirty="0" smtClean="0"/>
+          </a:p>
+          <a:p>
+            <a:pPr lvl="2" algn="just">
+              <a:buClr>
+                <a:srgbClr val="FFC000"/>
+              </a:buClr>
+              <a:buFont typeface="Wingdings" panose="05000000000000000000" pitchFamily="2" charset="2"/>
+              <a:buChar char="§"/>
+            </a:pPr>
+            <a:r>
+              <a:rPr lang="de-DE" sz="1200" dirty="0" err="1" smtClean="0">
+                <a:uFillTx/>
+              </a:rPr>
+              <a:t>Until</a:t>
+            </a:r>
+            <a:r>
+              <a:rPr lang="de-DE" sz="1200" dirty="0" smtClean="0">
+                <a:uFillTx/>
+              </a:rPr>
+              <a:t> </a:t>
+            </a:r>
+            <a:r>
+              <a:rPr lang="de-DE" sz="1200" dirty="0" err="1" smtClean="0">
+                <a:uFillTx/>
+              </a:rPr>
+              <a:t>now</a:t>
+            </a:r>
+            <a:r>
+              <a:rPr lang="de-DE" sz="1200" dirty="0" smtClean="0">
+                <a:uFillTx/>
+              </a:rPr>
+              <a:t>, </a:t>
+            </a:r>
+            <a:r>
+              <a:rPr lang="de-DE" sz="1200" dirty="0" err="1" smtClean="0">
+                <a:uFillTx/>
+              </a:rPr>
+              <a:t>no</a:t>
+            </a:r>
+            <a:r>
+              <a:rPr lang="de-DE" sz="1200" dirty="0" smtClean="0">
+                <a:uFillTx/>
+              </a:rPr>
+              <a:t> </a:t>
+            </a:r>
+            <a:r>
+              <a:rPr lang="de-DE" sz="1200" dirty="0" err="1" smtClean="0">
+                <a:uFillTx/>
+              </a:rPr>
+              <a:t>way</a:t>
+            </a:r>
+            <a:r>
+              <a:rPr lang="de-DE" sz="1200" dirty="0" smtClean="0">
+                <a:uFillTx/>
+              </a:rPr>
+              <a:t> </a:t>
+            </a:r>
+            <a:r>
+              <a:rPr lang="de-DE" sz="1200" dirty="0" err="1" smtClean="0">
+                <a:uFillTx/>
+              </a:rPr>
+              <a:t>of</a:t>
+            </a:r>
+            <a:r>
+              <a:rPr lang="de-DE" sz="1200" dirty="0" smtClean="0">
+                <a:uFillTx/>
+              </a:rPr>
+              <a:t> </a:t>
+            </a:r>
+            <a:r>
+              <a:rPr lang="de-DE" sz="1200" dirty="0" err="1" smtClean="0">
+                <a:uFillTx/>
+              </a:rPr>
+              <a:t>uploading</a:t>
+            </a:r>
+            <a:r>
+              <a:rPr lang="de-DE" sz="1200" dirty="0" smtClean="0">
+                <a:uFillTx/>
+              </a:rPr>
+              <a:t> </a:t>
+            </a:r>
+            <a:r>
+              <a:rPr lang="de-DE" sz="1200" dirty="0" err="1" smtClean="0">
+                <a:uFillTx/>
+              </a:rPr>
+              <a:t>files</a:t>
+            </a:r>
+            <a:r>
+              <a:rPr lang="de-DE" sz="1200" dirty="0" smtClean="0">
+                <a:uFillTx/>
+              </a:rPr>
+              <a:t> </a:t>
+            </a:r>
+            <a:r>
+              <a:rPr lang="de-DE" sz="1200" dirty="0" err="1" smtClean="0">
+                <a:uFillTx/>
+              </a:rPr>
+              <a:t>from</a:t>
+            </a:r>
+            <a:r>
+              <a:rPr lang="de-DE" sz="1200" dirty="0" smtClean="0">
+                <a:uFillTx/>
+              </a:rPr>
+              <a:t> </a:t>
+            </a:r>
+            <a:r>
+              <a:rPr lang="de-DE" sz="1200" dirty="0" err="1" smtClean="0">
+                <a:uFillTx/>
+              </a:rPr>
+              <a:t>client</a:t>
+            </a:r>
+            <a:r>
+              <a:rPr lang="de-DE" sz="1200" dirty="0" smtClean="0">
+                <a:uFillTx/>
+              </a:rPr>
+              <a:t> </a:t>
+            </a:r>
+            <a:r>
+              <a:rPr lang="de-DE" sz="1200" dirty="0" err="1" smtClean="0">
+                <a:uFillTx/>
+              </a:rPr>
+              <a:t>to</a:t>
+            </a:r>
+            <a:r>
+              <a:rPr lang="de-DE" sz="1200" dirty="0" smtClean="0">
+                <a:uFillTx/>
+              </a:rPr>
+              <a:t> </a:t>
+            </a:r>
+            <a:r>
+              <a:rPr lang="de-DE" sz="1200" dirty="0" err="1" smtClean="0">
+                <a:uFillTx/>
+              </a:rPr>
+              <a:t>the</a:t>
+            </a:r>
+            <a:r>
+              <a:rPr lang="de-DE" sz="1200" dirty="0" smtClean="0">
+                <a:uFillTx/>
+              </a:rPr>
+              <a:t> </a:t>
+            </a:r>
+            <a:r>
+              <a:rPr lang="de-DE" sz="1200" dirty="0" err="1" smtClean="0">
+                <a:uFillTx/>
+              </a:rPr>
+              <a:t>file</a:t>
+            </a:r>
+            <a:r>
+              <a:rPr lang="de-DE" sz="1200" dirty="0" smtClean="0">
+                <a:uFillTx/>
+              </a:rPr>
+              <a:t> </a:t>
+            </a:r>
+            <a:r>
+              <a:rPr lang="de-DE" sz="1200" dirty="0" err="1" smtClean="0">
+                <a:uFillTx/>
+              </a:rPr>
+              <a:t>system</a:t>
+            </a:r>
+            <a:r>
+              <a:rPr lang="de-DE" sz="1200" dirty="0" smtClean="0">
+                <a:uFillTx/>
+              </a:rPr>
+              <a:t> </a:t>
+            </a:r>
+            <a:r>
+              <a:rPr lang="de-DE" sz="1200" dirty="0" err="1" smtClean="0">
+                <a:uFillTx/>
+              </a:rPr>
+              <a:t>found</a:t>
+            </a:r>
+            <a:r>
+              <a:rPr lang="de-DE" sz="1200" dirty="0" smtClean="0">
+                <a:uFillTx/>
+              </a:rPr>
+              <a:t> (</a:t>
+            </a:r>
+            <a:r>
+              <a:rPr lang="de-DE" sz="1200" dirty="0" err="1" smtClean="0">
+                <a:uFillTx/>
+              </a:rPr>
+              <a:t>because</a:t>
+            </a:r>
+            <a:r>
+              <a:rPr lang="de-DE" sz="1200" dirty="0" smtClean="0">
+                <a:uFillTx/>
+              </a:rPr>
+              <a:t> </a:t>
+            </a:r>
+            <a:r>
+              <a:rPr lang="de-DE" sz="1200" dirty="0" err="1" smtClean="0">
+                <a:uFillTx/>
+              </a:rPr>
+              <a:t>of</a:t>
+            </a:r>
+            <a:r>
+              <a:rPr lang="de-DE" sz="1200" dirty="0" smtClean="0">
+                <a:uFillTx/>
+              </a:rPr>
+              <a:t> </a:t>
+            </a:r>
+            <a:r>
+              <a:rPr lang="de-DE" sz="1200" dirty="0" err="1" smtClean="0">
+                <a:uFillTx/>
+              </a:rPr>
+              <a:t>security</a:t>
+            </a:r>
+            <a:r>
+              <a:rPr lang="de-DE" sz="1200" dirty="0" smtClean="0">
+                <a:uFillTx/>
+              </a:rPr>
+              <a:t> </a:t>
+            </a:r>
+            <a:r>
+              <a:rPr lang="de-DE" sz="1200" dirty="0" err="1" smtClean="0">
+                <a:uFillTx/>
+              </a:rPr>
+              <a:t>issues</a:t>
+            </a:r>
+            <a:r>
+              <a:rPr lang="de-DE" sz="1200" dirty="0" smtClean="0">
+                <a:uFillTx/>
+              </a:rPr>
+              <a:t>)</a:t>
+            </a:r>
+          </a:p>
+          <a:p>
+            <a:pPr lvl="1" algn="just">
+              <a:buClr>
+                <a:srgbClr val="FFC000"/>
+              </a:buClr>
+              <a:buFont typeface="Wingdings" panose="05000000000000000000" pitchFamily="2" charset="2"/>
+              <a:buChar char="§"/>
+            </a:pPr>
+            <a:r>
+              <a:rPr lang="de-DE" sz="1600" dirty="0" smtClean="0"/>
+              <a:t>Fix Progress Bar</a:t>
+            </a:r>
+            <a:endParaRPr lang="de-DE" sz="1600" dirty="0"/>
           </a:p>
         </p:txBody>
       </p:sp>
     </p:spTree>
     <p:extLst>
       <p:ext uri="{BB962C8B-B14F-4D97-AF65-F5344CB8AC3E}">
-        <p14:creationId xmlns:p14="http://schemas.microsoft.com/office/powerpoint/2010/main" val="2317665350"/>
+        <p14:creationId xmlns:p14="http://schemas.microsoft.com/office/powerpoint/2010/main" val="2190960232"/>
       </p:ext>
     </p:extLst>
   </p:cSld>
@@ -6309,6 +6593,467 @@
                 </a:solidFill>
                 <a:uFillTx/>
               </a:rPr>
+              <a:t>Next Sprint – </a:t>
+            </a:r>
+            <a:r>
+              <a:rPr lang="en-US" sz="3200" b="1" dirty="0" err="1">
+                <a:solidFill>
+                  <a:srgbClr val="339966"/>
+                </a:solidFill>
+                <a:uFillTx/>
+              </a:rPr>
+              <a:t>ToDos</a:t>
+            </a:r>
+            <a:r>
+              <a:rPr lang="en-US" sz="3200" b="1" dirty="0">
+                <a:solidFill>
+                  <a:srgbClr val="339966"/>
+                </a:solidFill>
+                <a:uFillTx/>
+              </a:rPr>
+              <a:t/>
+            </a:r>
+            <a:br>
+              <a:rPr lang="en-US" sz="3200" b="1" dirty="0">
+                <a:solidFill>
+                  <a:srgbClr val="339966"/>
+                </a:solidFill>
+                <a:uFillTx/>
+              </a:rPr>
+            </a:br>
+            <a:r>
+              <a:rPr lang="en-US" sz="1600" b="1" dirty="0">
+                <a:solidFill>
+                  <a:schemeClr val="bg1">
+                    <a:lumMod val="50000"/>
+                  </a:schemeClr>
+                </a:solidFill>
+                <a:uFillTx/>
+              </a:rPr>
+              <a:t>Weekly Sprint 14</a:t>
+            </a:r>
+            <a:endParaRPr lang="en-US" sz="3200" dirty="0">
+              <a:solidFill>
+                <a:schemeClr val="bg1">
+                  <a:lumMod val="50000"/>
+                </a:schemeClr>
+              </a:solidFill>
+              <a:uFillTx/>
+            </a:endParaRPr>
+          </a:p>
+        </p:txBody>
+      </p:sp>
+      <p:pic>
+        <p:nvPicPr>
+          <p:cNvPr id="3" name="Picture 2" descr="Image result for gefasoft logo svg"/>
+          <p:cNvPicPr>
+            <a:picLocks noChangeAspect="1" noChangeArrowheads="1"/>
+          </p:cNvPicPr>
+          <p:nvPr/>
+        </p:nvPicPr>
+        <p:blipFill>
+          <a:blip r:embed="rId2" cstate="hqprint"/>
+          <a:srcRect/>
+          <a:stretch>
+            <a:fillRect/>
+          </a:stretch>
+        </p:blipFill>
+        <p:spPr bwMode="auto">
+          <a:xfrm>
+            <a:off x="10413546" y="140804"/>
+            <a:ext cx="1641442" cy="358638"/>
+          </a:xfrm>
+          <a:prstGeom prst="rect">
+            <a:avLst/>
+          </a:prstGeom>
+          <a:noFill/>
+        </p:spPr>
+      </p:pic>
+      <p:sp>
+        <p:nvSpPr>
+          <p:cNvPr id="4" name="Content Placeholder 2"/>
+          <p:cNvSpPr>
+            <a:spLocks noGrp="1"/>
+          </p:cNvSpPr>
+          <p:nvPr>
+            <p:ph idx="1"/>
+          </p:nvPr>
+        </p:nvSpPr>
+        <p:spPr>
+          <a:xfrm>
+            <a:off x="610225" y="1305007"/>
+            <a:ext cx="10949976" cy="5412189"/>
+          </a:xfrm>
+        </p:spPr>
+        <p:txBody>
+          <a:bodyPr>
+            <a:normAutofit/>
+          </a:bodyPr>
+          <a:lstStyle/>
+          <a:p>
+            <a:pPr algn="just">
+              <a:buClr>
+                <a:srgbClr val="FFC000"/>
+              </a:buClr>
+              <a:buFont typeface="Wingdings" panose="05000000000000000000" pitchFamily="2" charset="2"/>
+              <a:buChar char="§"/>
+            </a:pPr>
+            <a:r>
+              <a:rPr lang="en-GB" sz="2000" dirty="0"/>
+              <a:t>Vertex placement algorithm</a:t>
+            </a:r>
+          </a:p>
+          <a:p>
+            <a:pPr lvl="1" algn="just">
+              <a:buClr>
+                <a:srgbClr val="FFC000"/>
+              </a:buClr>
+              <a:buFont typeface="Wingdings" panose="05000000000000000000" pitchFamily="2" charset="2"/>
+              <a:buChar char="§"/>
+            </a:pPr>
+            <a:r>
+              <a:rPr lang="en-GB" sz="1600" dirty="0" smtClean="0"/>
+              <a:t>Sapient </a:t>
+            </a:r>
+            <a:r>
+              <a:rPr lang="en-GB" sz="1600" dirty="0" err="1" smtClean="0"/>
+              <a:t>Boardlet</a:t>
+            </a:r>
+            <a:r>
+              <a:rPr lang="en-GB" sz="1600" dirty="0" smtClean="0"/>
+              <a:t> Implementation</a:t>
+            </a:r>
+            <a:endParaRPr lang="en-GB" sz="1600" dirty="0"/>
+          </a:p>
+          <a:p>
+            <a:pPr algn="just">
+              <a:buClr>
+                <a:srgbClr val="FFC000"/>
+              </a:buClr>
+              <a:buFont typeface="Wingdings" panose="05000000000000000000" pitchFamily="2" charset="2"/>
+              <a:buChar char="§"/>
+            </a:pPr>
+            <a:r>
+              <a:rPr lang="en-GB" sz="2000" dirty="0" err="1" smtClean="0"/>
+              <a:t>Schreiben</a:t>
+            </a:r>
+            <a:r>
+              <a:rPr lang="en-GB" sz="2000" dirty="0"/>
+              <a:t>! (und </a:t>
+            </a:r>
+            <a:r>
+              <a:rPr lang="en-GB" sz="2000" dirty="0" err="1"/>
+              <a:t>Lernen</a:t>
+            </a:r>
+            <a:r>
+              <a:rPr lang="en-GB" sz="2000" dirty="0"/>
+              <a:t>)</a:t>
+            </a:r>
+          </a:p>
+          <a:p>
+            <a:pPr algn="just">
+              <a:buClr>
+                <a:srgbClr val="FFC000"/>
+              </a:buClr>
+              <a:buFont typeface="Wingdings" panose="05000000000000000000" pitchFamily="2" charset="2"/>
+              <a:buChar char="§"/>
+            </a:pPr>
+            <a:r>
+              <a:rPr lang="en-GB" sz="2000" dirty="0" err="1" smtClean="0"/>
+              <a:t>Boardlet</a:t>
+            </a:r>
+            <a:r>
+              <a:rPr lang="en-GB" sz="2000" dirty="0" smtClean="0"/>
+              <a:t> Design</a:t>
+            </a:r>
+            <a:endParaRPr lang="en-GB" sz="2000" dirty="0"/>
+          </a:p>
+          <a:p>
+            <a:pPr lvl="1" algn="just">
+              <a:buClr>
+                <a:srgbClr val="FFC000"/>
+              </a:buClr>
+              <a:buFont typeface="Wingdings" panose="05000000000000000000" pitchFamily="2" charset="2"/>
+              <a:buChar char="§"/>
+            </a:pPr>
+            <a:r>
+              <a:rPr lang="en-GB" sz="1600" dirty="0" smtClean="0">
+                <a:uFillTx/>
+              </a:rPr>
+              <a:t>Upload button</a:t>
+            </a:r>
+          </a:p>
+          <a:p>
+            <a:pPr lvl="1" algn="just">
+              <a:buClr>
+                <a:srgbClr val="FFC000"/>
+              </a:buClr>
+              <a:buFont typeface="Wingdings" panose="05000000000000000000" pitchFamily="2" charset="2"/>
+              <a:buChar char="§"/>
+            </a:pPr>
+            <a:r>
+              <a:rPr lang="en-GB" sz="1600" dirty="0" smtClean="0"/>
+              <a:t>Progress bar</a:t>
+            </a:r>
+            <a:endParaRPr lang="en-GB" sz="1400" dirty="0">
+              <a:uFillTx/>
+            </a:endParaRPr>
+          </a:p>
+          <a:p>
+            <a:pPr algn="just"/>
+            <a:endParaRPr lang="en-GB" sz="1400" dirty="0">
+              <a:uFillTx/>
+            </a:endParaRPr>
+          </a:p>
+        </p:txBody>
+      </p:sp>
+    </p:spTree>
+    <p:extLst>
+      <p:ext uri="{BB962C8B-B14F-4D97-AF65-F5344CB8AC3E}">
+        <p14:creationId xmlns:p14="http://schemas.microsoft.com/office/powerpoint/2010/main" val="124425708"/>
+      </p:ext>
+    </p:extLst>
+  </p:cSld>
+  <p:clrMapOvr>
+    <a:masterClrMapping/>
+  </p:clrMapOvr>
+</p:sld>
+</file>
+
+<file path=ppt/slides/slide17.xml><?xml version="1.0" encoding="utf-8"?>
+<p:sld xmlns:a="http://schemas.openxmlformats.org/drawingml/2006/main" xmlns:r="http://schemas.openxmlformats.org/officeDocument/2006/relationships" xmlns:p="http://schemas.openxmlformats.org/presentationml/2006/main">
+  <p:cSld>
+    <p:spTree>
+      <p:nvGrpSpPr>
+        <p:cNvPr id="1" name=""/>
+        <p:cNvGrpSpPr/>
+        <p:nvPr/>
+      </p:nvGrpSpPr>
+      <p:grpSpPr>
+        <a:xfrm>
+          <a:off x="0" y="0"/>
+          <a:ext cx="0" cy="0"/>
+          <a:chOff x="0" y="0"/>
+          <a:chExt cx="0" cy="0"/>
+        </a:xfrm>
+      </p:grpSpPr>
+      <p:sp>
+        <p:nvSpPr>
+          <p:cNvPr id="2" name="Title 1"/>
+          <p:cNvSpPr>
+            <a:spLocks noGrp="1"/>
+          </p:cNvSpPr>
+          <p:nvPr>
+            <p:ph type="title"/>
+          </p:nvPr>
+        </p:nvSpPr>
+        <p:spPr>
+          <a:xfrm>
+            <a:off x="0" y="18255"/>
+            <a:ext cx="12192000" cy="991939"/>
+          </a:xfrm>
+        </p:spPr>
+        <p:txBody>
+          <a:bodyPr>
+            <a:normAutofit/>
+          </a:bodyPr>
+          <a:lstStyle/>
+          <a:p>
+            <a:r>
+              <a:rPr lang="en-US" sz="3200" b="1" dirty="0" err="1">
+                <a:solidFill>
+                  <a:srgbClr val="339966"/>
+                </a:solidFill>
+              </a:rPr>
+              <a:t>Vorläufige</a:t>
+            </a:r>
+            <a:r>
+              <a:rPr lang="en-US" sz="3200" b="1" dirty="0">
+                <a:solidFill>
+                  <a:srgbClr val="339966"/>
+                </a:solidFill>
+              </a:rPr>
+              <a:t> </a:t>
+            </a:r>
+            <a:r>
+              <a:rPr lang="en-US" sz="3200" b="1" dirty="0" err="1">
+                <a:solidFill>
+                  <a:srgbClr val="339966"/>
+                </a:solidFill>
+              </a:rPr>
+              <a:t>Inhaltsverzeichnis</a:t>
+            </a:r>
+            <a:r>
+              <a:rPr lang="en-US" sz="3200" b="1" dirty="0">
+                <a:solidFill>
+                  <a:srgbClr val="339966"/>
+                </a:solidFill>
+                <a:uFillTx/>
+              </a:rPr>
+              <a:t/>
+            </a:r>
+            <a:br>
+              <a:rPr lang="en-US" sz="3200" b="1" dirty="0">
+                <a:solidFill>
+                  <a:srgbClr val="339966"/>
+                </a:solidFill>
+                <a:uFillTx/>
+              </a:rPr>
+            </a:br>
+            <a:r>
+              <a:rPr lang="en-US" sz="1600" b="1" dirty="0">
+                <a:solidFill>
+                  <a:schemeClr val="bg1">
+                    <a:lumMod val="50000"/>
+                  </a:schemeClr>
+                </a:solidFill>
+                <a:uFillTx/>
+              </a:rPr>
+              <a:t>Bachelorarbeit</a:t>
+            </a:r>
+            <a:endParaRPr lang="en-US" sz="3200" dirty="0">
+              <a:solidFill>
+                <a:schemeClr val="bg1">
+                  <a:lumMod val="50000"/>
+                </a:schemeClr>
+              </a:solidFill>
+              <a:uFillTx/>
+            </a:endParaRPr>
+          </a:p>
+        </p:txBody>
+      </p:sp>
+      <p:pic>
+        <p:nvPicPr>
+          <p:cNvPr id="3" name="Picture 2" descr="Image result for gefasoft logo svg"/>
+          <p:cNvPicPr>
+            <a:picLocks noChangeAspect="1" noChangeArrowheads="1"/>
+          </p:cNvPicPr>
+          <p:nvPr/>
+        </p:nvPicPr>
+        <p:blipFill>
+          <a:blip r:embed="rId2" cstate="hqprint"/>
+          <a:srcRect/>
+          <a:stretch>
+            <a:fillRect/>
+          </a:stretch>
+        </p:blipFill>
+        <p:spPr bwMode="auto">
+          <a:xfrm>
+            <a:off x="10413546" y="140804"/>
+            <a:ext cx="1641442" cy="358638"/>
+          </a:xfrm>
+          <a:prstGeom prst="rect">
+            <a:avLst/>
+          </a:prstGeom>
+          <a:noFill/>
+        </p:spPr>
+      </p:pic>
+      <p:sp>
+        <p:nvSpPr>
+          <p:cNvPr id="4" name="Content Placeholder 2"/>
+          <p:cNvSpPr>
+            <a:spLocks noGrp="1"/>
+          </p:cNvSpPr>
+          <p:nvPr>
+            <p:ph idx="1"/>
+          </p:nvPr>
+        </p:nvSpPr>
+        <p:spPr>
+          <a:xfrm>
+            <a:off x="610225" y="1305007"/>
+            <a:ext cx="10949976" cy="5412189"/>
+          </a:xfrm>
+        </p:spPr>
+        <p:txBody>
+          <a:bodyPr>
+            <a:normAutofit/>
+          </a:bodyPr>
+          <a:lstStyle/>
+          <a:p>
+            <a:pPr algn="just">
+              <a:buClr>
+                <a:srgbClr val="FFC000"/>
+              </a:buClr>
+              <a:buFont typeface="Wingdings" panose="05000000000000000000" pitchFamily="2" charset="2"/>
+              <a:buChar char="§"/>
+            </a:pPr>
+            <a:r>
+              <a:rPr lang="en-GB" sz="2000" dirty="0">
+                <a:uFillTx/>
+              </a:rPr>
+              <a:t>In Word…</a:t>
+            </a:r>
+            <a:endParaRPr lang="en-GB" sz="1400" dirty="0">
+              <a:uFillTx/>
+            </a:endParaRPr>
+          </a:p>
+          <a:p>
+            <a:pPr algn="just"/>
+            <a:endParaRPr lang="en-GB" sz="1400" dirty="0">
+              <a:uFillTx/>
+            </a:endParaRPr>
+          </a:p>
+        </p:txBody>
+      </p:sp>
+    </p:spTree>
+    <p:extLst>
+      <p:ext uri="{BB962C8B-B14F-4D97-AF65-F5344CB8AC3E}">
+        <p14:creationId xmlns:p14="http://schemas.microsoft.com/office/powerpoint/2010/main" val="2317665350"/>
+      </p:ext>
+    </p:extLst>
+  </p:cSld>
+  <p:clrMapOvr>
+    <a:masterClrMapping/>
+  </p:clrMapOvr>
+</p:sld>
+</file>
+
+<file path=ppt/slides/slide18.xml><?xml version="1.0" encoding="utf-8"?>
+<p:sld xmlns:a="http://schemas.openxmlformats.org/drawingml/2006/main" xmlns:r="http://schemas.openxmlformats.org/officeDocument/2006/relationships" xmlns:p="http://schemas.openxmlformats.org/presentationml/2006/main">
+  <p:cSld>
+    <p:spTree>
+      <p:nvGrpSpPr>
+        <p:cNvPr id="1" name=""/>
+        <p:cNvGrpSpPr/>
+        <p:nvPr/>
+      </p:nvGrpSpPr>
+      <p:grpSpPr>
+        <a:xfrm>
+          <a:off x="0" y="0"/>
+          <a:ext cx="0" cy="0"/>
+          <a:chOff x="0" y="0"/>
+          <a:chExt cx="0" cy="0"/>
+        </a:xfrm>
+      </p:grpSpPr>
+      <p:sp>
+        <p:nvSpPr>
+          <p:cNvPr id="2" name="Title 1"/>
+          <p:cNvSpPr>
+            <a:spLocks noGrp="1"/>
+          </p:cNvSpPr>
+          <p:nvPr>
+            <p:ph type="title"/>
+          </p:nvPr>
+        </p:nvSpPr>
+        <p:spPr>
+          <a:xfrm>
+            <a:off x="0" y="18255"/>
+            <a:ext cx="12192000" cy="991939"/>
+          </a:xfrm>
+        </p:spPr>
+        <p:txBody>
+          <a:bodyPr>
+            <a:normAutofit/>
+          </a:bodyPr>
+          <a:lstStyle/>
+          <a:p>
+            <a:r>
+              <a:rPr lang="en-US" sz="3200" b="1" dirty="0">
+                <a:solidFill>
+                  <a:srgbClr val="339966"/>
+                </a:solidFill>
+                <a:uFillTx/>
+              </a:rPr>
               <a:t>Project – Overview</a:t>
             </a:r>
             <a:br>
@@ -6361,22 +7106,28 @@
       </p:pic>
       <p:pic>
         <p:nvPicPr>
-          <p:cNvPr id="3" name="Grafik 2"/>
+          <p:cNvPr id="6" name="Grafik 5"/>
           <p:cNvPicPr>
             <a:picLocks noChangeAspect="1"/>
           </p:cNvPicPr>
           <p:nvPr/>
         </p:nvPicPr>
         <p:blipFill>
-          <a:blip r:embed="rId3"/>
+          <a:blip r:embed="rId3">
+            <a:extLst>
+              <a:ext uri="{28A0092B-C50C-407E-A947-70E740481C1C}">
+                <a14:useLocalDpi xmlns:a14="http://schemas.microsoft.com/office/drawing/2010/main" val="0"/>
+              </a:ext>
+            </a:extLst>
+          </a:blip>
           <a:stretch>
             <a:fillRect/>
           </a:stretch>
         </p:blipFill>
         <p:spPr>
           <a:xfrm>
-            <a:off x="36309" y="2111433"/>
-            <a:ext cx="12095588" cy="3383280"/>
+            <a:off x="138894" y="2022935"/>
+            <a:ext cx="11872552" cy="3303808"/>
           </a:xfrm>
           <a:prstGeom prst="rect">
             <a:avLst/>
@@ -6680,26 +7431,32 @@
       </p:sp>
       <p:pic>
         <p:nvPicPr>
-          <p:cNvPr id="8" name="Inhaltsplatzhalter 7">
-            <a:hlinkClick r:id="rId3"/>
-          </p:cNvPr>
+          <p:cNvPr id="9" name="Grafik 8"/>
           <p:cNvPicPr>
-            <a:picLocks noGrp="1" noChangeAspect="1"/>
+            <a:picLocks noChangeAspect="1"/>
           </p:cNvPicPr>
-          <p:nvPr>
-            <p:ph idx="1"/>
-          </p:nvPr>
+          <p:nvPr/>
         </p:nvPicPr>
-        <p:blipFill rotWithShape="1">
-          <a:blip r:embed="rId4"/>
-          <a:srcRect b="470"/>
-          <a:stretch/>
+        <p:blipFill>
+          <a:blip r:embed="rId3">
+            <a:extLst>
+              <a:ext uri="{28A0092B-C50C-407E-A947-70E740481C1C}">
+                <a14:useLocalDpi xmlns:a14="http://schemas.microsoft.com/office/drawing/2010/main" val="0"/>
+              </a:ext>
+            </a:extLst>
+          </a:blip>
+          <a:stretch>
+            <a:fillRect/>
+          </a:stretch>
         </p:blipFill>
         <p:spPr>
           <a:xfrm>
-            <a:off x="302859" y="902126"/>
-            <a:ext cx="11586282" cy="5714802"/>
-          </a:xfrm>
+            <a:off x="647700" y="905908"/>
+            <a:ext cx="10896600" cy="5641260"/>
+          </a:xfrm>
+          <a:prstGeom prst="rect">
+            <a:avLst/>
+          </a:prstGeom>
         </p:spPr>
       </p:pic>
     </p:spTree>
@@ -6767,6 +7524,15 @@
               </a:rPr>
               <a:t>Boardlet</a:t>
             </a:r>
+            <a:r>
+              <a:rPr lang="en-US" sz="3200" b="1" dirty="0">
+                <a:solidFill>
+                  <a:srgbClr val="339966"/>
+                </a:solidFill>
+                <a:uFillTx/>
+              </a:rPr>
+              <a:t/>
+            </a:r>
             <a:br>
               <a:rPr lang="en-US" sz="3200" b="1" dirty="0">
                 <a:solidFill>
@@ -7642,76 +8408,13 @@
             </a:pPr>
             <a:r>
               <a:rPr lang="en-GB" sz="1900" dirty="0"/>
-              <a:t>Positioning logic in the form of rules (depending on tags)</a:t>
-            </a:r>
-          </a:p>
-          <a:p>
-            <a:pPr marL="457200" indent="-457200">
-              <a:lnSpc>
-                <a:spcPct val="100000"/>
-              </a:lnSpc>
-              <a:buClr>
-                <a:srgbClr val="FFC000"/>
-              </a:buClr>
-              <a:buFont typeface="+mj-lt"/>
-              <a:buAutoNum type="arabicPeriod"/>
-            </a:pPr>
-            <a:endParaRPr lang="en-GB" sz="1900" dirty="0">
-              <a:uFillTx/>
-            </a:endParaRPr>
-          </a:p>
-          <a:p>
-            <a:pPr marL="457200" indent="-457200">
-              <a:lnSpc>
-                <a:spcPct val="100000"/>
-              </a:lnSpc>
-              <a:buClr>
-                <a:srgbClr val="FFC000"/>
-              </a:buClr>
-              <a:buFont typeface="+mj-lt"/>
-              <a:buAutoNum type="arabicPeriod"/>
-            </a:pPr>
+              <a:t>Positioning logic in the form of rules (depending on tags</a:t>
+            </a:r>
+            <a:r>
+              <a:rPr lang="en-GB" sz="1900" dirty="0" smtClean="0"/>
+              <a:t>)</a:t>
+            </a:r>
             <a:endParaRPr lang="en-GB" sz="1900" dirty="0"/>
-          </a:p>
-          <a:p>
-            <a:pPr marL="457200" indent="-457200">
-              <a:lnSpc>
-                <a:spcPct val="100000"/>
-              </a:lnSpc>
-              <a:buClr>
-                <a:srgbClr val="FFC000"/>
-              </a:buClr>
-              <a:buFont typeface="+mj-lt"/>
-              <a:buAutoNum type="arabicPeriod"/>
-            </a:pPr>
-            <a:endParaRPr lang="en-GB" sz="1900" dirty="0">
-              <a:uFillTx/>
-            </a:endParaRPr>
-          </a:p>
-          <a:p>
-            <a:pPr marL="0" indent="0">
-              <a:lnSpc>
-                <a:spcPct val="100000"/>
-              </a:lnSpc>
-              <a:buClr>
-                <a:srgbClr val="FFC000"/>
-              </a:buClr>
-              <a:buNone/>
-            </a:pPr>
-            <a:r>
-              <a:rPr lang="en-GB" sz="1900" dirty="0">
-                <a:solidFill>
-                  <a:srgbClr val="FF0000"/>
-                </a:solidFill>
-              </a:rPr>
-              <a:t>PLACE ACTIVITY DIAGRAM HERE CON RECUADROS PARA IR INDIVIDUALMENTE ENTRANDO A CADA FUNCION</a:t>
-            </a:r>
-            <a:endParaRPr lang="en-GB" sz="1900" dirty="0">
-              <a:solidFill>
-                <a:srgbClr val="FF0000"/>
-              </a:solidFill>
-              <a:uFillTx/>
-            </a:endParaRPr>
           </a:p>
         </p:txBody>
       </p:sp>
@@ -7769,6 +8472,15 @@
                 </a:solidFill>
               </a:rPr>
               <a:t>1. Simplification of Edges</a:t>
+            </a:r>
+            <a:r>
+              <a:rPr lang="en-GB" sz="3200" b="1" dirty="0">
+                <a:solidFill>
+                  <a:srgbClr val="339966"/>
+                </a:solidFill>
+                <a:uFillTx/>
+              </a:rPr>
+              <a:t/>
             </a:r>
             <a:br>
               <a:rPr lang="en-GB" sz="3200" b="1" dirty="0">
@@ -12589,8 +13301,8 @@
           </a:p>
         </p:txBody>
       </p:sp>
-      <mc:AlternateContent xmlns:mc="http://schemas.openxmlformats.org/markup-compatibility/2006">
-        <mc:Choice xmlns:a14="http://schemas.microsoft.com/office/drawing/2010/main" Requires="a14">
+      <mc:AlternateContent xmlns:mc="http://schemas.openxmlformats.org/markup-compatibility/2006" xmlns:a14="http://schemas.microsoft.com/office/drawing/2010/main">
+        <mc:Choice Requires="a14">
           <p:sp>
             <p:nvSpPr>
               <p:cNvPr id="247" name="Textfeld 246"/>
@@ -12800,7 +13512,7 @@
             </p:txBody>
           </p:sp>
         </mc:Choice>
-        <mc:Fallback>
+        <mc:Fallback xmlns="">
           <p:sp>
             <p:nvSpPr>
               <p:cNvPr id="247" name="Textfeld 246"/>
@@ -16518,8 +17230,8 @@
           </a:p>
         </p:txBody>
       </p:sp>
-      <mc:AlternateContent xmlns:mc="http://schemas.openxmlformats.org/markup-compatibility/2006">
-        <mc:Choice xmlns:a14="http://schemas.microsoft.com/office/drawing/2010/main" Requires="a14">
+      <mc:AlternateContent xmlns:mc="http://schemas.openxmlformats.org/markup-compatibility/2006" xmlns:a14="http://schemas.microsoft.com/office/drawing/2010/main">
+        <mc:Choice Requires="a14">
           <p:sp>
             <p:nvSpPr>
               <p:cNvPr id="247" name="Textfeld 246"/>
@@ -16729,7 +17441,7 @@
             </p:txBody>
           </p:sp>
         </mc:Choice>
-        <mc:Fallback>
+        <mc:Fallback xmlns="">
           <p:sp>
             <p:nvSpPr>
               <p:cNvPr id="247" name="Textfeld 246"/>

</xml_diff>